<commit_message>
added  content to the readme file
</commit_message>
<xml_diff>
--- a/docs/project_presentation_gm2667.pptx
+++ b/docs/project_presentation_gm2667.pptx
@@ -4,13 +4,18 @@
   <p:sldMasterIdLst>
     <p:sldMasterId id="2147483648" r:id="rId1"/>
   </p:sldMasterIdLst>
+  <p:notesMasterIdLst>
+    <p:notesMasterId r:id="rId10"/>
+  </p:notesMasterIdLst>
   <p:sldIdLst>
     <p:sldId id="256" r:id="rId2"/>
     <p:sldId id="257" r:id="rId3"/>
-    <p:sldId id="258" r:id="rId4"/>
-    <p:sldId id="259" r:id="rId5"/>
+    <p:sldId id="262" r:id="rId4"/>
+    <p:sldId id="258" r:id="rId5"/>
     <p:sldId id="260" r:id="rId6"/>
-    <p:sldId id="261" r:id="rId7"/>
+    <p:sldId id="259" r:id="rId7"/>
+    <p:sldId id="263" r:id="rId8"/>
+    <p:sldId id="261" r:id="rId9"/>
   </p:sldIdLst>
   <p:sldSz cx="12192000" cy="6858000"/>
   <p:notesSz cx="6858000" cy="9144000"/>
@@ -109,7 +114,445 @@
       </a:defRPr>
     </a:lvl9pPr>
   </p:defaultTextStyle>
+  <p:extLst>
+    <p:ext uri="{EFAFB233-063F-42B5-8137-9DF3F51BA10A}">
+      <p15:sldGuideLst xmlns:p15="http://schemas.microsoft.com/office/powerpoint/2012/main"/>
+    </p:ext>
+  </p:extLst>
 </p:presentation>
+</file>
+
+<file path=ppt/notesMasters/notesMaster1.xml><?xml version="1.0" encoding="utf-8"?>
+<p:notesMaster xmlns:a="http://schemas.openxmlformats.org/drawingml/2006/main" xmlns:r="http://schemas.openxmlformats.org/officeDocument/2006/relationships" xmlns:p="http://schemas.openxmlformats.org/presentationml/2006/main">
+  <p:cSld>
+    <p:bg>
+      <p:bgRef idx="1001">
+        <a:schemeClr val="bg1"/>
+      </p:bgRef>
+    </p:bg>
+    <p:spTree>
+      <p:nvGrpSpPr>
+        <p:cNvPr id="1" name=""/>
+        <p:cNvGrpSpPr/>
+        <p:nvPr/>
+      </p:nvGrpSpPr>
+      <p:grpSpPr>
+        <a:xfrm>
+          <a:off x="0" y="0"/>
+          <a:ext cx="0" cy="0"/>
+          <a:chOff x="0" y="0"/>
+          <a:chExt cx="0" cy="0"/>
+        </a:xfrm>
+      </p:grpSpPr>
+      <p:sp>
+        <p:nvSpPr>
+          <p:cNvPr id="2" name="Header Placeholder 1"/>
+          <p:cNvSpPr>
+            <a:spLocks noGrp="1"/>
+          </p:cNvSpPr>
+          <p:nvPr>
+            <p:ph type="hdr" sz="quarter"/>
+          </p:nvPr>
+        </p:nvSpPr>
+        <p:spPr>
+          <a:xfrm>
+            <a:off x="0" y="0"/>
+            <a:ext cx="2971800" cy="458788"/>
+          </a:xfrm>
+          <a:prstGeom prst="rect">
+            <a:avLst/>
+          </a:prstGeom>
+        </p:spPr>
+        <p:txBody>
+          <a:bodyPr vert="horz" lIns="91440" tIns="45720" rIns="91440" bIns="45720" rtlCol="0"/>
+          <a:lstStyle>
+            <a:lvl1pPr algn="l">
+              <a:defRPr sz="1200"/>
+            </a:lvl1pPr>
+          </a:lstStyle>
+          <a:p>
+            <a:endParaRPr lang="en-US"/>
+          </a:p>
+        </p:txBody>
+      </p:sp>
+      <p:sp>
+        <p:nvSpPr>
+          <p:cNvPr id="3" name="Date Placeholder 2"/>
+          <p:cNvSpPr>
+            <a:spLocks noGrp="1"/>
+          </p:cNvSpPr>
+          <p:nvPr>
+            <p:ph type="dt" idx="1"/>
+          </p:nvPr>
+        </p:nvSpPr>
+        <p:spPr>
+          <a:xfrm>
+            <a:off x="3884613" y="0"/>
+            <a:ext cx="2971800" cy="458788"/>
+          </a:xfrm>
+          <a:prstGeom prst="rect">
+            <a:avLst/>
+          </a:prstGeom>
+        </p:spPr>
+        <p:txBody>
+          <a:bodyPr vert="horz" lIns="91440" tIns="45720" rIns="91440" bIns="45720" rtlCol="0"/>
+          <a:lstStyle>
+            <a:lvl1pPr algn="r">
+              <a:defRPr sz="1200"/>
+            </a:lvl1pPr>
+          </a:lstStyle>
+          <a:p>
+            <a:fld id="{99035820-F3C9-4124-A986-D2628244CCB7}" type="datetimeFigureOut">
+              <a:rPr lang="en-US" smtClean="0"/>
+              <a:t>5/16/2022</a:t>
+            </a:fld>
+            <a:endParaRPr lang="en-US"/>
+          </a:p>
+        </p:txBody>
+      </p:sp>
+      <p:sp>
+        <p:nvSpPr>
+          <p:cNvPr id="4" name="Slide Image Placeholder 3"/>
+          <p:cNvSpPr>
+            <a:spLocks noGrp="1" noRot="1" noChangeAspect="1"/>
+          </p:cNvSpPr>
+          <p:nvPr>
+            <p:ph type="sldImg" idx="2"/>
+          </p:nvPr>
+        </p:nvSpPr>
+        <p:spPr>
+          <a:xfrm>
+            <a:off x="685800" y="1143000"/>
+            <a:ext cx="5486400" cy="3086100"/>
+          </a:xfrm>
+          <a:prstGeom prst="rect">
+            <a:avLst/>
+          </a:prstGeom>
+          <a:noFill/>
+          <a:ln w="12700">
+            <a:solidFill>
+              <a:prstClr val="black"/>
+            </a:solidFill>
+          </a:ln>
+        </p:spPr>
+        <p:txBody>
+          <a:bodyPr vert="horz" lIns="91440" tIns="45720" rIns="91440" bIns="45720" rtlCol="0" anchor="ctr"/>
+          <a:lstStyle/>
+          <a:p>
+            <a:endParaRPr lang="en-US"/>
+          </a:p>
+        </p:txBody>
+      </p:sp>
+      <p:sp>
+        <p:nvSpPr>
+          <p:cNvPr id="5" name="Notes Placeholder 4"/>
+          <p:cNvSpPr>
+            <a:spLocks noGrp="1"/>
+          </p:cNvSpPr>
+          <p:nvPr>
+            <p:ph type="body" sz="quarter" idx="3"/>
+          </p:nvPr>
+        </p:nvSpPr>
+        <p:spPr>
+          <a:xfrm>
+            <a:off x="685800" y="4400550"/>
+            <a:ext cx="5486400" cy="3600450"/>
+          </a:xfrm>
+          <a:prstGeom prst="rect">
+            <a:avLst/>
+          </a:prstGeom>
+        </p:spPr>
+        <p:txBody>
+          <a:bodyPr vert="horz" lIns="91440" tIns="45720" rIns="91440" bIns="45720" rtlCol="0"/>
+          <a:lstStyle/>
+          <a:p>
+            <a:pPr lvl="0"/>
+            <a:r>
+              <a:rPr lang="en-US"/>
+              <a:t>Click to edit Master text styles</a:t>
+            </a:r>
+          </a:p>
+          <a:p>
+            <a:pPr lvl="1"/>
+            <a:r>
+              <a:rPr lang="en-US"/>
+              <a:t>Second level</a:t>
+            </a:r>
+          </a:p>
+          <a:p>
+            <a:pPr lvl="2"/>
+            <a:r>
+              <a:rPr lang="en-US"/>
+              <a:t>Third level</a:t>
+            </a:r>
+          </a:p>
+          <a:p>
+            <a:pPr lvl="3"/>
+            <a:r>
+              <a:rPr lang="en-US"/>
+              <a:t>Fourth level</a:t>
+            </a:r>
+          </a:p>
+          <a:p>
+            <a:pPr lvl="4"/>
+            <a:r>
+              <a:rPr lang="en-US"/>
+              <a:t>Fifth level</a:t>
+            </a:r>
+          </a:p>
+        </p:txBody>
+      </p:sp>
+      <p:sp>
+        <p:nvSpPr>
+          <p:cNvPr id="6" name="Footer Placeholder 5"/>
+          <p:cNvSpPr>
+            <a:spLocks noGrp="1"/>
+          </p:cNvSpPr>
+          <p:nvPr>
+            <p:ph type="ftr" sz="quarter" idx="4"/>
+          </p:nvPr>
+        </p:nvSpPr>
+        <p:spPr>
+          <a:xfrm>
+            <a:off x="0" y="8685213"/>
+            <a:ext cx="2971800" cy="458787"/>
+          </a:xfrm>
+          <a:prstGeom prst="rect">
+            <a:avLst/>
+          </a:prstGeom>
+        </p:spPr>
+        <p:txBody>
+          <a:bodyPr vert="horz" lIns="91440" tIns="45720" rIns="91440" bIns="45720" rtlCol="0" anchor="b"/>
+          <a:lstStyle>
+            <a:lvl1pPr algn="l">
+              <a:defRPr sz="1200"/>
+            </a:lvl1pPr>
+          </a:lstStyle>
+          <a:p>
+            <a:endParaRPr lang="en-US"/>
+          </a:p>
+        </p:txBody>
+      </p:sp>
+      <p:sp>
+        <p:nvSpPr>
+          <p:cNvPr id="7" name="Slide Number Placeholder 6"/>
+          <p:cNvSpPr>
+            <a:spLocks noGrp="1"/>
+          </p:cNvSpPr>
+          <p:nvPr>
+            <p:ph type="sldNum" sz="quarter" idx="5"/>
+          </p:nvPr>
+        </p:nvSpPr>
+        <p:spPr>
+          <a:xfrm>
+            <a:off x="3884613" y="8685213"/>
+            <a:ext cx="2971800" cy="458787"/>
+          </a:xfrm>
+          <a:prstGeom prst="rect">
+            <a:avLst/>
+          </a:prstGeom>
+        </p:spPr>
+        <p:txBody>
+          <a:bodyPr vert="horz" lIns="91440" tIns="45720" rIns="91440" bIns="45720" rtlCol="0" anchor="b"/>
+          <a:lstStyle>
+            <a:lvl1pPr algn="r">
+              <a:defRPr sz="1200"/>
+            </a:lvl1pPr>
+          </a:lstStyle>
+          <a:p>
+            <a:fld id="{35CC1191-9195-4567-9772-6650F3FD5645}" type="slidenum">
+              <a:rPr lang="en-US" smtClean="0"/>
+              <a:t>‹#›</a:t>
+            </a:fld>
+            <a:endParaRPr lang="en-US"/>
+          </a:p>
+        </p:txBody>
+      </p:sp>
+    </p:spTree>
+    <p:extLst>
+      <p:ext uri="{BB962C8B-B14F-4D97-AF65-F5344CB8AC3E}">
+        <p14:creationId xmlns:p14="http://schemas.microsoft.com/office/powerpoint/2010/main" val="1755595425"/>
+      </p:ext>
+    </p:extLst>
+  </p:cSld>
+  <p:clrMap bg1="lt1" tx1="dk1" bg2="lt2" tx2="dk2" accent1="accent1" accent2="accent2" accent3="accent3" accent4="accent4" accent5="accent5" accent6="accent6" hlink="hlink" folHlink="folHlink"/>
+  <p:notesStyle>
+    <a:lvl1pPr marL="0" algn="l" defTabSz="914400" rtl="0" eaLnBrk="1" latinLnBrk="0" hangingPunct="1">
+      <a:defRPr sz="1200" kern="1200">
+        <a:solidFill>
+          <a:schemeClr val="tx1"/>
+        </a:solidFill>
+        <a:latin typeface="+mn-lt"/>
+        <a:ea typeface="+mn-ea"/>
+        <a:cs typeface="+mn-cs"/>
+      </a:defRPr>
+    </a:lvl1pPr>
+    <a:lvl2pPr marL="457200" algn="l" defTabSz="914400" rtl="0" eaLnBrk="1" latinLnBrk="0" hangingPunct="1">
+      <a:defRPr sz="1200" kern="1200">
+        <a:solidFill>
+          <a:schemeClr val="tx1"/>
+        </a:solidFill>
+        <a:latin typeface="+mn-lt"/>
+        <a:ea typeface="+mn-ea"/>
+        <a:cs typeface="+mn-cs"/>
+      </a:defRPr>
+    </a:lvl2pPr>
+    <a:lvl3pPr marL="914400" algn="l" defTabSz="914400" rtl="0" eaLnBrk="1" latinLnBrk="0" hangingPunct="1">
+      <a:defRPr sz="1200" kern="1200">
+        <a:solidFill>
+          <a:schemeClr val="tx1"/>
+        </a:solidFill>
+        <a:latin typeface="+mn-lt"/>
+        <a:ea typeface="+mn-ea"/>
+        <a:cs typeface="+mn-cs"/>
+      </a:defRPr>
+    </a:lvl3pPr>
+    <a:lvl4pPr marL="1371600" algn="l" defTabSz="914400" rtl="0" eaLnBrk="1" latinLnBrk="0" hangingPunct="1">
+      <a:defRPr sz="1200" kern="1200">
+        <a:solidFill>
+          <a:schemeClr val="tx1"/>
+        </a:solidFill>
+        <a:latin typeface="+mn-lt"/>
+        <a:ea typeface="+mn-ea"/>
+        <a:cs typeface="+mn-cs"/>
+      </a:defRPr>
+    </a:lvl4pPr>
+    <a:lvl5pPr marL="1828800" algn="l" defTabSz="914400" rtl="0" eaLnBrk="1" latinLnBrk="0" hangingPunct="1">
+      <a:defRPr sz="1200" kern="1200">
+        <a:solidFill>
+          <a:schemeClr val="tx1"/>
+        </a:solidFill>
+        <a:latin typeface="+mn-lt"/>
+        <a:ea typeface="+mn-ea"/>
+        <a:cs typeface="+mn-cs"/>
+      </a:defRPr>
+    </a:lvl5pPr>
+    <a:lvl6pPr marL="2286000" algn="l" defTabSz="914400" rtl="0" eaLnBrk="1" latinLnBrk="0" hangingPunct="1">
+      <a:defRPr sz="1200" kern="1200">
+        <a:solidFill>
+          <a:schemeClr val="tx1"/>
+        </a:solidFill>
+        <a:latin typeface="+mn-lt"/>
+        <a:ea typeface="+mn-ea"/>
+        <a:cs typeface="+mn-cs"/>
+      </a:defRPr>
+    </a:lvl6pPr>
+    <a:lvl7pPr marL="2743200" algn="l" defTabSz="914400" rtl="0" eaLnBrk="1" latinLnBrk="0" hangingPunct="1">
+      <a:defRPr sz="1200" kern="1200">
+        <a:solidFill>
+          <a:schemeClr val="tx1"/>
+        </a:solidFill>
+        <a:latin typeface="+mn-lt"/>
+        <a:ea typeface="+mn-ea"/>
+        <a:cs typeface="+mn-cs"/>
+      </a:defRPr>
+    </a:lvl7pPr>
+    <a:lvl8pPr marL="3200400" algn="l" defTabSz="914400" rtl="0" eaLnBrk="1" latinLnBrk="0" hangingPunct="1">
+      <a:defRPr sz="1200" kern="1200">
+        <a:solidFill>
+          <a:schemeClr val="tx1"/>
+        </a:solidFill>
+        <a:latin typeface="+mn-lt"/>
+        <a:ea typeface="+mn-ea"/>
+        <a:cs typeface="+mn-cs"/>
+      </a:defRPr>
+    </a:lvl8pPr>
+    <a:lvl9pPr marL="3657600" algn="l" defTabSz="914400" rtl="0" eaLnBrk="1" latinLnBrk="0" hangingPunct="1">
+      <a:defRPr sz="1200" kern="1200">
+        <a:solidFill>
+          <a:schemeClr val="tx1"/>
+        </a:solidFill>
+        <a:latin typeface="+mn-lt"/>
+        <a:ea typeface="+mn-ea"/>
+        <a:cs typeface="+mn-cs"/>
+      </a:defRPr>
+    </a:lvl9pPr>
+  </p:notesStyle>
+</p:notesMaster>
+</file>
+
+<file path=ppt/notesSlides/notesSlide1.xml><?xml version="1.0" encoding="utf-8"?>
+<p:notes xmlns:a="http://schemas.openxmlformats.org/drawingml/2006/main" xmlns:r="http://schemas.openxmlformats.org/officeDocument/2006/relationships" xmlns:p="http://schemas.openxmlformats.org/presentationml/2006/main">
+  <p:cSld>
+    <p:spTree>
+      <p:nvGrpSpPr>
+        <p:cNvPr id="1" name=""/>
+        <p:cNvGrpSpPr/>
+        <p:nvPr/>
+      </p:nvGrpSpPr>
+      <p:grpSpPr>
+        <a:xfrm>
+          <a:off x="0" y="0"/>
+          <a:ext cx="0" cy="0"/>
+          <a:chOff x="0" y="0"/>
+          <a:chExt cx="0" cy="0"/>
+        </a:xfrm>
+      </p:grpSpPr>
+      <p:sp>
+        <p:nvSpPr>
+          <p:cNvPr id="2" name="Slide Image Placeholder 1"/>
+          <p:cNvSpPr>
+            <a:spLocks noGrp="1" noRot="1" noChangeAspect="1"/>
+          </p:cNvSpPr>
+          <p:nvPr>
+            <p:ph type="sldImg"/>
+          </p:nvPr>
+        </p:nvSpPr>
+        <p:spPr/>
+      </p:sp>
+      <p:sp>
+        <p:nvSpPr>
+          <p:cNvPr id="3" name="Notes Placeholder 2"/>
+          <p:cNvSpPr>
+            <a:spLocks noGrp="1"/>
+          </p:cNvSpPr>
+          <p:nvPr>
+            <p:ph type="body" idx="1"/>
+          </p:nvPr>
+        </p:nvSpPr>
+        <p:spPr/>
+        <p:txBody>
+          <a:bodyPr/>
+          <a:lstStyle/>
+          <a:p>
+            <a:endParaRPr lang="en-US" dirty="0"/>
+          </a:p>
+        </p:txBody>
+      </p:sp>
+      <p:sp>
+        <p:nvSpPr>
+          <p:cNvPr id="4" name="Slide Number Placeholder 3"/>
+          <p:cNvSpPr>
+            <a:spLocks noGrp="1"/>
+          </p:cNvSpPr>
+          <p:nvPr>
+            <p:ph type="sldNum" sz="quarter" idx="5"/>
+          </p:nvPr>
+        </p:nvSpPr>
+        <p:spPr/>
+        <p:txBody>
+          <a:bodyPr/>
+          <a:lstStyle/>
+          <a:p>
+            <a:fld id="{35CC1191-9195-4567-9772-6650F3FD5645}" type="slidenum">
+              <a:rPr lang="en-US" smtClean="0"/>
+              <a:t>2</a:t>
+            </a:fld>
+            <a:endParaRPr lang="en-US"/>
+          </a:p>
+        </p:txBody>
+      </p:sp>
+    </p:spTree>
+    <p:extLst>
+      <p:ext uri="{BB962C8B-B14F-4D97-AF65-F5344CB8AC3E}">
+        <p14:creationId xmlns:p14="http://schemas.microsoft.com/office/powerpoint/2010/main" val="2433681826"/>
+      </p:ext>
+    </p:extLst>
+  </p:cSld>
+  <p:clrMapOvr>
+    <a:masterClrMapping/>
+  </p:clrMapOvr>
+</p:notes>
 </file>
 
 <file path=ppt/slideLayouts/slideLayout1.xml><?xml version="1.0" encoding="utf-8"?>
@@ -259,7 +702,7 @@
           <a:p>
             <a:fld id="{20A8D724-863C-4E31-9FD3-04A6151526C2}" type="datetimeFigureOut">
               <a:rPr lang="en-US" smtClean="0"/>
-              <a:t>5/15/2022</a:t>
+              <a:t>5/16/2022</a:t>
             </a:fld>
             <a:endParaRPr lang="en-US"/>
           </a:p>
@@ -457,7 +900,7 @@
           <a:p>
             <a:fld id="{20A8D724-863C-4E31-9FD3-04A6151526C2}" type="datetimeFigureOut">
               <a:rPr lang="en-US" smtClean="0"/>
-              <a:t>5/15/2022</a:t>
+              <a:t>5/16/2022</a:t>
             </a:fld>
             <a:endParaRPr lang="en-US"/>
           </a:p>
@@ -665,7 +1108,7 @@
           <a:p>
             <a:fld id="{20A8D724-863C-4E31-9FD3-04A6151526C2}" type="datetimeFigureOut">
               <a:rPr lang="en-US" smtClean="0"/>
-              <a:t>5/15/2022</a:t>
+              <a:t>5/16/2022</a:t>
             </a:fld>
             <a:endParaRPr lang="en-US"/>
           </a:p>
@@ -863,7 +1306,7 @@
           <a:p>
             <a:fld id="{20A8D724-863C-4E31-9FD3-04A6151526C2}" type="datetimeFigureOut">
               <a:rPr lang="en-US" smtClean="0"/>
-              <a:t>5/15/2022</a:t>
+              <a:t>5/16/2022</a:t>
             </a:fld>
             <a:endParaRPr lang="en-US"/>
           </a:p>
@@ -1138,7 +1581,7 @@
           <a:p>
             <a:fld id="{20A8D724-863C-4E31-9FD3-04A6151526C2}" type="datetimeFigureOut">
               <a:rPr lang="en-US" smtClean="0"/>
-              <a:t>5/15/2022</a:t>
+              <a:t>5/16/2022</a:t>
             </a:fld>
             <a:endParaRPr lang="en-US"/>
           </a:p>
@@ -1403,7 +1846,7 @@
           <a:p>
             <a:fld id="{20A8D724-863C-4E31-9FD3-04A6151526C2}" type="datetimeFigureOut">
               <a:rPr lang="en-US" smtClean="0"/>
-              <a:t>5/15/2022</a:t>
+              <a:t>5/16/2022</a:t>
             </a:fld>
             <a:endParaRPr lang="en-US"/>
           </a:p>
@@ -1815,7 +2258,7 @@
           <a:p>
             <a:fld id="{20A8D724-863C-4E31-9FD3-04A6151526C2}" type="datetimeFigureOut">
               <a:rPr lang="en-US" smtClean="0"/>
-              <a:t>5/15/2022</a:t>
+              <a:t>5/16/2022</a:t>
             </a:fld>
             <a:endParaRPr lang="en-US"/>
           </a:p>
@@ -1956,7 +2399,7 @@
           <a:p>
             <a:fld id="{20A8D724-863C-4E31-9FD3-04A6151526C2}" type="datetimeFigureOut">
               <a:rPr lang="en-US" smtClean="0"/>
-              <a:t>5/15/2022</a:t>
+              <a:t>5/16/2022</a:t>
             </a:fld>
             <a:endParaRPr lang="en-US"/>
           </a:p>
@@ -2069,7 +2512,7 @@
           <a:p>
             <a:fld id="{20A8D724-863C-4E31-9FD3-04A6151526C2}" type="datetimeFigureOut">
               <a:rPr lang="en-US" smtClean="0"/>
-              <a:t>5/15/2022</a:t>
+              <a:t>5/16/2022</a:t>
             </a:fld>
             <a:endParaRPr lang="en-US"/>
           </a:p>
@@ -2380,7 +2823,7 @@
           <a:p>
             <a:fld id="{20A8D724-863C-4E31-9FD3-04A6151526C2}" type="datetimeFigureOut">
               <a:rPr lang="en-US" smtClean="0"/>
-              <a:t>5/15/2022</a:t>
+              <a:t>5/16/2022</a:t>
             </a:fld>
             <a:endParaRPr lang="en-US"/>
           </a:p>
@@ -2668,7 +3111,7 @@
           <a:p>
             <a:fld id="{20A8D724-863C-4E31-9FD3-04A6151526C2}" type="datetimeFigureOut">
               <a:rPr lang="en-US" smtClean="0"/>
-              <a:t>5/15/2022</a:t>
+              <a:t>5/16/2022</a:t>
             </a:fld>
             <a:endParaRPr lang="en-US"/>
           </a:p>
@@ -2909,7 +3352,7 @@
           <a:p>
             <a:fld id="{20A8D724-863C-4E31-9FD3-04A6151526C2}" type="datetimeFigureOut">
               <a:rPr lang="en-US" smtClean="0"/>
-              <a:t>5/15/2022</a:t>
+              <a:t>5/16/2022</a:t>
             </a:fld>
             <a:endParaRPr lang="en-US"/>
           </a:p>
@@ -3388,48 +3831,57 @@
         </p:nvSpPr>
         <p:spPr/>
         <p:txBody>
-          <a:bodyPr/>
+          <a:bodyPr>
+            <a:noAutofit/>
+          </a:bodyPr>
           <a:lstStyle/>
           <a:p>
             <a:r>
-              <a:rPr lang="en-US" sz="1800" b="0" i="0" dirty="0">
+              <a:rPr lang="en-US" b="0" i="0" dirty="0">
                 <a:solidFill>
                   <a:srgbClr val="000000"/>
                 </a:solidFill>
                 <a:effectLst/>
-                <a:latin typeface="Calibri" panose="020F0502020204030204" pitchFamily="34" charset="0"/>
               </a:rPr>
               <a:t>Introduction to High Performance Machine Learning (ECE-GY 9143)</a:t>
             </a:r>
             <a:br>
-              <a:rPr lang="en-US" sz="1800" b="0" i="0" dirty="0">
+              <a:rPr lang="en-US" b="0" i="0" dirty="0">
                 <a:solidFill>
                   <a:srgbClr val="000000"/>
                 </a:solidFill>
                 <a:effectLst/>
-                <a:latin typeface="Calibri" panose="020F0502020204030204" pitchFamily="34" charset="0"/>
               </a:rPr>
             </a:br>
             <a:br>
               <a:rPr lang="en-US" dirty="0"/>
             </a:br>
             <a:r>
-              <a:rPr lang="en-US" sz="1800" b="0" i="0" dirty="0">
+              <a:rPr lang="en-US" b="0" i="0" dirty="0">
                 <a:solidFill>
                   <a:srgbClr val="000000"/>
                 </a:solidFill>
                 <a:effectLst/>
-                <a:latin typeface="Calibri" panose="020F0502020204030204" pitchFamily="34" charset="0"/>
               </a:rPr>
-              <a:t>Ghulam Mujtaba gm2667</a:t>
-            </a:r>
-            <a:br>
-              <a:rPr lang="en-US" sz="1800" b="0" i="0" dirty="0">
+              <a:t>Ghulam Mujtaba </a:t>
+            </a:r>
+          </a:p>
+          <a:p>
+            <a:r>
+              <a:rPr lang="en-US" b="0" i="0" dirty="0">
                 <a:solidFill>
                   <a:srgbClr val="000000"/>
                 </a:solidFill>
                 <a:effectLst/>
-                <a:latin typeface="Calibri" panose="020F0502020204030204" pitchFamily="34" charset="0"/>
+              </a:rPr>
+              <a:t>gm2667</a:t>
+            </a:r>
+            <a:br>
+              <a:rPr lang="en-US" b="0" i="0" dirty="0">
+                <a:solidFill>
+                  <a:srgbClr val="000000"/>
+                </a:solidFill>
+                <a:effectLst/>
               </a:rPr>
             </a:br>
             <a:br>
@@ -3525,10 +3977,86 @@
         </p:nvSpPr>
         <p:spPr/>
         <p:txBody>
-          <a:bodyPr/>
+          <a:bodyPr>
+            <a:normAutofit/>
+          </a:bodyPr>
           <a:lstStyle/>
           <a:p>
-            <a:endParaRPr lang="en-US"/>
+            <a:r>
+              <a:rPr lang="en-US" sz="2800" b="0" i="0" dirty="0">
+                <a:solidFill>
+                  <a:srgbClr val="000000"/>
+                </a:solidFill>
+                <a:effectLst/>
+                <a:latin typeface="Calibri" panose="020F0502020204030204" pitchFamily="34" charset="0"/>
+              </a:rPr>
+              <a:t>Pytorch is primarily used through its python interface although most of the underlying high-performance code is written in C++.</a:t>
+            </a:r>
+            <a:r>
+              <a:rPr lang="en-US" dirty="0"/>
+              <a:t> </a:t>
+            </a:r>
+          </a:p>
+          <a:p>
+            <a:r>
+              <a:rPr lang="en-US" sz="2800" b="0" i="0" dirty="0">
+                <a:solidFill>
+                  <a:srgbClr val="000000"/>
+                </a:solidFill>
+                <a:effectLst/>
+                <a:latin typeface="Calibri" panose="020F0502020204030204" pitchFamily="34" charset="0"/>
+              </a:rPr>
+              <a:t>A C++ interface called </a:t>
+            </a:r>
+            <a:r>
+              <a:rPr lang="en-US" dirty="0" err="1">
+                <a:solidFill>
+                  <a:srgbClr val="000000"/>
+                </a:solidFill>
+                <a:latin typeface="Calibri" panose="020F0502020204030204" pitchFamily="34" charset="0"/>
+              </a:rPr>
+              <a:t>L</a:t>
+            </a:r>
+            <a:r>
+              <a:rPr lang="en-US" sz="2800" b="0" i="0" dirty="0" err="1">
+                <a:solidFill>
+                  <a:srgbClr val="000000"/>
+                </a:solidFill>
+                <a:effectLst/>
+                <a:latin typeface="Calibri" panose="020F0502020204030204" pitchFamily="34" charset="0"/>
+              </a:rPr>
+              <a:t>ibTorch</a:t>
+            </a:r>
+            <a:r>
+              <a:rPr lang="en-US" sz="2800" b="0" i="0" dirty="0">
+                <a:solidFill>
+                  <a:srgbClr val="000000"/>
+                </a:solidFill>
+                <a:effectLst/>
+                <a:latin typeface="Calibri" panose="020F0502020204030204" pitchFamily="34" charset="0"/>
+              </a:rPr>
+              <a:t> for Pytorch is also available that exposes the underlying codebase. There are many cases where a need arises for the use of C++ instead of the primary python API to meet project needs, such as in Low latency operation for robotics, stock trading etc.</a:t>
+            </a:r>
+            <a:r>
+              <a:rPr lang="en-US" dirty="0"/>
+              <a:t> </a:t>
+            </a:r>
+          </a:p>
+          <a:p>
+            <a:r>
+              <a:rPr lang="en-US" sz="2800" b="0" i="0" dirty="0">
+                <a:solidFill>
+                  <a:srgbClr val="000000"/>
+                </a:solidFill>
+                <a:effectLst/>
+                <a:latin typeface="Calibri" panose="020F0502020204030204" pitchFamily="34" charset="0"/>
+              </a:rPr>
+              <a:t>The goal of this project is to compare the performance of the two API and provide a quantitative comparison that can be used to make choices on when and where to use the different API’s.</a:t>
+            </a:r>
+            <a:r>
+              <a:rPr lang="en-US" dirty="0"/>
+              <a:t> </a:t>
+            </a:r>
           </a:p>
         </p:txBody>
       </p:sp>
@@ -3567,7 +4095,7 @@
           <p:cNvPr id="2" name="Title 1">
             <a:extLst>
               <a:ext uri="{FF2B5EF4-FFF2-40B4-BE49-F238E27FC236}">
-                <a16:creationId xmlns:a16="http://schemas.microsoft.com/office/drawing/2014/main" id="{E7708A47-2F3F-4395-B7BC-D99F5FD7C2FF}"/>
+                <a16:creationId xmlns:a16="http://schemas.microsoft.com/office/drawing/2014/main" id="{BD8F129D-2593-D620-3582-27BAAC2CACEB}"/>
               </a:ext>
             </a:extLst>
           </p:cNvPr>
@@ -3584,16 +4112,9 @@
           <a:lstStyle/>
           <a:p>
             <a:r>
-              <a:rPr lang="en-US" b="0" i="0" dirty="0">
-                <a:solidFill>
-                  <a:srgbClr val="494C4E"/>
-                </a:solidFill>
-                <a:effectLst/>
-                <a:latin typeface="Lato" panose="020F0502020204030203" pitchFamily="34" charset="0"/>
-              </a:rPr>
-              <a:t>Approach</a:t>
-            </a:r>
-            <a:endParaRPr lang="en-US" dirty="0"/>
+              <a:rPr lang="en-US" dirty="0"/>
+              <a:t>Reasons for using Pytorch with C++</a:t>
+            </a:r>
           </a:p>
         </p:txBody>
       </p:sp>
@@ -3602,7 +4123,7 @@
           <p:cNvPr id="3" name="Content Placeholder 2">
             <a:extLst>
               <a:ext uri="{FF2B5EF4-FFF2-40B4-BE49-F238E27FC236}">
-                <a16:creationId xmlns:a16="http://schemas.microsoft.com/office/drawing/2014/main" id="{81037582-89D7-FBFB-CA75-E84655F690E4}"/>
+                <a16:creationId xmlns:a16="http://schemas.microsoft.com/office/drawing/2014/main" id="{9AF5E67D-A186-61B4-2DDA-D07D62508D18}"/>
               </a:ext>
             </a:extLst>
           </p:cNvPr>
@@ -3615,17 +4136,124 @@
         </p:nvSpPr>
         <p:spPr/>
         <p:txBody>
-          <a:bodyPr/>
+          <a:bodyPr>
+            <a:normAutofit fontScale="85000" lnSpcReduction="10000"/>
+          </a:bodyPr>
           <a:lstStyle/>
           <a:p>
-            <a:endParaRPr lang="en-US"/>
+            <a:r>
+              <a:rPr lang="en-US" sz="2800" b="1" i="0" dirty="0">
+                <a:solidFill>
+                  <a:srgbClr val="000000"/>
+                </a:solidFill>
+                <a:effectLst/>
+                <a:latin typeface="Calibri-Bold"/>
+              </a:rPr>
+              <a:t>Low Latency Systems: </a:t>
+            </a:r>
+            <a:r>
+              <a:rPr lang="en-US" sz="2800" b="0" i="0" dirty="0">
+                <a:solidFill>
+                  <a:srgbClr val="000000"/>
+                </a:solidFill>
+                <a:effectLst/>
+                <a:latin typeface="Calibri" panose="020F0502020204030204" pitchFamily="34" charset="0"/>
+              </a:rPr>
+              <a:t>For real time applications such as self-driving cars, game AI and other real-time projects the need lower latency, pure C++ is a much better fit here as compared to the latency limitations of the python interpreter.</a:t>
+            </a:r>
+            <a:r>
+              <a:rPr lang="en-US" dirty="0"/>
+              <a:t> </a:t>
+            </a:r>
+          </a:p>
+          <a:p>
+            <a:r>
+              <a:rPr lang="en-US" sz="2800" b="1" i="0" dirty="0">
+                <a:solidFill>
+                  <a:srgbClr val="000000"/>
+                </a:solidFill>
+                <a:effectLst/>
+                <a:latin typeface="Calibri-Bold"/>
+              </a:rPr>
+              <a:t>Highly Multithreaded Environments: </a:t>
+            </a:r>
+            <a:r>
+              <a:rPr lang="en-US" sz="2800" b="0" i="0" dirty="0">
+                <a:solidFill>
+                  <a:srgbClr val="000000"/>
+                </a:solidFill>
+                <a:effectLst/>
+                <a:latin typeface="Calibri" panose="020F0502020204030204" pitchFamily="34" charset="0"/>
+              </a:rPr>
+              <a:t>The Global Interpreter Lock (GIL) in python prevents it from running more than one thread at a time. Multiprocessing is available but it is not as scalable and has some shortcomings. C++ is not limited by such constraints so for application where the models require heavy penalization such as Deep </a:t>
+            </a:r>
+            <a:r>
+              <a:rPr lang="en-US" sz="2800" b="0" i="0" dirty="0" err="1">
+                <a:solidFill>
+                  <a:srgbClr val="000000"/>
+                </a:solidFill>
+                <a:effectLst/>
+                <a:latin typeface="Calibri" panose="020F0502020204030204" pitchFamily="34" charset="0"/>
+              </a:rPr>
+              <a:t>Neuroevolution</a:t>
+            </a:r>
+            <a:r>
+              <a:rPr lang="en-US" sz="2800" b="0" i="0" dirty="0">
+                <a:solidFill>
+                  <a:srgbClr val="000000"/>
+                </a:solidFill>
+                <a:effectLst/>
+                <a:latin typeface="Calibri" panose="020F0502020204030204" pitchFamily="34" charset="0"/>
+              </a:rPr>
+              <a:t>, this can benefit.</a:t>
+            </a:r>
+            <a:r>
+              <a:rPr lang="en-US" dirty="0"/>
+              <a:t> </a:t>
+            </a:r>
+          </a:p>
+          <a:p>
+            <a:r>
+              <a:rPr lang="en-US" sz="2800" b="1" i="0" dirty="0">
+                <a:solidFill>
+                  <a:srgbClr val="000000"/>
+                </a:solidFill>
+                <a:effectLst/>
+                <a:latin typeface="Calibri-Bold"/>
+              </a:rPr>
+              <a:t>Existing C++ Codebases: </a:t>
+            </a:r>
+            <a:r>
+              <a:rPr lang="en-US" sz="2800" b="0" i="0" dirty="0">
+                <a:solidFill>
+                  <a:srgbClr val="000000"/>
+                </a:solidFill>
+                <a:effectLst/>
+                <a:latin typeface="Calibri" panose="020F0502020204030204" pitchFamily="34" charset="0"/>
+              </a:rPr>
+              <a:t>Many existing projects have existing C++ code bases, and it is more convenient to keep everything in on language as supposed to binding C++ and python. Using C++ throughout the project is a more elegant solution.</a:t>
+            </a:r>
+            <a:r>
+              <a:rPr lang="en-US" dirty="0"/>
+              <a:t> </a:t>
+            </a:r>
+            <a:br>
+              <a:rPr lang="en-US" dirty="0"/>
+            </a:br>
+            <a:endParaRPr lang="en-US" dirty="0"/>
+          </a:p>
+          <a:p>
+            <a:endParaRPr lang="en-US" dirty="0"/>
+          </a:p>
+          <a:p>
+            <a:endParaRPr lang="en-US" dirty="0"/>
           </a:p>
         </p:txBody>
       </p:sp>
     </p:spTree>
     <p:extLst>
       <p:ext uri="{BB962C8B-B14F-4D97-AF65-F5344CB8AC3E}">
-        <p14:creationId xmlns:p14="http://schemas.microsoft.com/office/powerpoint/2010/main" val="3742186369"/>
+        <p14:creationId xmlns:p14="http://schemas.microsoft.com/office/powerpoint/2010/main" val="333725509"/>
       </p:ext>
     </p:extLst>
   </p:cSld>
@@ -3657,7 +4285,7 @@
           <p:cNvPr id="2" name="Title 1">
             <a:extLst>
               <a:ext uri="{FF2B5EF4-FFF2-40B4-BE49-F238E27FC236}">
-                <a16:creationId xmlns:a16="http://schemas.microsoft.com/office/drawing/2014/main" id="{CE56A45B-35D1-53E7-FE82-D16B623B939E}"/>
+                <a16:creationId xmlns:a16="http://schemas.microsoft.com/office/drawing/2014/main" id="{E7708A47-2F3F-4395-B7BC-D99F5FD7C2FF}"/>
               </a:ext>
             </a:extLst>
           </p:cNvPr>
@@ -3670,9 +4298,7 @@
         </p:nvSpPr>
         <p:spPr/>
         <p:txBody>
-          <a:bodyPr>
-            <a:normAutofit/>
-          </a:bodyPr>
+          <a:bodyPr/>
           <a:lstStyle/>
           <a:p>
             <a:r>
@@ -3683,7 +4309,7 @@
                 <a:effectLst/>
                 <a:latin typeface="Lato" panose="020F0502020204030203" pitchFamily="34" charset="0"/>
               </a:rPr>
-              <a:t>Main results</a:t>
+              <a:t>Approach</a:t>
             </a:r>
             <a:endParaRPr lang="en-US" dirty="0"/>
           </a:p>
@@ -3694,7 +4320,7 @@
           <p:cNvPr id="3" name="Content Placeholder 2">
             <a:extLst>
               <a:ext uri="{FF2B5EF4-FFF2-40B4-BE49-F238E27FC236}">
-                <a16:creationId xmlns:a16="http://schemas.microsoft.com/office/drawing/2014/main" id="{1244658D-C0E6-AEC7-5D94-D214419FAD26}"/>
+                <a16:creationId xmlns:a16="http://schemas.microsoft.com/office/drawing/2014/main" id="{81037582-89D7-FBFB-CA75-E84655F690E4}"/>
               </a:ext>
             </a:extLst>
           </p:cNvPr>
@@ -3707,17 +4333,54 @@
         </p:nvSpPr>
         <p:spPr/>
         <p:txBody>
-          <a:bodyPr/>
+          <a:bodyPr>
+            <a:normAutofit fontScale="92500" lnSpcReduction="10000"/>
+          </a:bodyPr>
           <a:lstStyle/>
           <a:p>
-            <a:endParaRPr lang="en-US"/>
+            <a:r>
+              <a:rPr lang="en-US" dirty="0"/>
+              <a:t>ResNet18 and ResNet34 image classification models were trained for 50 epochs and  benchmarked using the CIFAR dataset.</a:t>
+            </a:r>
+          </a:p>
+          <a:p>
+            <a:r>
+              <a:rPr lang="en-US" dirty="0"/>
+              <a:t>Care was taken to ensure that both the python and C++ implementations are as close to each other as possible, e.g. the batch size, the learning rates, number of workers, </a:t>
+            </a:r>
+            <a:r>
+              <a:rPr lang="en-US" dirty="0" err="1"/>
+              <a:t>LibTorch</a:t>
+            </a:r>
+            <a:r>
+              <a:rPr lang="en-US" dirty="0"/>
+              <a:t> does not have a learning rate scheduler so had to remove that from the python implementation as well etc.</a:t>
+            </a:r>
+          </a:p>
+          <a:p>
+            <a:r>
+              <a:rPr lang="en-US" dirty="0"/>
+              <a:t>Added logging to a file capability to log the epoch number, Per epoch time, the training/testing loss and top 1% accuracy.</a:t>
+            </a:r>
+          </a:p>
+          <a:p>
+            <a:r>
+              <a:rPr lang="en-US" dirty="0"/>
+              <a:t>Added latency measurement functionality to the python code.</a:t>
+            </a:r>
+          </a:p>
+          <a:p>
+            <a:r>
+              <a:rPr lang="en-US" dirty="0"/>
+              <a:t>This was all run in a docker container, and a bash script was written to run the entire experiment with a single command. </a:t>
+            </a:r>
           </a:p>
         </p:txBody>
       </p:sp>
     </p:spTree>
     <p:extLst>
       <p:ext uri="{BB962C8B-B14F-4D97-AF65-F5344CB8AC3E}">
-        <p14:creationId xmlns:p14="http://schemas.microsoft.com/office/powerpoint/2010/main" val="3147592132"/>
+        <p14:creationId xmlns:p14="http://schemas.microsoft.com/office/powerpoint/2010/main" val="3742186369"/>
       </p:ext>
     </p:extLst>
   </p:cSld>
@@ -3768,16 +4431,9 @@
           <a:lstStyle/>
           <a:p>
             <a:r>
-              <a:rPr lang="en-US" b="0" i="0" dirty="0">
-                <a:solidFill>
-                  <a:srgbClr val="494C4E"/>
-                </a:solidFill>
-                <a:effectLst/>
-                <a:latin typeface="Lato" panose="020F0502020204030203" pitchFamily="34" charset="0"/>
-              </a:rPr>
-              <a:t>Observations/conclusion</a:t>
-            </a:r>
-            <a:endParaRPr lang="en-US" dirty="0"/>
+              <a:rPr lang="en-US" dirty="0"/>
+              <a:t>Main Results</a:t>
+            </a:r>
           </a:p>
         </p:txBody>
       </p:sp>
@@ -3799,13 +4455,3193 @@
         </p:nvSpPr>
         <p:spPr/>
         <p:txBody>
-          <a:bodyPr/>
+          <a:bodyPr>
+            <a:normAutofit fontScale="85000" lnSpcReduction="20000"/>
+          </a:bodyPr>
           <a:lstStyle/>
           <a:p>
-            <a:endParaRPr lang="en-US"/>
+            <a:r>
+              <a:rPr lang="en-US" dirty="0"/>
+              <a:t>The results from the experiment are as following:</a:t>
+            </a:r>
+          </a:p>
+          <a:p>
+            <a:endParaRPr lang="en-US" dirty="0"/>
+          </a:p>
+          <a:p>
+            <a:endParaRPr lang="en-US" dirty="0"/>
+          </a:p>
+          <a:p>
+            <a:endParaRPr lang="en-US" dirty="0"/>
+          </a:p>
+          <a:p>
+            <a:endParaRPr lang="en-US" dirty="0"/>
+          </a:p>
+          <a:p>
+            <a:r>
+              <a:rPr lang="en-US" dirty="0"/>
+              <a:t>This experiment was conducted in a docker container running on an AMD Ryzen 9 5900HS (16 CPUs)~3.3GHz, 16 GB RAM and NVIDIA GeForce RTX 3070 Laptop GPU.</a:t>
+            </a:r>
+          </a:p>
+          <a:p>
+            <a:pPr marL="0" indent="0">
+              <a:buNone/>
+            </a:pPr>
+            <a:r>
+              <a:rPr lang="en-US" dirty="0"/>
+              <a:t>  </a:t>
+            </a:r>
+          </a:p>
+          <a:p>
+            <a:endParaRPr lang="en-US" dirty="0"/>
+          </a:p>
+          <a:p>
+            <a:pPr marL="0" indent="0">
+              <a:buNone/>
+            </a:pPr>
+            <a:endParaRPr lang="en-US" dirty="0"/>
+          </a:p>
+          <a:p>
+            <a:pPr marL="0" indent="0">
+              <a:buNone/>
+            </a:pPr>
+            <a:r>
+              <a:rPr lang="en-US" dirty="0"/>
+              <a:t> </a:t>
+            </a:r>
           </a:p>
         </p:txBody>
       </p:sp>
+      <p:graphicFrame>
+        <p:nvGraphicFramePr>
+          <p:cNvPr id="7" name="Table 6">
+            <a:extLst>
+              <a:ext uri="{FF2B5EF4-FFF2-40B4-BE49-F238E27FC236}">
+                <a16:creationId xmlns:a16="http://schemas.microsoft.com/office/drawing/2014/main" id="{0DD28871-8707-7042-0131-BF2E05E16670}"/>
+              </a:ext>
+            </a:extLst>
+          </p:cNvPr>
+          <p:cNvGraphicFramePr>
+            <a:graphicFrameLocks noGrp="1"/>
+          </p:cNvGraphicFramePr>
+          <p:nvPr>
+            <p:extLst>
+              <p:ext uri="{D42A27DB-BD31-4B8C-83A1-F6EECF244321}">
+                <p14:modId xmlns:p14="http://schemas.microsoft.com/office/powerpoint/2010/main" val="1283731795"/>
+              </p:ext>
+            </p:extLst>
+          </p:nvPr>
+        </p:nvGraphicFramePr>
+        <p:xfrm>
+          <a:off x="718395" y="2297678"/>
+          <a:ext cx="10755210" cy="1325564"/>
+        </p:xfrm>
+        <a:graphic>
+          <a:graphicData uri="http://schemas.openxmlformats.org/drawingml/2006/table">
+            <a:tbl>
+              <a:tblPr/>
+              <a:tblGrid>
+                <a:gridCol w="1475684">
+                  <a:extLst>
+                    <a:ext uri="{9D8B030D-6E8A-4147-A177-3AD203B41FA5}">
+                      <a16:colId xmlns:a16="http://schemas.microsoft.com/office/drawing/2014/main" val="4224835377"/>
+                    </a:ext>
+                  </a:extLst>
+                </a:gridCol>
+                <a:gridCol w="1688395">
+                  <a:extLst>
+                    <a:ext uri="{9D8B030D-6E8A-4147-A177-3AD203B41FA5}">
+                      <a16:colId xmlns:a16="http://schemas.microsoft.com/office/drawing/2014/main" val="3866065415"/>
+                    </a:ext>
+                  </a:extLst>
+                </a:gridCol>
+                <a:gridCol w="1342739">
+                  <a:extLst>
+                    <a:ext uri="{9D8B030D-6E8A-4147-A177-3AD203B41FA5}">
+                      <a16:colId xmlns:a16="http://schemas.microsoft.com/office/drawing/2014/main" val="2372788720"/>
+                    </a:ext>
+                  </a:extLst>
+                </a:gridCol>
+                <a:gridCol w="1914401">
+                  <a:extLst>
+                    <a:ext uri="{9D8B030D-6E8A-4147-A177-3AD203B41FA5}">
+                      <a16:colId xmlns:a16="http://schemas.microsoft.com/office/drawing/2014/main" val="2759786346"/>
+                    </a:ext>
+                  </a:extLst>
+                </a:gridCol>
+                <a:gridCol w="997084">
+                  <a:extLst>
+                    <a:ext uri="{9D8B030D-6E8A-4147-A177-3AD203B41FA5}">
+                      <a16:colId xmlns:a16="http://schemas.microsoft.com/office/drawing/2014/main" val="1963253613"/>
+                    </a:ext>
+                  </a:extLst>
+                </a:gridCol>
+                <a:gridCol w="1409212">
+                  <a:extLst>
+                    <a:ext uri="{9D8B030D-6E8A-4147-A177-3AD203B41FA5}">
+                      <a16:colId xmlns:a16="http://schemas.microsoft.com/office/drawing/2014/main" val="4053531358"/>
+                    </a:ext>
+                  </a:extLst>
+                </a:gridCol>
+                <a:gridCol w="757783">
+                  <a:extLst>
+                    <a:ext uri="{9D8B030D-6E8A-4147-A177-3AD203B41FA5}">
+                      <a16:colId xmlns:a16="http://schemas.microsoft.com/office/drawing/2014/main" val="2072936117"/>
+                    </a:ext>
+                  </a:extLst>
+                </a:gridCol>
+                <a:gridCol w="1169912">
+                  <a:extLst>
+                    <a:ext uri="{9D8B030D-6E8A-4147-A177-3AD203B41FA5}">
+                      <a16:colId xmlns:a16="http://schemas.microsoft.com/office/drawing/2014/main" val="3407009679"/>
+                    </a:ext>
+                  </a:extLst>
+                </a:gridCol>
+              </a:tblGrid>
+              <a:tr h="448468">
+                <a:tc>
+                  <a:txBody>
+                    <a:bodyPr/>
+                    <a:lstStyle/>
+                    <a:p>
+                      <a:pPr algn="ctr" fontAlgn="ctr"/>
+                      <a:r>
+                        <a:rPr lang="en-US" sz="1100" b="1" i="0" u="none" strike="noStrike">
+                          <a:solidFill>
+                            <a:srgbClr val="FFFFFF"/>
+                          </a:solidFill>
+                          <a:effectLst/>
+                          <a:latin typeface="Calibri" panose="020F0502020204030204" pitchFamily="34" charset="0"/>
+                        </a:rPr>
+                        <a:t>Language and Model</a:t>
+                      </a:r>
+                    </a:p>
+                  </a:txBody>
+                  <a:tcPr marL="6350" marR="6350" marT="6350" marB="0" anchor="ctr">
+                    <a:lnL w="6350" cap="flat" cmpd="sng" algn="ctr">
+                      <a:solidFill>
+                        <a:srgbClr val="000000"/>
+                      </a:solidFill>
+                      <a:prstDash val="solid"/>
+                      <a:round/>
+                      <a:headEnd type="none" w="med" len="med"/>
+                      <a:tailEnd type="none" w="med" len="med"/>
+                    </a:lnL>
+                    <a:lnR w="6350" cap="flat" cmpd="sng" algn="ctr">
+                      <a:solidFill>
+                        <a:srgbClr val="000000"/>
+                      </a:solidFill>
+                      <a:prstDash val="solid"/>
+                      <a:round/>
+                      <a:headEnd type="none" w="med" len="med"/>
+                      <a:tailEnd type="none" w="med" len="med"/>
+                    </a:lnR>
+                    <a:lnT w="6350" cap="flat" cmpd="sng" algn="ctr">
+                      <a:solidFill>
+                        <a:srgbClr val="000000"/>
+                      </a:solidFill>
+                      <a:prstDash val="solid"/>
+                      <a:round/>
+                      <a:headEnd type="none" w="med" len="med"/>
+                      <a:tailEnd type="none" w="med" len="med"/>
+                    </a:lnT>
+                    <a:lnB w="6350" cap="flat" cmpd="sng" algn="ctr">
+                      <a:solidFill>
+                        <a:srgbClr val="000000"/>
+                      </a:solidFill>
+                      <a:prstDash val="solid"/>
+                      <a:round/>
+                      <a:headEnd type="none" w="med" len="med"/>
+                      <a:tailEnd type="none" w="med" len="med"/>
+                    </a:lnB>
+                    <a:solidFill>
+                      <a:srgbClr val="4472C4"/>
+                    </a:solidFill>
+                  </a:tcPr>
+                </a:tc>
+                <a:tc>
+                  <a:txBody>
+                    <a:bodyPr/>
+                    <a:lstStyle/>
+                    <a:p>
+                      <a:pPr algn="ctr" fontAlgn="ctr"/>
+                      <a:r>
+                        <a:rPr lang="en-US" sz="1100" b="1" i="0" u="none" strike="noStrike">
+                          <a:solidFill>
+                            <a:srgbClr val="FFFFFF"/>
+                          </a:solidFill>
+                          <a:effectLst/>
+                          <a:latin typeface="Calibri" panose="020F0502020204030204" pitchFamily="34" charset="0"/>
+                        </a:rPr>
+                        <a:t>Total excecution time (s)</a:t>
+                      </a:r>
+                    </a:p>
+                  </a:txBody>
+                  <a:tcPr marL="6350" marR="6350" marT="6350" marB="0" anchor="ctr">
+                    <a:lnL w="6350" cap="flat" cmpd="sng" algn="ctr">
+                      <a:solidFill>
+                        <a:srgbClr val="000000"/>
+                      </a:solidFill>
+                      <a:prstDash val="solid"/>
+                      <a:round/>
+                      <a:headEnd type="none" w="med" len="med"/>
+                      <a:tailEnd type="none" w="med" len="med"/>
+                    </a:lnL>
+                    <a:lnR w="6350" cap="flat" cmpd="sng" algn="ctr">
+                      <a:solidFill>
+                        <a:srgbClr val="000000"/>
+                      </a:solidFill>
+                      <a:prstDash val="solid"/>
+                      <a:round/>
+                      <a:headEnd type="none" w="med" len="med"/>
+                      <a:tailEnd type="none" w="med" len="med"/>
+                    </a:lnR>
+                    <a:lnT w="6350" cap="flat" cmpd="sng" algn="ctr">
+                      <a:solidFill>
+                        <a:srgbClr val="000000"/>
+                      </a:solidFill>
+                      <a:prstDash val="solid"/>
+                      <a:round/>
+                      <a:headEnd type="none" w="med" len="med"/>
+                      <a:tailEnd type="none" w="med" len="med"/>
+                    </a:lnT>
+                    <a:lnB w="6350" cap="flat" cmpd="sng" algn="ctr">
+                      <a:solidFill>
+                        <a:srgbClr val="000000"/>
+                      </a:solidFill>
+                      <a:prstDash val="solid"/>
+                      <a:round/>
+                      <a:headEnd type="none" w="med" len="med"/>
+                      <a:tailEnd type="none" w="med" len="med"/>
+                    </a:lnB>
+                    <a:solidFill>
+                      <a:srgbClr val="4472C4"/>
+                    </a:solidFill>
+                  </a:tcPr>
+                </a:tc>
+                <a:tc>
+                  <a:txBody>
+                    <a:bodyPr/>
+                    <a:lstStyle/>
+                    <a:p>
+                      <a:pPr algn="ctr" fontAlgn="ctr"/>
+                      <a:r>
+                        <a:rPr lang="en-US" sz="1100" b="1" i="0" u="none" strike="noStrike">
+                          <a:solidFill>
+                            <a:srgbClr val="FFFFFF"/>
+                          </a:solidFill>
+                          <a:effectLst/>
+                          <a:latin typeface="Calibri" panose="020F0502020204030204" pitchFamily="34" charset="0"/>
+                        </a:rPr>
+                        <a:t>Time per Epoch (s)</a:t>
+                      </a:r>
+                    </a:p>
+                  </a:txBody>
+                  <a:tcPr marL="6350" marR="6350" marT="6350" marB="0" anchor="ctr">
+                    <a:lnL w="6350" cap="flat" cmpd="sng" algn="ctr">
+                      <a:solidFill>
+                        <a:srgbClr val="000000"/>
+                      </a:solidFill>
+                      <a:prstDash val="solid"/>
+                      <a:round/>
+                      <a:headEnd type="none" w="med" len="med"/>
+                      <a:tailEnd type="none" w="med" len="med"/>
+                    </a:lnL>
+                    <a:lnR w="6350" cap="flat" cmpd="sng" algn="ctr">
+                      <a:solidFill>
+                        <a:srgbClr val="000000"/>
+                      </a:solidFill>
+                      <a:prstDash val="solid"/>
+                      <a:round/>
+                      <a:headEnd type="none" w="med" len="med"/>
+                      <a:tailEnd type="none" w="med" len="med"/>
+                    </a:lnR>
+                    <a:lnT w="6350" cap="flat" cmpd="sng" algn="ctr">
+                      <a:solidFill>
+                        <a:srgbClr val="000000"/>
+                      </a:solidFill>
+                      <a:prstDash val="solid"/>
+                      <a:round/>
+                      <a:headEnd type="none" w="med" len="med"/>
+                      <a:tailEnd type="none" w="med" len="med"/>
+                    </a:lnT>
+                    <a:lnB w="6350" cap="flat" cmpd="sng" algn="ctr">
+                      <a:solidFill>
+                        <a:srgbClr val="000000"/>
+                      </a:solidFill>
+                      <a:prstDash val="solid"/>
+                      <a:round/>
+                      <a:headEnd type="none" w="med" len="med"/>
+                      <a:tailEnd type="none" w="med" len="med"/>
+                    </a:lnB>
+                    <a:solidFill>
+                      <a:srgbClr val="4472C4"/>
+                    </a:solidFill>
+                  </a:tcPr>
+                </a:tc>
+                <a:tc>
+                  <a:txBody>
+                    <a:bodyPr/>
+                    <a:lstStyle/>
+                    <a:p>
+                      <a:pPr algn="ctr" fontAlgn="ctr"/>
+                      <a:r>
+                        <a:rPr lang="en-US" sz="1100" b="1" i="0" u="none" strike="noStrike">
+                          <a:solidFill>
+                            <a:srgbClr val="FFFFFF"/>
+                          </a:solidFill>
+                          <a:effectLst/>
+                          <a:latin typeface="Calibri" panose="020F0502020204030204" pitchFamily="34" charset="0"/>
+                        </a:rPr>
+                        <a:t>Inference Latency image/ms</a:t>
+                      </a:r>
+                    </a:p>
+                  </a:txBody>
+                  <a:tcPr marL="6350" marR="6350" marT="6350" marB="0" anchor="ctr">
+                    <a:lnL w="6350" cap="flat" cmpd="sng" algn="ctr">
+                      <a:solidFill>
+                        <a:srgbClr val="000000"/>
+                      </a:solidFill>
+                      <a:prstDash val="solid"/>
+                      <a:round/>
+                      <a:headEnd type="none" w="med" len="med"/>
+                      <a:tailEnd type="none" w="med" len="med"/>
+                    </a:lnL>
+                    <a:lnR w="6350" cap="flat" cmpd="sng" algn="ctr">
+                      <a:solidFill>
+                        <a:srgbClr val="000000"/>
+                      </a:solidFill>
+                      <a:prstDash val="solid"/>
+                      <a:round/>
+                      <a:headEnd type="none" w="med" len="med"/>
+                      <a:tailEnd type="none" w="med" len="med"/>
+                    </a:lnR>
+                    <a:lnT w="6350" cap="flat" cmpd="sng" algn="ctr">
+                      <a:solidFill>
+                        <a:srgbClr val="000000"/>
+                      </a:solidFill>
+                      <a:prstDash val="solid"/>
+                      <a:round/>
+                      <a:headEnd type="none" w="med" len="med"/>
+                      <a:tailEnd type="none" w="med" len="med"/>
+                    </a:lnT>
+                    <a:lnB w="6350" cap="flat" cmpd="sng" algn="ctr">
+                      <a:solidFill>
+                        <a:srgbClr val="000000"/>
+                      </a:solidFill>
+                      <a:prstDash val="solid"/>
+                      <a:round/>
+                      <a:headEnd type="none" w="med" len="med"/>
+                      <a:tailEnd type="none" w="med" len="med"/>
+                    </a:lnB>
+                    <a:solidFill>
+                      <a:srgbClr val="4472C4"/>
+                    </a:solidFill>
+                  </a:tcPr>
+                </a:tc>
+                <a:tc>
+                  <a:txBody>
+                    <a:bodyPr/>
+                    <a:lstStyle/>
+                    <a:p>
+                      <a:pPr algn="ctr" fontAlgn="ctr"/>
+                      <a:r>
+                        <a:rPr lang="en-US" sz="1100" b="1" i="0" u="none" strike="noStrike">
+                          <a:solidFill>
+                            <a:srgbClr val="FFFFFF"/>
+                          </a:solidFill>
+                          <a:effectLst/>
+                          <a:latin typeface="Calibri" panose="020F0502020204030204" pitchFamily="34" charset="0"/>
+                        </a:rPr>
+                        <a:t>Training Loss</a:t>
+                      </a:r>
+                    </a:p>
+                  </a:txBody>
+                  <a:tcPr marL="6350" marR="6350" marT="6350" marB="0" anchor="ctr">
+                    <a:lnL w="6350" cap="flat" cmpd="sng" algn="ctr">
+                      <a:solidFill>
+                        <a:srgbClr val="000000"/>
+                      </a:solidFill>
+                      <a:prstDash val="solid"/>
+                      <a:round/>
+                      <a:headEnd type="none" w="med" len="med"/>
+                      <a:tailEnd type="none" w="med" len="med"/>
+                    </a:lnL>
+                    <a:lnR w="6350" cap="flat" cmpd="sng" algn="ctr">
+                      <a:solidFill>
+                        <a:srgbClr val="000000"/>
+                      </a:solidFill>
+                      <a:prstDash val="solid"/>
+                      <a:round/>
+                      <a:headEnd type="none" w="med" len="med"/>
+                      <a:tailEnd type="none" w="med" len="med"/>
+                    </a:lnR>
+                    <a:lnT w="6350" cap="flat" cmpd="sng" algn="ctr">
+                      <a:solidFill>
+                        <a:srgbClr val="000000"/>
+                      </a:solidFill>
+                      <a:prstDash val="solid"/>
+                      <a:round/>
+                      <a:headEnd type="none" w="med" len="med"/>
+                      <a:tailEnd type="none" w="med" len="med"/>
+                    </a:lnT>
+                    <a:lnB w="6350" cap="flat" cmpd="sng" algn="ctr">
+                      <a:solidFill>
+                        <a:srgbClr val="000000"/>
+                      </a:solidFill>
+                      <a:prstDash val="solid"/>
+                      <a:round/>
+                      <a:headEnd type="none" w="med" len="med"/>
+                      <a:tailEnd type="none" w="med" len="med"/>
+                    </a:lnB>
+                    <a:solidFill>
+                      <a:srgbClr val="4472C4"/>
+                    </a:solidFill>
+                  </a:tcPr>
+                </a:tc>
+                <a:tc>
+                  <a:txBody>
+                    <a:bodyPr/>
+                    <a:lstStyle/>
+                    <a:p>
+                      <a:pPr algn="ctr" fontAlgn="ctr"/>
+                      <a:r>
+                        <a:rPr lang="en-US" sz="1100" b="1" i="0" u="none" strike="noStrike">
+                          <a:solidFill>
+                            <a:srgbClr val="FFFFFF"/>
+                          </a:solidFill>
+                          <a:effectLst/>
+                          <a:latin typeface="Calibri" panose="020F0502020204030204" pitchFamily="34" charset="0"/>
+                        </a:rPr>
+                        <a:t>Training Accuracy %</a:t>
+                      </a:r>
+                    </a:p>
+                  </a:txBody>
+                  <a:tcPr marL="6350" marR="6350" marT="6350" marB="0" anchor="ctr">
+                    <a:lnL w="6350" cap="flat" cmpd="sng" algn="ctr">
+                      <a:solidFill>
+                        <a:srgbClr val="000000"/>
+                      </a:solidFill>
+                      <a:prstDash val="solid"/>
+                      <a:round/>
+                      <a:headEnd type="none" w="med" len="med"/>
+                      <a:tailEnd type="none" w="med" len="med"/>
+                    </a:lnL>
+                    <a:lnR w="6350" cap="flat" cmpd="sng" algn="ctr">
+                      <a:solidFill>
+                        <a:srgbClr val="000000"/>
+                      </a:solidFill>
+                      <a:prstDash val="solid"/>
+                      <a:round/>
+                      <a:headEnd type="none" w="med" len="med"/>
+                      <a:tailEnd type="none" w="med" len="med"/>
+                    </a:lnR>
+                    <a:lnT w="6350" cap="flat" cmpd="sng" algn="ctr">
+                      <a:solidFill>
+                        <a:srgbClr val="000000"/>
+                      </a:solidFill>
+                      <a:prstDash val="solid"/>
+                      <a:round/>
+                      <a:headEnd type="none" w="med" len="med"/>
+                      <a:tailEnd type="none" w="med" len="med"/>
+                    </a:lnT>
+                    <a:lnB w="6350" cap="flat" cmpd="sng" algn="ctr">
+                      <a:solidFill>
+                        <a:srgbClr val="000000"/>
+                      </a:solidFill>
+                      <a:prstDash val="solid"/>
+                      <a:round/>
+                      <a:headEnd type="none" w="med" len="med"/>
+                      <a:tailEnd type="none" w="med" len="med"/>
+                    </a:lnB>
+                    <a:solidFill>
+                      <a:srgbClr val="4472C4"/>
+                    </a:solidFill>
+                  </a:tcPr>
+                </a:tc>
+                <a:tc>
+                  <a:txBody>
+                    <a:bodyPr/>
+                    <a:lstStyle/>
+                    <a:p>
+                      <a:pPr algn="ctr" fontAlgn="ctr"/>
+                      <a:r>
+                        <a:rPr lang="en-US" sz="1100" b="1" i="0" u="none" strike="noStrike">
+                          <a:solidFill>
+                            <a:srgbClr val="FFFFFF"/>
+                          </a:solidFill>
+                          <a:effectLst/>
+                          <a:latin typeface="Calibri" panose="020F0502020204030204" pitchFamily="34" charset="0"/>
+                        </a:rPr>
+                        <a:t>Test Loss</a:t>
+                      </a:r>
+                    </a:p>
+                  </a:txBody>
+                  <a:tcPr marL="6350" marR="6350" marT="6350" marB="0" anchor="ctr">
+                    <a:lnL w="6350" cap="flat" cmpd="sng" algn="ctr">
+                      <a:solidFill>
+                        <a:srgbClr val="000000"/>
+                      </a:solidFill>
+                      <a:prstDash val="solid"/>
+                      <a:round/>
+                      <a:headEnd type="none" w="med" len="med"/>
+                      <a:tailEnd type="none" w="med" len="med"/>
+                    </a:lnL>
+                    <a:lnR w="6350" cap="flat" cmpd="sng" algn="ctr">
+                      <a:solidFill>
+                        <a:srgbClr val="000000"/>
+                      </a:solidFill>
+                      <a:prstDash val="solid"/>
+                      <a:round/>
+                      <a:headEnd type="none" w="med" len="med"/>
+                      <a:tailEnd type="none" w="med" len="med"/>
+                    </a:lnR>
+                    <a:lnT w="6350" cap="flat" cmpd="sng" algn="ctr">
+                      <a:solidFill>
+                        <a:srgbClr val="000000"/>
+                      </a:solidFill>
+                      <a:prstDash val="solid"/>
+                      <a:round/>
+                      <a:headEnd type="none" w="med" len="med"/>
+                      <a:tailEnd type="none" w="med" len="med"/>
+                    </a:lnT>
+                    <a:lnB w="6350" cap="flat" cmpd="sng" algn="ctr">
+                      <a:solidFill>
+                        <a:srgbClr val="000000"/>
+                      </a:solidFill>
+                      <a:prstDash val="solid"/>
+                      <a:round/>
+                      <a:headEnd type="none" w="med" len="med"/>
+                      <a:tailEnd type="none" w="med" len="med"/>
+                    </a:lnB>
+                    <a:solidFill>
+                      <a:srgbClr val="4472C4"/>
+                    </a:solidFill>
+                  </a:tcPr>
+                </a:tc>
+                <a:tc>
+                  <a:txBody>
+                    <a:bodyPr/>
+                    <a:lstStyle/>
+                    <a:p>
+                      <a:pPr algn="ctr" fontAlgn="ctr"/>
+                      <a:r>
+                        <a:rPr lang="en-US" sz="1100" b="1" i="0" u="none" strike="noStrike">
+                          <a:solidFill>
+                            <a:srgbClr val="FFFFFF"/>
+                          </a:solidFill>
+                          <a:effectLst/>
+                          <a:latin typeface="Calibri" panose="020F0502020204030204" pitchFamily="34" charset="0"/>
+                        </a:rPr>
+                        <a:t>Test Accuracy %</a:t>
+                      </a:r>
+                    </a:p>
+                  </a:txBody>
+                  <a:tcPr marL="6350" marR="6350" marT="6350" marB="0" anchor="ctr">
+                    <a:lnL w="6350" cap="flat" cmpd="sng" algn="ctr">
+                      <a:solidFill>
+                        <a:srgbClr val="000000"/>
+                      </a:solidFill>
+                      <a:prstDash val="solid"/>
+                      <a:round/>
+                      <a:headEnd type="none" w="med" len="med"/>
+                      <a:tailEnd type="none" w="med" len="med"/>
+                    </a:lnL>
+                    <a:lnR w="6350" cap="flat" cmpd="sng" algn="ctr">
+                      <a:solidFill>
+                        <a:srgbClr val="000000"/>
+                      </a:solidFill>
+                      <a:prstDash val="solid"/>
+                      <a:round/>
+                      <a:headEnd type="none" w="med" len="med"/>
+                      <a:tailEnd type="none" w="med" len="med"/>
+                    </a:lnR>
+                    <a:lnT w="6350" cap="flat" cmpd="sng" algn="ctr">
+                      <a:solidFill>
+                        <a:srgbClr val="000000"/>
+                      </a:solidFill>
+                      <a:prstDash val="solid"/>
+                      <a:round/>
+                      <a:headEnd type="none" w="med" len="med"/>
+                      <a:tailEnd type="none" w="med" len="med"/>
+                    </a:lnT>
+                    <a:lnB w="6350" cap="flat" cmpd="sng" algn="ctr">
+                      <a:solidFill>
+                        <a:srgbClr val="000000"/>
+                      </a:solidFill>
+                      <a:prstDash val="solid"/>
+                      <a:round/>
+                      <a:headEnd type="none" w="med" len="med"/>
+                      <a:tailEnd type="none" w="med" len="med"/>
+                    </a:lnB>
+                    <a:solidFill>
+                      <a:srgbClr val="4472C4"/>
+                    </a:solidFill>
+                  </a:tcPr>
+                </a:tc>
+                <a:extLst>
+                  <a:ext uri="{0D108BD9-81ED-4DB2-BD59-A6C34878D82A}">
+                    <a16:rowId xmlns:a16="http://schemas.microsoft.com/office/drawing/2014/main" val="4105881411"/>
+                  </a:ext>
+                </a:extLst>
+              </a:tr>
+              <a:tr h="219274">
+                <a:tc>
+                  <a:txBody>
+                    <a:bodyPr/>
+                    <a:lstStyle/>
+                    <a:p>
+                      <a:pPr algn="ctr" fontAlgn="ctr"/>
+                      <a:r>
+                        <a:rPr lang="en-US" sz="1100" b="1" i="0" u="none" strike="noStrike">
+                          <a:solidFill>
+                            <a:srgbClr val="000000"/>
+                          </a:solidFill>
+                          <a:effectLst/>
+                          <a:latin typeface="Calibri" panose="020F0502020204030204" pitchFamily="34" charset="0"/>
+                        </a:rPr>
+                        <a:t>C++ ResNet18</a:t>
+                      </a:r>
+                    </a:p>
+                  </a:txBody>
+                  <a:tcPr marL="6350" marR="6350" marT="6350" marB="0" anchor="ctr">
+                    <a:lnL w="6350" cap="flat" cmpd="sng" algn="ctr">
+                      <a:solidFill>
+                        <a:srgbClr val="000000"/>
+                      </a:solidFill>
+                      <a:prstDash val="solid"/>
+                      <a:round/>
+                      <a:headEnd type="none" w="med" len="med"/>
+                      <a:tailEnd type="none" w="med" len="med"/>
+                    </a:lnL>
+                    <a:lnR w="6350" cap="flat" cmpd="sng" algn="ctr">
+                      <a:solidFill>
+                        <a:srgbClr val="000000"/>
+                      </a:solidFill>
+                      <a:prstDash val="solid"/>
+                      <a:round/>
+                      <a:headEnd type="none" w="med" len="med"/>
+                      <a:tailEnd type="none" w="med" len="med"/>
+                    </a:lnR>
+                    <a:lnT w="6350" cap="flat" cmpd="sng" algn="ctr">
+                      <a:solidFill>
+                        <a:srgbClr val="000000"/>
+                      </a:solidFill>
+                      <a:prstDash val="solid"/>
+                      <a:round/>
+                      <a:headEnd type="none" w="med" len="med"/>
+                      <a:tailEnd type="none" w="med" len="med"/>
+                    </a:lnT>
+                    <a:lnB w="6350" cap="flat" cmpd="sng" algn="ctr">
+                      <a:solidFill>
+                        <a:srgbClr val="000000"/>
+                      </a:solidFill>
+                      <a:prstDash val="solid"/>
+                      <a:round/>
+                      <a:headEnd type="none" w="med" len="med"/>
+                      <a:tailEnd type="none" w="med" len="med"/>
+                    </a:lnB>
+                    <a:solidFill>
+                      <a:srgbClr val="D9E1F2"/>
+                    </a:solidFill>
+                  </a:tcPr>
+                </a:tc>
+                <a:tc>
+                  <a:txBody>
+                    <a:bodyPr/>
+                    <a:lstStyle/>
+                    <a:p>
+                      <a:pPr algn="ctr" fontAlgn="ctr"/>
+                      <a:r>
+                        <a:rPr lang="en-US" sz="1100" b="0" i="0" u="none" strike="noStrike">
+                          <a:solidFill>
+                            <a:srgbClr val="000000"/>
+                          </a:solidFill>
+                          <a:effectLst/>
+                          <a:latin typeface="Calibri" panose="020F0502020204030204" pitchFamily="34" charset="0"/>
+                        </a:rPr>
+                        <a:t>361.814</a:t>
+                      </a:r>
+                    </a:p>
+                  </a:txBody>
+                  <a:tcPr marL="6350" marR="6350" marT="6350" marB="0" anchor="ctr">
+                    <a:lnL w="6350" cap="flat" cmpd="sng" algn="ctr">
+                      <a:solidFill>
+                        <a:srgbClr val="000000"/>
+                      </a:solidFill>
+                      <a:prstDash val="solid"/>
+                      <a:round/>
+                      <a:headEnd type="none" w="med" len="med"/>
+                      <a:tailEnd type="none" w="med" len="med"/>
+                    </a:lnL>
+                    <a:lnR w="6350" cap="flat" cmpd="sng" algn="ctr">
+                      <a:solidFill>
+                        <a:srgbClr val="000000"/>
+                      </a:solidFill>
+                      <a:prstDash val="solid"/>
+                      <a:round/>
+                      <a:headEnd type="none" w="med" len="med"/>
+                      <a:tailEnd type="none" w="med" len="med"/>
+                    </a:lnR>
+                    <a:lnT w="6350" cap="flat" cmpd="sng" algn="ctr">
+                      <a:solidFill>
+                        <a:srgbClr val="000000"/>
+                      </a:solidFill>
+                      <a:prstDash val="solid"/>
+                      <a:round/>
+                      <a:headEnd type="none" w="med" len="med"/>
+                      <a:tailEnd type="none" w="med" len="med"/>
+                    </a:lnT>
+                    <a:lnB w="6350" cap="flat" cmpd="sng" algn="ctr">
+                      <a:solidFill>
+                        <a:srgbClr val="000000"/>
+                      </a:solidFill>
+                      <a:prstDash val="solid"/>
+                      <a:round/>
+                      <a:headEnd type="none" w="med" len="med"/>
+                      <a:tailEnd type="none" w="med" len="med"/>
+                    </a:lnB>
+                    <a:solidFill>
+                      <a:srgbClr val="D9E1F2"/>
+                    </a:solidFill>
+                  </a:tcPr>
+                </a:tc>
+                <a:tc>
+                  <a:txBody>
+                    <a:bodyPr/>
+                    <a:lstStyle/>
+                    <a:p>
+                      <a:pPr algn="ctr" fontAlgn="ctr"/>
+                      <a:r>
+                        <a:rPr lang="en-US" sz="1100" b="0" i="0" u="none" strike="noStrike">
+                          <a:solidFill>
+                            <a:srgbClr val="000000"/>
+                          </a:solidFill>
+                          <a:effectLst/>
+                          <a:latin typeface="Calibri" panose="020F0502020204030204" pitchFamily="34" charset="0"/>
+                        </a:rPr>
+                        <a:t>7.235071992</a:t>
+                      </a:r>
+                    </a:p>
+                  </a:txBody>
+                  <a:tcPr marL="6350" marR="6350" marT="6350" marB="0" anchor="ctr">
+                    <a:lnL w="6350" cap="flat" cmpd="sng" algn="ctr">
+                      <a:solidFill>
+                        <a:srgbClr val="000000"/>
+                      </a:solidFill>
+                      <a:prstDash val="solid"/>
+                      <a:round/>
+                      <a:headEnd type="none" w="med" len="med"/>
+                      <a:tailEnd type="none" w="med" len="med"/>
+                    </a:lnL>
+                    <a:lnR w="6350" cap="flat" cmpd="sng" algn="ctr">
+                      <a:solidFill>
+                        <a:srgbClr val="000000"/>
+                      </a:solidFill>
+                      <a:prstDash val="solid"/>
+                      <a:round/>
+                      <a:headEnd type="none" w="med" len="med"/>
+                      <a:tailEnd type="none" w="med" len="med"/>
+                    </a:lnR>
+                    <a:lnT w="6350" cap="flat" cmpd="sng" algn="ctr">
+                      <a:solidFill>
+                        <a:srgbClr val="000000"/>
+                      </a:solidFill>
+                      <a:prstDash val="solid"/>
+                      <a:round/>
+                      <a:headEnd type="none" w="med" len="med"/>
+                      <a:tailEnd type="none" w="med" len="med"/>
+                    </a:lnT>
+                    <a:lnB w="6350" cap="flat" cmpd="sng" algn="ctr">
+                      <a:solidFill>
+                        <a:srgbClr val="000000"/>
+                      </a:solidFill>
+                      <a:prstDash val="solid"/>
+                      <a:round/>
+                      <a:headEnd type="none" w="med" len="med"/>
+                      <a:tailEnd type="none" w="med" len="med"/>
+                    </a:lnB>
+                    <a:solidFill>
+                      <a:srgbClr val="D9E1F2"/>
+                    </a:solidFill>
+                  </a:tcPr>
+                </a:tc>
+                <a:tc>
+                  <a:txBody>
+                    <a:bodyPr/>
+                    <a:lstStyle/>
+                    <a:p>
+                      <a:pPr algn="ctr" fontAlgn="ctr"/>
+                      <a:r>
+                        <a:rPr lang="en-US" sz="1100" b="0" i="0" u="none" strike="noStrike">
+                          <a:solidFill>
+                            <a:srgbClr val="000000"/>
+                          </a:solidFill>
+                          <a:effectLst/>
+                          <a:latin typeface="Calibri" panose="020F0502020204030204" pitchFamily="34" charset="0"/>
+                        </a:rPr>
+                        <a:t>3.31</a:t>
+                      </a:r>
+                    </a:p>
+                  </a:txBody>
+                  <a:tcPr marL="6350" marR="6350" marT="6350" marB="0" anchor="ctr">
+                    <a:lnL w="6350" cap="flat" cmpd="sng" algn="ctr">
+                      <a:solidFill>
+                        <a:srgbClr val="000000"/>
+                      </a:solidFill>
+                      <a:prstDash val="solid"/>
+                      <a:round/>
+                      <a:headEnd type="none" w="med" len="med"/>
+                      <a:tailEnd type="none" w="med" len="med"/>
+                    </a:lnL>
+                    <a:lnR w="6350" cap="flat" cmpd="sng" algn="ctr">
+                      <a:solidFill>
+                        <a:srgbClr val="000000"/>
+                      </a:solidFill>
+                      <a:prstDash val="solid"/>
+                      <a:round/>
+                      <a:headEnd type="none" w="med" len="med"/>
+                      <a:tailEnd type="none" w="med" len="med"/>
+                    </a:lnR>
+                    <a:lnT w="6350" cap="flat" cmpd="sng" algn="ctr">
+                      <a:solidFill>
+                        <a:srgbClr val="000000"/>
+                      </a:solidFill>
+                      <a:prstDash val="solid"/>
+                      <a:round/>
+                      <a:headEnd type="none" w="med" len="med"/>
+                      <a:tailEnd type="none" w="med" len="med"/>
+                    </a:lnT>
+                    <a:lnB w="6350" cap="flat" cmpd="sng" algn="ctr">
+                      <a:solidFill>
+                        <a:srgbClr val="000000"/>
+                      </a:solidFill>
+                      <a:prstDash val="solid"/>
+                      <a:round/>
+                      <a:headEnd type="none" w="med" len="med"/>
+                      <a:tailEnd type="none" w="med" len="med"/>
+                    </a:lnB>
+                    <a:solidFill>
+                      <a:srgbClr val="D9E1F2"/>
+                    </a:solidFill>
+                  </a:tcPr>
+                </a:tc>
+                <a:tc>
+                  <a:txBody>
+                    <a:bodyPr/>
+                    <a:lstStyle/>
+                    <a:p>
+                      <a:pPr algn="ctr" fontAlgn="ctr"/>
+                      <a:r>
+                        <a:rPr lang="en-US" sz="1100" b="0" i="0" u="none" strike="noStrike">
+                          <a:solidFill>
+                            <a:srgbClr val="000000"/>
+                          </a:solidFill>
+                          <a:effectLst/>
+                          <a:latin typeface="Calibri" panose="020F0502020204030204" pitchFamily="34" charset="0"/>
+                        </a:rPr>
+                        <a:t>0.0948172</a:t>
+                      </a:r>
+                    </a:p>
+                  </a:txBody>
+                  <a:tcPr marL="6350" marR="6350" marT="6350" marB="0" anchor="ctr">
+                    <a:lnL w="6350" cap="flat" cmpd="sng" algn="ctr">
+                      <a:solidFill>
+                        <a:srgbClr val="000000"/>
+                      </a:solidFill>
+                      <a:prstDash val="solid"/>
+                      <a:round/>
+                      <a:headEnd type="none" w="med" len="med"/>
+                      <a:tailEnd type="none" w="med" len="med"/>
+                    </a:lnL>
+                    <a:lnR w="6350" cap="flat" cmpd="sng" algn="ctr">
+                      <a:solidFill>
+                        <a:srgbClr val="000000"/>
+                      </a:solidFill>
+                      <a:prstDash val="solid"/>
+                      <a:round/>
+                      <a:headEnd type="none" w="med" len="med"/>
+                      <a:tailEnd type="none" w="med" len="med"/>
+                    </a:lnR>
+                    <a:lnT w="6350" cap="flat" cmpd="sng" algn="ctr">
+                      <a:solidFill>
+                        <a:srgbClr val="000000"/>
+                      </a:solidFill>
+                      <a:prstDash val="solid"/>
+                      <a:round/>
+                      <a:headEnd type="none" w="med" len="med"/>
+                      <a:tailEnd type="none" w="med" len="med"/>
+                    </a:lnT>
+                    <a:lnB w="6350" cap="flat" cmpd="sng" algn="ctr">
+                      <a:solidFill>
+                        <a:srgbClr val="000000"/>
+                      </a:solidFill>
+                      <a:prstDash val="solid"/>
+                      <a:round/>
+                      <a:headEnd type="none" w="med" len="med"/>
+                      <a:tailEnd type="none" w="med" len="med"/>
+                    </a:lnB>
+                    <a:solidFill>
+                      <a:srgbClr val="D9E1F2"/>
+                    </a:solidFill>
+                  </a:tcPr>
+                </a:tc>
+                <a:tc>
+                  <a:txBody>
+                    <a:bodyPr/>
+                    <a:lstStyle/>
+                    <a:p>
+                      <a:pPr algn="ctr" fontAlgn="ctr"/>
+                      <a:r>
+                        <a:rPr lang="en-US" sz="1100" b="0" i="0" u="none" strike="noStrike">
+                          <a:solidFill>
+                            <a:srgbClr val="000000"/>
+                          </a:solidFill>
+                          <a:effectLst/>
+                          <a:latin typeface="Calibri" panose="020F0502020204030204" pitchFamily="34" charset="0"/>
+                        </a:rPr>
+                        <a:t>96.684</a:t>
+                      </a:r>
+                    </a:p>
+                  </a:txBody>
+                  <a:tcPr marL="6350" marR="6350" marT="6350" marB="0" anchor="ctr">
+                    <a:lnL w="6350" cap="flat" cmpd="sng" algn="ctr">
+                      <a:solidFill>
+                        <a:srgbClr val="000000"/>
+                      </a:solidFill>
+                      <a:prstDash val="solid"/>
+                      <a:round/>
+                      <a:headEnd type="none" w="med" len="med"/>
+                      <a:tailEnd type="none" w="med" len="med"/>
+                    </a:lnL>
+                    <a:lnR w="6350" cap="flat" cmpd="sng" algn="ctr">
+                      <a:solidFill>
+                        <a:srgbClr val="000000"/>
+                      </a:solidFill>
+                      <a:prstDash val="solid"/>
+                      <a:round/>
+                      <a:headEnd type="none" w="med" len="med"/>
+                      <a:tailEnd type="none" w="med" len="med"/>
+                    </a:lnR>
+                    <a:lnT w="6350" cap="flat" cmpd="sng" algn="ctr">
+                      <a:solidFill>
+                        <a:srgbClr val="000000"/>
+                      </a:solidFill>
+                      <a:prstDash val="solid"/>
+                      <a:round/>
+                      <a:headEnd type="none" w="med" len="med"/>
+                      <a:tailEnd type="none" w="med" len="med"/>
+                    </a:lnT>
+                    <a:lnB w="6350" cap="flat" cmpd="sng" algn="ctr">
+                      <a:solidFill>
+                        <a:srgbClr val="000000"/>
+                      </a:solidFill>
+                      <a:prstDash val="solid"/>
+                      <a:round/>
+                      <a:headEnd type="none" w="med" len="med"/>
+                      <a:tailEnd type="none" w="med" len="med"/>
+                    </a:lnB>
+                    <a:solidFill>
+                      <a:srgbClr val="D9E1F2"/>
+                    </a:solidFill>
+                  </a:tcPr>
+                </a:tc>
+                <a:tc>
+                  <a:txBody>
+                    <a:bodyPr/>
+                    <a:lstStyle/>
+                    <a:p>
+                      <a:pPr algn="ctr" fontAlgn="ctr"/>
+                      <a:r>
+                        <a:rPr lang="en-US" sz="1100" b="0" i="0" u="none" strike="noStrike">
+                          <a:solidFill>
+                            <a:srgbClr val="000000"/>
+                          </a:solidFill>
+                          <a:effectLst/>
+                          <a:latin typeface="Calibri" panose="020F0502020204030204" pitchFamily="34" charset="0"/>
+                        </a:rPr>
+                        <a:t>1.34854</a:t>
+                      </a:r>
+                    </a:p>
+                  </a:txBody>
+                  <a:tcPr marL="6350" marR="6350" marT="6350" marB="0" anchor="ctr">
+                    <a:lnL w="6350" cap="flat" cmpd="sng" algn="ctr">
+                      <a:solidFill>
+                        <a:srgbClr val="000000"/>
+                      </a:solidFill>
+                      <a:prstDash val="solid"/>
+                      <a:round/>
+                      <a:headEnd type="none" w="med" len="med"/>
+                      <a:tailEnd type="none" w="med" len="med"/>
+                    </a:lnL>
+                    <a:lnR w="6350" cap="flat" cmpd="sng" algn="ctr">
+                      <a:solidFill>
+                        <a:srgbClr val="000000"/>
+                      </a:solidFill>
+                      <a:prstDash val="solid"/>
+                      <a:round/>
+                      <a:headEnd type="none" w="med" len="med"/>
+                      <a:tailEnd type="none" w="med" len="med"/>
+                    </a:lnR>
+                    <a:lnT w="6350" cap="flat" cmpd="sng" algn="ctr">
+                      <a:solidFill>
+                        <a:srgbClr val="000000"/>
+                      </a:solidFill>
+                      <a:prstDash val="solid"/>
+                      <a:round/>
+                      <a:headEnd type="none" w="med" len="med"/>
+                      <a:tailEnd type="none" w="med" len="med"/>
+                    </a:lnT>
+                    <a:lnB w="6350" cap="flat" cmpd="sng" algn="ctr">
+                      <a:solidFill>
+                        <a:srgbClr val="000000"/>
+                      </a:solidFill>
+                      <a:prstDash val="solid"/>
+                      <a:round/>
+                      <a:headEnd type="none" w="med" len="med"/>
+                      <a:tailEnd type="none" w="med" len="med"/>
+                    </a:lnB>
+                    <a:solidFill>
+                      <a:srgbClr val="D9E1F2"/>
+                    </a:solidFill>
+                  </a:tcPr>
+                </a:tc>
+                <a:tc>
+                  <a:txBody>
+                    <a:bodyPr/>
+                    <a:lstStyle/>
+                    <a:p>
+                      <a:pPr algn="ctr" fontAlgn="ctr"/>
+                      <a:r>
+                        <a:rPr lang="en-US" sz="1100" b="0" i="0" u="none" strike="noStrike">
+                          <a:solidFill>
+                            <a:srgbClr val="000000"/>
+                          </a:solidFill>
+                          <a:effectLst/>
+                          <a:latin typeface="Calibri" panose="020F0502020204030204" pitchFamily="34" charset="0"/>
+                        </a:rPr>
+                        <a:t>70.44</a:t>
+                      </a:r>
+                    </a:p>
+                  </a:txBody>
+                  <a:tcPr marL="6350" marR="6350" marT="6350" marB="0" anchor="ctr">
+                    <a:lnL w="6350" cap="flat" cmpd="sng" algn="ctr">
+                      <a:solidFill>
+                        <a:srgbClr val="000000"/>
+                      </a:solidFill>
+                      <a:prstDash val="solid"/>
+                      <a:round/>
+                      <a:headEnd type="none" w="med" len="med"/>
+                      <a:tailEnd type="none" w="med" len="med"/>
+                    </a:lnL>
+                    <a:lnR w="6350" cap="flat" cmpd="sng" algn="ctr">
+                      <a:solidFill>
+                        <a:srgbClr val="000000"/>
+                      </a:solidFill>
+                      <a:prstDash val="solid"/>
+                      <a:round/>
+                      <a:headEnd type="none" w="med" len="med"/>
+                      <a:tailEnd type="none" w="med" len="med"/>
+                    </a:lnR>
+                    <a:lnT w="6350" cap="flat" cmpd="sng" algn="ctr">
+                      <a:solidFill>
+                        <a:srgbClr val="000000"/>
+                      </a:solidFill>
+                      <a:prstDash val="solid"/>
+                      <a:round/>
+                      <a:headEnd type="none" w="med" len="med"/>
+                      <a:tailEnd type="none" w="med" len="med"/>
+                    </a:lnT>
+                    <a:lnB w="6350" cap="flat" cmpd="sng" algn="ctr">
+                      <a:solidFill>
+                        <a:srgbClr val="000000"/>
+                      </a:solidFill>
+                      <a:prstDash val="solid"/>
+                      <a:round/>
+                      <a:headEnd type="none" w="med" len="med"/>
+                      <a:tailEnd type="none" w="med" len="med"/>
+                    </a:lnB>
+                    <a:solidFill>
+                      <a:srgbClr val="D9E1F2"/>
+                    </a:solidFill>
+                  </a:tcPr>
+                </a:tc>
+                <a:extLst>
+                  <a:ext uri="{0D108BD9-81ED-4DB2-BD59-A6C34878D82A}">
+                    <a16:rowId xmlns:a16="http://schemas.microsoft.com/office/drawing/2014/main" val="3177908271"/>
+                  </a:ext>
+                </a:extLst>
+              </a:tr>
+              <a:tr h="219274">
+                <a:tc>
+                  <a:txBody>
+                    <a:bodyPr/>
+                    <a:lstStyle/>
+                    <a:p>
+                      <a:pPr algn="ctr" fontAlgn="ctr"/>
+                      <a:r>
+                        <a:rPr lang="en-US" sz="1100" b="1" i="0" u="none" strike="noStrike">
+                          <a:solidFill>
+                            <a:srgbClr val="000000"/>
+                          </a:solidFill>
+                          <a:effectLst/>
+                          <a:latin typeface="Calibri" panose="020F0502020204030204" pitchFamily="34" charset="0"/>
+                        </a:rPr>
+                        <a:t>C++ ResNet34</a:t>
+                      </a:r>
+                    </a:p>
+                  </a:txBody>
+                  <a:tcPr marL="6350" marR="6350" marT="6350" marB="0" anchor="ctr">
+                    <a:lnL w="6350" cap="flat" cmpd="sng" algn="ctr">
+                      <a:solidFill>
+                        <a:srgbClr val="000000"/>
+                      </a:solidFill>
+                      <a:prstDash val="solid"/>
+                      <a:round/>
+                      <a:headEnd type="none" w="med" len="med"/>
+                      <a:tailEnd type="none" w="med" len="med"/>
+                    </a:lnL>
+                    <a:lnR w="6350" cap="flat" cmpd="sng" algn="ctr">
+                      <a:solidFill>
+                        <a:srgbClr val="000000"/>
+                      </a:solidFill>
+                      <a:prstDash val="solid"/>
+                      <a:round/>
+                      <a:headEnd type="none" w="med" len="med"/>
+                      <a:tailEnd type="none" w="med" len="med"/>
+                    </a:lnR>
+                    <a:lnT w="6350" cap="flat" cmpd="sng" algn="ctr">
+                      <a:solidFill>
+                        <a:srgbClr val="000000"/>
+                      </a:solidFill>
+                      <a:prstDash val="solid"/>
+                      <a:round/>
+                      <a:headEnd type="none" w="med" len="med"/>
+                      <a:tailEnd type="none" w="med" len="med"/>
+                    </a:lnT>
+                    <a:lnB w="6350" cap="flat" cmpd="sng" algn="ctr">
+                      <a:solidFill>
+                        <a:srgbClr val="000000"/>
+                      </a:solidFill>
+                      <a:prstDash val="solid"/>
+                      <a:round/>
+                      <a:headEnd type="none" w="med" len="med"/>
+                      <a:tailEnd type="none" w="med" len="med"/>
+                    </a:lnB>
+                  </a:tcPr>
+                </a:tc>
+                <a:tc>
+                  <a:txBody>
+                    <a:bodyPr/>
+                    <a:lstStyle/>
+                    <a:p>
+                      <a:pPr algn="ctr" fontAlgn="ctr"/>
+                      <a:r>
+                        <a:rPr lang="en-US" sz="1100" b="0" i="0" u="none" strike="noStrike">
+                          <a:solidFill>
+                            <a:srgbClr val="000000"/>
+                          </a:solidFill>
+                          <a:effectLst/>
+                          <a:latin typeface="Calibri" panose="020F0502020204030204" pitchFamily="34" charset="0"/>
+                        </a:rPr>
+                        <a:t>553.106</a:t>
+                      </a:r>
+                    </a:p>
+                  </a:txBody>
+                  <a:tcPr marL="6350" marR="6350" marT="6350" marB="0" anchor="ctr">
+                    <a:lnL w="6350" cap="flat" cmpd="sng" algn="ctr">
+                      <a:solidFill>
+                        <a:srgbClr val="000000"/>
+                      </a:solidFill>
+                      <a:prstDash val="solid"/>
+                      <a:round/>
+                      <a:headEnd type="none" w="med" len="med"/>
+                      <a:tailEnd type="none" w="med" len="med"/>
+                    </a:lnL>
+                    <a:lnR w="6350" cap="flat" cmpd="sng" algn="ctr">
+                      <a:solidFill>
+                        <a:srgbClr val="000000"/>
+                      </a:solidFill>
+                      <a:prstDash val="solid"/>
+                      <a:round/>
+                      <a:headEnd type="none" w="med" len="med"/>
+                      <a:tailEnd type="none" w="med" len="med"/>
+                    </a:lnR>
+                    <a:lnT w="6350" cap="flat" cmpd="sng" algn="ctr">
+                      <a:solidFill>
+                        <a:srgbClr val="000000"/>
+                      </a:solidFill>
+                      <a:prstDash val="solid"/>
+                      <a:round/>
+                      <a:headEnd type="none" w="med" len="med"/>
+                      <a:tailEnd type="none" w="med" len="med"/>
+                    </a:lnT>
+                    <a:lnB w="6350" cap="flat" cmpd="sng" algn="ctr">
+                      <a:solidFill>
+                        <a:srgbClr val="000000"/>
+                      </a:solidFill>
+                      <a:prstDash val="solid"/>
+                      <a:round/>
+                      <a:headEnd type="none" w="med" len="med"/>
+                      <a:tailEnd type="none" w="med" len="med"/>
+                    </a:lnB>
+                  </a:tcPr>
+                </a:tc>
+                <a:tc>
+                  <a:txBody>
+                    <a:bodyPr/>
+                    <a:lstStyle/>
+                    <a:p>
+                      <a:pPr algn="ctr" fontAlgn="ctr"/>
+                      <a:r>
+                        <a:rPr lang="en-US" sz="1100" b="0" i="0" u="none" strike="noStrike">
+                          <a:solidFill>
+                            <a:srgbClr val="000000"/>
+                          </a:solidFill>
+                          <a:effectLst/>
+                          <a:latin typeface="Calibri" panose="020F0502020204030204" pitchFamily="34" charset="0"/>
+                        </a:rPr>
+                        <a:t>11.06131683</a:t>
+                      </a:r>
+                    </a:p>
+                  </a:txBody>
+                  <a:tcPr marL="6350" marR="6350" marT="6350" marB="0" anchor="ctr">
+                    <a:lnL w="6350" cap="flat" cmpd="sng" algn="ctr">
+                      <a:solidFill>
+                        <a:srgbClr val="000000"/>
+                      </a:solidFill>
+                      <a:prstDash val="solid"/>
+                      <a:round/>
+                      <a:headEnd type="none" w="med" len="med"/>
+                      <a:tailEnd type="none" w="med" len="med"/>
+                    </a:lnL>
+                    <a:lnR w="6350" cap="flat" cmpd="sng" algn="ctr">
+                      <a:solidFill>
+                        <a:srgbClr val="000000"/>
+                      </a:solidFill>
+                      <a:prstDash val="solid"/>
+                      <a:round/>
+                      <a:headEnd type="none" w="med" len="med"/>
+                      <a:tailEnd type="none" w="med" len="med"/>
+                    </a:lnR>
+                    <a:lnT w="6350" cap="flat" cmpd="sng" algn="ctr">
+                      <a:solidFill>
+                        <a:srgbClr val="000000"/>
+                      </a:solidFill>
+                      <a:prstDash val="solid"/>
+                      <a:round/>
+                      <a:headEnd type="none" w="med" len="med"/>
+                      <a:tailEnd type="none" w="med" len="med"/>
+                    </a:lnT>
+                    <a:lnB w="6350" cap="flat" cmpd="sng" algn="ctr">
+                      <a:solidFill>
+                        <a:srgbClr val="000000"/>
+                      </a:solidFill>
+                      <a:prstDash val="solid"/>
+                      <a:round/>
+                      <a:headEnd type="none" w="med" len="med"/>
+                      <a:tailEnd type="none" w="med" len="med"/>
+                    </a:lnB>
+                  </a:tcPr>
+                </a:tc>
+                <a:tc>
+                  <a:txBody>
+                    <a:bodyPr/>
+                    <a:lstStyle/>
+                    <a:p>
+                      <a:pPr algn="ctr" fontAlgn="ctr"/>
+                      <a:r>
+                        <a:rPr lang="en-US" sz="1100" b="0" i="0" u="none" strike="noStrike">
+                          <a:solidFill>
+                            <a:srgbClr val="000000"/>
+                          </a:solidFill>
+                          <a:effectLst/>
+                          <a:latin typeface="Calibri" panose="020F0502020204030204" pitchFamily="34" charset="0"/>
+                        </a:rPr>
+                        <a:t>4.23</a:t>
+                      </a:r>
+                    </a:p>
+                  </a:txBody>
+                  <a:tcPr marL="6350" marR="6350" marT="6350" marB="0" anchor="ctr">
+                    <a:lnL w="6350" cap="flat" cmpd="sng" algn="ctr">
+                      <a:solidFill>
+                        <a:srgbClr val="000000"/>
+                      </a:solidFill>
+                      <a:prstDash val="solid"/>
+                      <a:round/>
+                      <a:headEnd type="none" w="med" len="med"/>
+                      <a:tailEnd type="none" w="med" len="med"/>
+                    </a:lnL>
+                    <a:lnR w="6350" cap="flat" cmpd="sng" algn="ctr">
+                      <a:solidFill>
+                        <a:srgbClr val="000000"/>
+                      </a:solidFill>
+                      <a:prstDash val="solid"/>
+                      <a:round/>
+                      <a:headEnd type="none" w="med" len="med"/>
+                      <a:tailEnd type="none" w="med" len="med"/>
+                    </a:lnR>
+                    <a:lnT w="6350" cap="flat" cmpd="sng" algn="ctr">
+                      <a:solidFill>
+                        <a:srgbClr val="000000"/>
+                      </a:solidFill>
+                      <a:prstDash val="solid"/>
+                      <a:round/>
+                      <a:headEnd type="none" w="med" len="med"/>
+                      <a:tailEnd type="none" w="med" len="med"/>
+                    </a:lnT>
+                    <a:lnB w="6350" cap="flat" cmpd="sng" algn="ctr">
+                      <a:solidFill>
+                        <a:srgbClr val="000000"/>
+                      </a:solidFill>
+                      <a:prstDash val="solid"/>
+                      <a:round/>
+                      <a:headEnd type="none" w="med" len="med"/>
+                      <a:tailEnd type="none" w="med" len="med"/>
+                    </a:lnB>
+                  </a:tcPr>
+                </a:tc>
+                <a:tc>
+                  <a:txBody>
+                    <a:bodyPr/>
+                    <a:lstStyle/>
+                    <a:p>
+                      <a:pPr algn="ctr" fontAlgn="ctr"/>
+                      <a:r>
+                        <a:rPr lang="en-US" sz="1100" b="0" i="0" u="none" strike="noStrike">
+                          <a:solidFill>
+                            <a:srgbClr val="000000"/>
+                          </a:solidFill>
+                          <a:effectLst/>
+                          <a:latin typeface="Calibri" panose="020F0502020204030204" pitchFamily="34" charset="0"/>
+                        </a:rPr>
+                        <a:t>0.105326</a:t>
+                      </a:r>
+                    </a:p>
+                  </a:txBody>
+                  <a:tcPr marL="6350" marR="6350" marT="6350" marB="0" anchor="ctr">
+                    <a:lnL w="6350" cap="flat" cmpd="sng" algn="ctr">
+                      <a:solidFill>
+                        <a:srgbClr val="000000"/>
+                      </a:solidFill>
+                      <a:prstDash val="solid"/>
+                      <a:round/>
+                      <a:headEnd type="none" w="med" len="med"/>
+                      <a:tailEnd type="none" w="med" len="med"/>
+                    </a:lnL>
+                    <a:lnR w="6350" cap="flat" cmpd="sng" algn="ctr">
+                      <a:solidFill>
+                        <a:srgbClr val="000000"/>
+                      </a:solidFill>
+                      <a:prstDash val="solid"/>
+                      <a:round/>
+                      <a:headEnd type="none" w="med" len="med"/>
+                      <a:tailEnd type="none" w="med" len="med"/>
+                    </a:lnR>
+                    <a:lnT w="6350" cap="flat" cmpd="sng" algn="ctr">
+                      <a:solidFill>
+                        <a:srgbClr val="000000"/>
+                      </a:solidFill>
+                      <a:prstDash val="solid"/>
+                      <a:round/>
+                      <a:headEnd type="none" w="med" len="med"/>
+                      <a:tailEnd type="none" w="med" len="med"/>
+                    </a:lnT>
+                    <a:lnB w="6350" cap="flat" cmpd="sng" algn="ctr">
+                      <a:solidFill>
+                        <a:srgbClr val="000000"/>
+                      </a:solidFill>
+                      <a:prstDash val="solid"/>
+                      <a:round/>
+                      <a:headEnd type="none" w="med" len="med"/>
+                      <a:tailEnd type="none" w="med" len="med"/>
+                    </a:lnB>
+                  </a:tcPr>
+                </a:tc>
+                <a:tc>
+                  <a:txBody>
+                    <a:bodyPr/>
+                    <a:lstStyle/>
+                    <a:p>
+                      <a:pPr algn="ctr" fontAlgn="ctr"/>
+                      <a:r>
+                        <a:rPr lang="en-US" sz="1100" b="0" i="0" u="none" strike="noStrike">
+                          <a:solidFill>
+                            <a:srgbClr val="000000"/>
+                          </a:solidFill>
+                          <a:effectLst/>
+                          <a:latin typeface="Calibri" panose="020F0502020204030204" pitchFamily="34" charset="0"/>
+                        </a:rPr>
+                        <a:t>96.406</a:t>
+                      </a:r>
+                    </a:p>
+                  </a:txBody>
+                  <a:tcPr marL="6350" marR="6350" marT="6350" marB="0" anchor="ctr">
+                    <a:lnL w="6350" cap="flat" cmpd="sng" algn="ctr">
+                      <a:solidFill>
+                        <a:srgbClr val="000000"/>
+                      </a:solidFill>
+                      <a:prstDash val="solid"/>
+                      <a:round/>
+                      <a:headEnd type="none" w="med" len="med"/>
+                      <a:tailEnd type="none" w="med" len="med"/>
+                    </a:lnL>
+                    <a:lnR w="6350" cap="flat" cmpd="sng" algn="ctr">
+                      <a:solidFill>
+                        <a:srgbClr val="000000"/>
+                      </a:solidFill>
+                      <a:prstDash val="solid"/>
+                      <a:round/>
+                      <a:headEnd type="none" w="med" len="med"/>
+                      <a:tailEnd type="none" w="med" len="med"/>
+                    </a:lnR>
+                    <a:lnT w="6350" cap="flat" cmpd="sng" algn="ctr">
+                      <a:solidFill>
+                        <a:srgbClr val="000000"/>
+                      </a:solidFill>
+                      <a:prstDash val="solid"/>
+                      <a:round/>
+                      <a:headEnd type="none" w="med" len="med"/>
+                      <a:tailEnd type="none" w="med" len="med"/>
+                    </a:lnT>
+                    <a:lnB w="6350" cap="flat" cmpd="sng" algn="ctr">
+                      <a:solidFill>
+                        <a:srgbClr val="000000"/>
+                      </a:solidFill>
+                      <a:prstDash val="solid"/>
+                      <a:round/>
+                      <a:headEnd type="none" w="med" len="med"/>
+                      <a:tailEnd type="none" w="med" len="med"/>
+                    </a:lnB>
+                  </a:tcPr>
+                </a:tc>
+                <a:tc>
+                  <a:txBody>
+                    <a:bodyPr/>
+                    <a:lstStyle/>
+                    <a:p>
+                      <a:pPr algn="ctr" fontAlgn="ctr"/>
+                      <a:r>
+                        <a:rPr lang="en-US" sz="1100" b="0" i="0" u="none" strike="noStrike">
+                          <a:solidFill>
+                            <a:srgbClr val="000000"/>
+                          </a:solidFill>
+                          <a:effectLst/>
+                          <a:latin typeface="Calibri" panose="020F0502020204030204" pitchFamily="34" charset="0"/>
+                        </a:rPr>
+                        <a:t>1.25164</a:t>
+                      </a:r>
+                    </a:p>
+                  </a:txBody>
+                  <a:tcPr marL="6350" marR="6350" marT="6350" marB="0" anchor="ctr">
+                    <a:lnL w="6350" cap="flat" cmpd="sng" algn="ctr">
+                      <a:solidFill>
+                        <a:srgbClr val="000000"/>
+                      </a:solidFill>
+                      <a:prstDash val="solid"/>
+                      <a:round/>
+                      <a:headEnd type="none" w="med" len="med"/>
+                      <a:tailEnd type="none" w="med" len="med"/>
+                    </a:lnL>
+                    <a:lnR w="6350" cap="flat" cmpd="sng" algn="ctr">
+                      <a:solidFill>
+                        <a:srgbClr val="000000"/>
+                      </a:solidFill>
+                      <a:prstDash val="solid"/>
+                      <a:round/>
+                      <a:headEnd type="none" w="med" len="med"/>
+                      <a:tailEnd type="none" w="med" len="med"/>
+                    </a:lnR>
+                    <a:lnT w="6350" cap="flat" cmpd="sng" algn="ctr">
+                      <a:solidFill>
+                        <a:srgbClr val="000000"/>
+                      </a:solidFill>
+                      <a:prstDash val="solid"/>
+                      <a:round/>
+                      <a:headEnd type="none" w="med" len="med"/>
+                      <a:tailEnd type="none" w="med" len="med"/>
+                    </a:lnT>
+                    <a:lnB w="6350" cap="flat" cmpd="sng" algn="ctr">
+                      <a:solidFill>
+                        <a:srgbClr val="000000"/>
+                      </a:solidFill>
+                      <a:prstDash val="solid"/>
+                      <a:round/>
+                      <a:headEnd type="none" w="med" len="med"/>
+                      <a:tailEnd type="none" w="med" len="med"/>
+                    </a:lnB>
+                  </a:tcPr>
+                </a:tc>
+                <a:tc>
+                  <a:txBody>
+                    <a:bodyPr/>
+                    <a:lstStyle/>
+                    <a:p>
+                      <a:pPr algn="ctr" fontAlgn="ctr"/>
+                      <a:r>
+                        <a:rPr lang="en-US" sz="1100" b="0" i="0" u="none" strike="noStrike">
+                          <a:solidFill>
+                            <a:srgbClr val="000000"/>
+                          </a:solidFill>
+                          <a:effectLst/>
+                          <a:latin typeface="Calibri" panose="020F0502020204030204" pitchFamily="34" charset="0"/>
+                        </a:rPr>
+                        <a:t>72.06</a:t>
+                      </a:r>
+                    </a:p>
+                  </a:txBody>
+                  <a:tcPr marL="6350" marR="6350" marT="6350" marB="0" anchor="ctr">
+                    <a:lnL w="6350" cap="flat" cmpd="sng" algn="ctr">
+                      <a:solidFill>
+                        <a:srgbClr val="000000"/>
+                      </a:solidFill>
+                      <a:prstDash val="solid"/>
+                      <a:round/>
+                      <a:headEnd type="none" w="med" len="med"/>
+                      <a:tailEnd type="none" w="med" len="med"/>
+                    </a:lnL>
+                    <a:lnR w="6350" cap="flat" cmpd="sng" algn="ctr">
+                      <a:solidFill>
+                        <a:srgbClr val="000000"/>
+                      </a:solidFill>
+                      <a:prstDash val="solid"/>
+                      <a:round/>
+                      <a:headEnd type="none" w="med" len="med"/>
+                      <a:tailEnd type="none" w="med" len="med"/>
+                    </a:lnR>
+                    <a:lnT w="6350" cap="flat" cmpd="sng" algn="ctr">
+                      <a:solidFill>
+                        <a:srgbClr val="000000"/>
+                      </a:solidFill>
+                      <a:prstDash val="solid"/>
+                      <a:round/>
+                      <a:headEnd type="none" w="med" len="med"/>
+                      <a:tailEnd type="none" w="med" len="med"/>
+                    </a:lnT>
+                    <a:lnB w="6350" cap="flat" cmpd="sng" algn="ctr">
+                      <a:solidFill>
+                        <a:srgbClr val="000000"/>
+                      </a:solidFill>
+                      <a:prstDash val="solid"/>
+                      <a:round/>
+                      <a:headEnd type="none" w="med" len="med"/>
+                      <a:tailEnd type="none" w="med" len="med"/>
+                    </a:lnB>
+                  </a:tcPr>
+                </a:tc>
+                <a:extLst>
+                  <a:ext uri="{0D108BD9-81ED-4DB2-BD59-A6C34878D82A}">
+                    <a16:rowId xmlns:a16="http://schemas.microsoft.com/office/drawing/2014/main" val="576830120"/>
+                  </a:ext>
+                </a:extLst>
+              </a:tr>
+              <a:tr h="219274">
+                <a:tc>
+                  <a:txBody>
+                    <a:bodyPr/>
+                    <a:lstStyle/>
+                    <a:p>
+                      <a:pPr algn="ctr" fontAlgn="ctr"/>
+                      <a:r>
+                        <a:rPr lang="en-US" sz="1100" b="1" i="0" u="none" strike="noStrike">
+                          <a:solidFill>
+                            <a:srgbClr val="000000"/>
+                          </a:solidFill>
+                          <a:effectLst/>
+                          <a:latin typeface="Calibri" panose="020F0502020204030204" pitchFamily="34" charset="0"/>
+                        </a:rPr>
+                        <a:t>Python ResNet18</a:t>
+                      </a:r>
+                    </a:p>
+                  </a:txBody>
+                  <a:tcPr marL="6350" marR="6350" marT="6350" marB="0" anchor="ctr">
+                    <a:lnL w="6350" cap="flat" cmpd="sng" algn="ctr">
+                      <a:solidFill>
+                        <a:srgbClr val="000000"/>
+                      </a:solidFill>
+                      <a:prstDash val="solid"/>
+                      <a:round/>
+                      <a:headEnd type="none" w="med" len="med"/>
+                      <a:tailEnd type="none" w="med" len="med"/>
+                    </a:lnL>
+                    <a:lnR w="6350" cap="flat" cmpd="sng" algn="ctr">
+                      <a:solidFill>
+                        <a:srgbClr val="000000"/>
+                      </a:solidFill>
+                      <a:prstDash val="solid"/>
+                      <a:round/>
+                      <a:headEnd type="none" w="med" len="med"/>
+                      <a:tailEnd type="none" w="med" len="med"/>
+                    </a:lnR>
+                    <a:lnT w="6350" cap="flat" cmpd="sng" algn="ctr">
+                      <a:solidFill>
+                        <a:srgbClr val="000000"/>
+                      </a:solidFill>
+                      <a:prstDash val="solid"/>
+                      <a:round/>
+                      <a:headEnd type="none" w="med" len="med"/>
+                      <a:tailEnd type="none" w="med" len="med"/>
+                    </a:lnT>
+                    <a:lnB w="6350" cap="flat" cmpd="sng" algn="ctr">
+                      <a:solidFill>
+                        <a:srgbClr val="000000"/>
+                      </a:solidFill>
+                      <a:prstDash val="solid"/>
+                      <a:round/>
+                      <a:headEnd type="none" w="med" len="med"/>
+                      <a:tailEnd type="none" w="med" len="med"/>
+                    </a:lnB>
+                    <a:solidFill>
+                      <a:srgbClr val="D9E1F2"/>
+                    </a:solidFill>
+                  </a:tcPr>
+                </a:tc>
+                <a:tc>
+                  <a:txBody>
+                    <a:bodyPr/>
+                    <a:lstStyle/>
+                    <a:p>
+                      <a:pPr algn="ctr" fontAlgn="ctr"/>
+                      <a:r>
+                        <a:rPr lang="en-US" sz="1100" b="0" i="0" u="none" strike="noStrike">
+                          <a:solidFill>
+                            <a:srgbClr val="000000"/>
+                          </a:solidFill>
+                          <a:effectLst/>
+                          <a:latin typeface="Calibri" panose="020F0502020204030204" pitchFamily="34" charset="0"/>
+                        </a:rPr>
+                        <a:t>1289.118005</a:t>
+                      </a:r>
+                    </a:p>
+                  </a:txBody>
+                  <a:tcPr marL="6350" marR="6350" marT="6350" marB="0" anchor="ctr">
+                    <a:lnL w="6350" cap="flat" cmpd="sng" algn="ctr">
+                      <a:solidFill>
+                        <a:srgbClr val="000000"/>
+                      </a:solidFill>
+                      <a:prstDash val="solid"/>
+                      <a:round/>
+                      <a:headEnd type="none" w="med" len="med"/>
+                      <a:tailEnd type="none" w="med" len="med"/>
+                    </a:lnL>
+                    <a:lnR w="6350" cap="flat" cmpd="sng" algn="ctr">
+                      <a:solidFill>
+                        <a:srgbClr val="000000"/>
+                      </a:solidFill>
+                      <a:prstDash val="solid"/>
+                      <a:round/>
+                      <a:headEnd type="none" w="med" len="med"/>
+                      <a:tailEnd type="none" w="med" len="med"/>
+                    </a:lnR>
+                    <a:lnT w="6350" cap="flat" cmpd="sng" algn="ctr">
+                      <a:solidFill>
+                        <a:srgbClr val="000000"/>
+                      </a:solidFill>
+                      <a:prstDash val="solid"/>
+                      <a:round/>
+                      <a:headEnd type="none" w="med" len="med"/>
+                      <a:tailEnd type="none" w="med" len="med"/>
+                    </a:lnT>
+                    <a:lnB w="6350" cap="flat" cmpd="sng" algn="ctr">
+                      <a:solidFill>
+                        <a:srgbClr val="000000"/>
+                      </a:solidFill>
+                      <a:prstDash val="solid"/>
+                      <a:round/>
+                      <a:headEnd type="none" w="med" len="med"/>
+                      <a:tailEnd type="none" w="med" len="med"/>
+                    </a:lnB>
+                    <a:solidFill>
+                      <a:srgbClr val="D9E1F2"/>
+                    </a:solidFill>
+                  </a:tcPr>
+                </a:tc>
+                <a:tc>
+                  <a:txBody>
+                    <a:bodyPr/>
+                    <a:lstStyle/>
+                    <a:p>
+                      <a:pPr algn="ctr" fontAlgn="ctr"/>
+                      <a:r>
+                        <a:rPr lang="en-US" sz="1100" b="0" i="0" u="none" strike="noStrike">
+                          <a:solidFill>
+                            <a:srgbClr val="000000"/>
+                          </a:solidFill>
+                          <a:effectLst/>
+                          <a:latin typeface="Calibri" panose="020F0502020204030204" pitchFamily="34" charset="0"/>
+                        </a:rPr>
+                        <a:t>25.77832627</a:t>
+                      </a:r>
+                    </a:p>
+                  </a:txBody>
+                  <a:tcPr marL="6350" marR="6350" marT="6350" marB="0" anchor="ctr">
+                    <a:lnL w="6350" cap="flat" cmpd="sng" algn="ctr">
+                      <a:solidFill>
+                        <a:srgbClr val="000000"/>
+                      </a:solidFill>
+                      <a:prstDash val="solid"/>
+                      <a:round/>
+                      <a:headEnd type="none" w="med" len="med"/>
+                      <a:tailEnd type="none" w="med" len="med"/>
+                    </a:lnL>
+                    <a:lnR w="6350" cap="flat" cmpd="sng" algn="ctr">
+                      <a:solidFill>
+                        <a:srgbClr val="000000"/>
+                      </a:solidFill>
+                      <a:prstDash val="solid"/>
+                      <a:round/>
+                      <a:headEnd type="none" w="med" len="med"/>
+                      <a:tailEnd type="none" w="med" len="med"/>
+                    </a:lnR>
+                    <a:lnT w="6350" cap="flat" cmpd="sng" algn="ctr">
+                      <a:solidFill>
+                        <a:srgbClr val="000000"/>
+                      </a:solidFill>
+                      <a:prstDash val="solid"/>
+                      <a:round/>
+                      <a:headEnd type="none" w="med" len="med"/>
+                      <a:tailEnd type="none" w="med" len="med"/>
+                    </a:lnT>
+                    <a:lnB w="6350" cap="flat" cmpd="sng" algn="ctr">
+                      <a:solidFill>
+                        <a:srgbClr val="000000"/>
+                      </a:solidFill>
+                      <a:prstDash val="solid"/>
+                      <a:round/>
+                      <a:headEnd type="none" w="med" len="med"/>
+                      <a:tailEnd type="none" w="med" len="med"/>
+                    </a:lnB>
+                    <a:solidFill>
+                      <a:srgbClr val="D9E1F2"/>
+                    </a:solidFill>
+                  </a:tcPr>
+                </a:tc>
+                <a:tc>
+                  <a:txBody>
+                    <a:bodyPr/>
+                    <a:lstStyle/>
+                    <a:p>
+                      <a:pPr algn="ctr" fontAlgn="ctr"/>
+                      <a:r>
+                        <a:rPr lang="en-US" sz="1100" b="0" i="0" u="none" strike="noStrike">
+                          <a:solidFill>
+                            <a:srgbClr val="000000"/>
+                          </a:solidFill>
+                          <a:effectLst/>
+                          <a:latin typeface="Calibri" panose="020F0502020204030204" pitchFamily="34" charset="0"/>
+                        </a:rPr>
+                        <a:t>2.30788256</a:t>
+                      </a:r>
+                    </a:p>
+                  </a:txBody>
+                  <a:tcPr marL="6350" marR="6350" marT="6350" marB="0" anchor="ctr">
+                    <a:lnL w="6350" cap="flat" cmpd="sng" algn="ctr">
+                      <a:solidFill>
+                        <a:srgbClr val="000000"/>
+                      </a:solidFill>
+                      <a:prstDash val="solid"/>
+                      <a:round/>
+                      <a:headEnd type="none" w="med" len="med"/>
+                      <a:tailEnd type="none" w="med" len="med"/>
+                    </a:lnL>
+                    <a:lnR w="6350" cap="flat" cmpd="sng" algn="ctr">
+                      <a:solidFill>
+                        <a:srgbClr val="000000"/>
+                      </a:solidFill>
+                      <a:prstDash val="solid"/>
+                      <a:round/>
+                      <a:headEnd type="none" w="med" len="med"/>
+                      <a:tailEnd type="none" w="med" len="med"/>
+                    </a:lnR>
+                    <a:lnT w="6350" cap="flat" cmpd="sng" algn="ctr">
+                      <a:solidFill>
+                        <a:srgbClr val="000000"/>
+                      </a:solidFill>
+                      <a:prstDash val="solid"/>
+                      <a:round/>
+                      <a:headEnd type="none" w="med" len="med"/>
+                      <a:tailEnd type="none" w="med" len="med"/>
+                    </a:lnT>
+                    <a:lnB w="6350" cap="flat" cmpd="sng" algn="ctr">
+                      <a:solidFill>
+                        <a:srgbClr val="000000"/>
+                      </a:solidFill>
+                      <a:prstDash val="solid"/>
+                      <a:round/>
+                      <a:headEnd type="none" w="med" len="med"/>
+                      <a:tailEnd type="none" w="med" len="med"/>
+                    </a:lnB>
+                    <a:solidFill>
+                      <a:srgbClr val="D9E1F2"/>
+                    </a:solidFill>
+                  </a:tcPr>
+                </a:tc>
+                <a:tc>
+                  <a:txBody>
+                    <a:bodyPr/>
+                    <a:lstStyle/>
+                    <a:p>
+                      <a:pPr algn="ctr" fontAlgn="ctr"/>
+                      <a:r>
+                        <a:rPr lang="en-US" sz="1100" b="0" i="0" u="none" strike="noStrike">
+                          <a:solidFill>
+                            <a:srgbClr val="000000"/>
+                          </a:solidFill>
+                          <a:effectLst/>
+                          <a:latin typeface="Calibri" panose="020F0502020204030204" pitchFamily="34" charset="0"/>
+                        </a:rPr>
+                        <a:t>0.107002093</a:t>
+                      </a:r>
+                    </a:p>
+                  </a:txBody>
+                  <a:tcPr marL="6350" marR="6350" marT="6350" marB="0" anchor="ctr">
+                    <a:lnL w="6350" cap="flat" cmpd="sng" algn="ctr">
+                      <a:solidFill>
+                        <a:srgbClr val="000000"/>
+                      </a:solidFill>
+                      <a:prstDash val="solid"/>
+                      <a:round/>
+                      <a:headEnd type="none" w="med" len="med"/>
+                      <a:tailEnd type="none" w="med" len="med"/>
+                    </a:lnL>
+                    <a:lnR w="6350" cap="flat" cmpd="sng" algn="ctr">
+                      <a:solidFill>
+                        <a:srgbClr val="000000"/>
+                      </a:solidFill>
+                      <a:prstDash val="solid"/>
+                      <a:round/>
+                      <a:headEnd type="none" w="med" len="med"/>
+                      <a:tailEnd type="none" w="med" len="med"/>
+                    </a:lnR>
+                    <a:lnT w="6350" cap="flat" cmpd="sng" algn="ctr">
+                      <a:solidFill>
+                        <a:srgbClr val="000000"/>
+                      </a:solidFill>
+                      <a:prstDash val="solid"/>
+                      <a:round/>
+                      <a:headEnd type="none" w="med" len="med"/>
+                      <a:tailEnd type="none" w="med" len="med"/>
+                    </a:lnT>
+                    <a:lnB w="6350" cap="flat" cmpd="sng" algn="ctr">
+                      <a:solidFill>
+                        <a:srgbClr val="000000"/>
+                      </a:solidFill>
+                      <a:prstDash val="solid"/>
+                      <a:round/>
+                      <a:headEnd type="none" w="med" len="med"/>
+                      <a:tailEnd type="none" w="med" len="med"/>
+                    </a:lnB>
+                    <a:solidFill>
+                      <a:srgbClr val="D9E1F2"/>
+                    </a:solidFill>
+                  </a:tcPr>
+                </a:tc>
+                <a:tc>
+                  <a:txBody>
+                    <a:bodyPr/>
+                    <a:lstStyle/>
+                    <a:p>
+                      <a:pPr algn="ctr" fontAlgn="ctr"/>
+                      <a:r>
+                        <a:rPr lang="en-US" sz="1100" b="0" i="0" u="none" strike="noStrike">
+                          <a:solidFill>
+                            <a:srgbClr val="000000"/>
+                          </a:solidFill>
+                          <a:effectLst/>
+                          <a:latin typeface="Calibri" panose="020F0502020204030204" pitchFamily="34" charset="0"/>
+                        </a:rPr>
+                        <a:t>96.238</a:t>
+                      </a:r>
+                    </a:p>
+                  </a:txBody>
+                  <a:tcPr marL="6350" marR="6350" marT="6350" marB="0" anchor="ctr">
+                    <a:lnL w="6350" cap="flat" cmpd="sng" algn="ctr">
+                      <a:solidFill>
+                        <a:srgbClr val="000000"/>
+                      </a:solidFill>
+                      <a:prstDash val="solid"/>
+                      <a:round/>
+                      <a:headEnd type="none" w="med" len="med"/>
+                      <a:tailEnd type="none" w="med" len="med"/>
+                    </a:lnL>
+                    <a:lnR w="6350" cap="flat" cmpd="sng" algn="ctr">
+                      <a:solidFill>
+                        <a:srgbClr val="000000"/>
+                      </a:solidFill>
+                      <a:prstDash val="solid"/>
+                      <a:round/>
+                      <a:headEnd type="none" w="med" len="med"/>
+                      <a:tailEnd type="none" w="med" len="med"/>
+                    </a:lnR>
+                    <a:lnT w="6350" cap="flat" cmpd="sng" algn="ctr">
+                      <a:solidFill>
+                        <a:srgbClr val="000000"/>
+                      </a:solidFill>
+                      <a:prstDash val="solid"/>
+                      <a:round/>
+                      <a:headEnd type="none" w="med" len="med"/>
+                      <a:tailEnd type="none" w="med" len="med"/>
+                    </a:lnT>
+                    <a:lnB w="6350" cap="flat" cmpd="sng" algn="ctr">
+                      <a:solidFill>
+                        <a:srgbClr val="000000"/>
+                      </a:solidFill>
+                      <a:prstDash val="solid"/>
+                      <a:round/>
+                      <a:headEnd type="none" w="med" len="med"/>
+                      <a:tailEnd type="none" w="med" len="med"/>
+                    </a:lnB>
+                    <a:solidFill>
+                      <a:srgbClr val="D9E1F2"/>
+                    </a:solidFill>
+                  </a:tcPr>
+                </a:tc>
+                <a:tc>
+                  <a:txBody>
+                    <a:bodyPr/>
+                    <a:lstStyle/>
+                    <a:p>
+                      <a:pPr algn="ctr" fontAlgn="ctr"/>
+                      <a:r>
+                        <a:rPr lang="en-US" sz="1100" b="0" i="0" u="none" strike="noStrike">
+                          <a:solidFill>
+                            <a:srgbClr val="000000"/>
+                          </a:solidFill>
+                          <a:effectLst/>
+                          <a:latin typeface="Calibri" panose="020F0502020204030204" pitchFamily="34" charset="0"/>
+                        </a:rPr>
+                        <a:t>0.449515</a:t>
+                      </a:r>
+                    </a:p>
+                  </a:txBody>
+                  <a:tcPr marL="6350" marR="6350" marT="6350" marB="0" anchor="ctr">
+                    <a:lnL w="6350" cap="flat" cmpd="sng" algn="ctr">
+                      <a:solidFill>
+                        <a:srgbClr val="000000"/>
+                      </a:solidFill>
+                      <a:prstDash val="solid"/>
+                      <a:round/>
+                      <a:headEnd type="none" w="med" len="med"/>
+                      <a:tailEnd type="none" w="med" len="med"/>
+                    </a:lnL>
+                    <a:lnR w="6350" cap="flat" cmpd="sng" algn="ctr">
+                      <a:solidFill>
+                        <a:srgbClr val="000000"/>
+                      </a:solidFill>
+                      <a:prstDash val="solid"/>
+                      <a:round/>
+                      <a:headEnd type="none" w="med" len="med"/>
+                      <a:tailEnd type="none" w="med" len="med"/>
+                    </a:lnR>
+                    <a:lnT w="6350" cap="flat" cmpd="sng" algn="ctr">
+                      <a:solidFill>
+                        <a:srgbClr val="000000"/>
+                      </a:solidFill>
+                      <a:prstDash val="solid"/>
+                      <a:round/>
+                      <a:headEnd type="none" w="med" len="med"/>
+                      <a:tailEnd type="none" w="med" len="med"/>
+                    </a:lnT>
+                    <a:lnB w="6350" cap="flat" cmpd="sng" algn="ctr">
+                      <a:solidFill>
+                        <a:srgbClr val="000000"/>
+                      </a:solidFill>
+                      <a:prstDash val="solid"/>
+                      <a:round/>
+                      <a:headEnd type="none" w="med" len="med"/>
+                      <a:tailEnd type="none" w="med" len="med"/>
+                    </a:lnB>
+                    <a:solidFill>
+                      <a:srgbClr val="D9E1F2"/>
+                    </a:solidFill>
+                  </a:tcPr>
+                </a:tc>
+                <a:tc>
+                  <a:txBody>
+                    <a:bodyPr/>
+                    <a:lstStyle/>
+                    <a:p>
+                      <a:pPr algn="ctr" fontAlgn="ctr"/>
+                      <a:r>
+                        <a:rPr lang="en-US" sz="1100" b="0" i="0" u="none" strike="noStrike">
+                          <a:solidFill>
+                            <a:srgbClr val="000000"/>
+                          </a:solidFill>
+                          <a:effectLst/>
+                          <a:latin typeface="Calibri" panose="020F0502020204030204" pitchFamily="34" charset="0"/>
+                        </a:rPr>
+                        <a:t>88.41</a:t>
+                      </a:r>
+                    </a:p>
+                  </a:txBody>
+                  <a:tcPr marL="6350" marR="6350" marT="6350" marB="0" anchor="ctr">
+                    <a:lnL w="6350" cap="flat" cmpd="sng" algn="ctr">
+                      <a:solidFill>
+                        <a:srgbClr val="000000"/>
+                      </a:solidFill>
+                      <a:prstDash val="solid"/>
+                      <a:round/>
+                      <a:headEnd type="none" w="med" len="med"/>
+                      <a:tailEnd type="none" w="med" len="med"/>
+                    </a:lnL>
+                    <a:lnR w="6350" cap="flat" cmpd="sng" algn="ctr">
+                      <a:solidFill>
+                        <a:srgbClr val="000000"/>
+                      </a:solidFill>
+                      <a:prstDash val="solid"/>
+                      <a:round/>
+                      <a:headEnd type="none" w="med" len="med"/>
+                      <a:tailEnd type="none" w="med" len="med"/>
+                    </a:lnR>
+                    <a:lnT w="6350" cap="flat" cmpd="sng" algn="ctr">
+                      <a:solidFill>
+                        <a:srgbClr val="000000"/>
+                      </a:solidFill>
+                      <a:prstDash val="solid"/>
+                      <a:round/>
+                      <a:headEnd type="none" w="med" len="med"/>
+                      <a:tailEnd type="none" w="med" len="med"/>
+                    </a:lnT>
+                    <a:lnB w="6350" cap="flat" cmpd="sng" algn="ctr">
+                      <a:solidFill>
+                        <a:srgbClr val="000000"/>
+                      </a:solidFill>
+                      <a:prstDash val="solid"/>
+                      <a:round/>
+                      <a:headEnd type="none" w="med" len="med"/>
+                      <a:tailEnd type="none" w="med" len="med"/>
+                    </a:lnB>
+                    <a:solidFill>
+                      <a:srgbClr val="D9E1F2"/>
+                    </a:solidFill>
+                  </a:tcPr>
+                </a:tc>
+                <a:extLst>
+                  <a:ext uri="{0D108BD9-81ED-4DB2-BD59-A6C34878D82A}">
+                    <a16:rowId xmlns:a16="http://schemas.microsoft.com/office/drawing/2014/main" val="647069278"/>
+                  </a:ext>
+                </a:extLst>
+              </a:tr>
+              <a:tr h="219274">
+                <a:tc>
+                  <a:txBody>
+                    <a:bodyPr/>
+                    <a:lstStyle/>
+                    <a:p>
+                      <a:pPr algn="ctr" fontAlgn="ctr"/>
+                      <a:r>
+                        <a:rPr lang="en-US" sz="1100" b="1" i="0" u="none" strike="noStrike">
+                          <a:solidFill>
+                            <a:srgbClr val="000000"/>
+                          </a:solidFill>
+                          <a:effectLst/>
+                          <a:latin typeface="Calibri" panose="020F0502020204030204" pitchFamily="34" charset="0"/>
+                        </a:rPr>
+                        <a:t>Python ResNet34</a:t>
+                      </a:r>
+                    </a:p>
+                  </a:txBody>
+                  <a:tcPr marL="6350" marR="6350" marT="6350" marB="0" anchor="ctr">
+                    <a:lnL w="6350" cap="flat" cmpd="sng" algn="ctr">
+                      <a:solidFill>
+                        <a:srgbClr val="000000"/>
+                      </a:solidFill>
+                      <a:prstDash val="solid"/>
+                      <a:round/>
+                      <a:headEnd type="none" w="med" len="med"/>
+                      <a:tailEnd type="none" w="med" len="med"/>
+                    </a:lnL>
+                    <a:lnR w="6350" cap="flat" cmpd="sng" algn="ctr">
+                      <a:solidFill>
+                        <a:srgbClr val="000000"/>
+                      </a:solidFill>
+                      <a:prstDash val="solid"/>
+                      <a:round/>
+                      <a:headEnd type="none" w="med" len="med"/>
+                      <a:tailEnd type="none" w="med" len="med"/>
+                    </a:lnR>
+                    <a:lnT w="6350" cap="flat" cmpd="sng" algn="ctr">
+                      <a:solidFill>
+                        <a:srgbClr val="000000"/>
+                      </a:solidFill>
+                      <a:prstDash val="solid"/>
+                      <a:round/>
+                      <a:headEnd type="none" w="med" len="med"/>
+                      <a:tailEnd type="none" w="med" len="med"/>
+                    </a:lnT>
+                    <a:lnB w="6350" cap="flat" cmpd="sng" algn="ctr">
+                      <a:solidFill>
+                        <a:srgbClr val="000000"/>
+                      </a:solidFill>
+                      <a:prstDash val="solid"/>
+                      <a:round/>
+                      <a:headEnd type="none" w="med" len="med"/>
+                      <a:tailEnd type="none" w="med" len="med"/>
+                    </a:lnB>
+                  </a:tcPr>
+                </a:tc>
+                <a:tc>
+                  <a:txBody>
+                    <a:bodyPr/>
+                    <a:lstStyle/>
+                    <a:p>
+                      <a:pPr algn="ctr" fontAlgn="ctr"/>
+                      <a:r>
+                        <a:rPr lang="en-US" sz="1100" b="0" i="0" u="none" strike="noStrike">
+                          <a:solidFill>
+                            <a:srgbClr val="000000"/>
+                          </a:solidFill>
+                          <a:effectLst/>
+                          <a:latin typeface="Calibri" panose="020F0502020204030204" pitchFamily="34" charset="0"/>
+                        </a:rPr>
+                        <a:t>2327.167102</a:t>
+                      </a:r>
+                    </a:p>
+                  </a:txBody>
+                  <a:tcPr marL="6350" marR="6350" marT="6350" marB="0" anchor="ctr">
+                    <a:lnL w="6350" cap="flat" cmpd="sng" algn="ctr">
+                      <a:solidFill>
+                        <a:srgbClr val="000000"/>
+                      </a:solidFill>
+                      <a:prstDash val="solid"/>
+                      <a:round/>
+                      <a:headEnd type="none" w="med" len="med"/>
+                      <a:tailEnd type="none" w="med" len="med"/>
+                    </a:lnL>
+                    <a:lnR w="6350" cap="flat" cmpd="sng" algn="ctr">
+                      <a:solidFill>
+                        <a:srgbClr val="000000"/>
+                      </a:solidFill>
+                      <a:prstDash val="solid"/>
+                      <a:round/>
+                      <a:headEnd type="none" w="med" len="med"/>
+                      <a:tailEnd type="none" w="med" len="med"/>
+                    </a:lnR>
+                    <a:lnT w="6350" cap="flat" cmpd="sng" algn="ctr">
+                      <a:solidFill>
+                        <a:srgbClr val="000000"/>
+                      </a:solidFill>
+                      <a:prstDash val="solid"/>
+                      <a:round/>
+                      <a:headEnd type="none" w="med" len="med"/>
+                      <a:tailEnd type="none" w="med" len="med"/>
+                    </a:lnT>
+                    <a:lnB w="6350" cap="flat" cmpd="sng" algn="ctr">
+                      <a:solidFill>
+                        <a:srgbClr val="000000"/>
+                      </a:solidFill>
+                      <a:prstDash val="solid"/>
+                      <a:round/>
+                      <a:headEnd type="none" w="med" len="med"/>
+                      <a:tailEnd type="none" w="med" len="med"/>
+                    </a:lnB>
+                  </a:tcPr>
+                </a:tc>
+                <a:tc>
+                  <a:txBody>
+                    <a:bodyPr/>
+                    <a:lstStyle/>
+                    <a:p>
+                      <a:pPr algn="ctr" fontAlgn="ctr"/>
+                      <a:r>
+                        <a:rPr lang="en-US" sz="1100" b="0" i="0" u="none" strike="noStrike">
+                          <a:solidFill>
+                            <a:srgbClr val="000000"/>
+                          </a:solidFill>
+                          <a:effectLst/>
+                          <a:latin typeface="Calibri" panose="020F0502020204030204" pitchFamily="34" charset="0"/>
+                        </a:rPr>
+                        <a:t>45.23919889</a:t>
+                      </a:r>
+                    </a:p>
+                  </a:txBody>
+                  <a:tcPr marL="6350" marR="6350" marT="6350" marB="0" anchor="ctr">
+                    <a:lnL w="6350" cap="flat" cmpd="sng" algn="ctr">
+                      <a:solidFill>
+                        <a:srgbClr val="000000"/>
+                      </a:solidFill>
+                      <a:prstDash val="solid"/>
+                      <a:round/>
+                      <a:headEnd type="none" w="med" len="med"/>
+                      <a:tailEnd type="none" w="med" len="med"/>
+                    </a:lnL>
+                    <a:lnR w="6350" cap="flat" cmpd="sng" algn="ctr">
+                      <a:solidFill>
+                        <a:srgbClr val="000000"/>
+                      </a:solidFill>
+                      <a:prstDash val="solid"/>
+                      <a:round/>
+                      <a:headEnd type="none" w="med" len="med"/>
+                      <a:tailEnd type="none" w="med" len="med"/>
+                    </a:lnR>
+                    <a:lnT w="6350" cap="flat" cmpd="sng" algn="ctr">
+                      <a:solidFill>
+                        <a:srgbClr val="000000"/>
+                      </a:solidFill>
+                      <a:prstDash val="solid"/>
+                      <a:round/>
+                      <a:headEnd type="none" w="med" len="med"/>
+                      <a:tailEnd type="none" w="med" len="med"/>
+                    </a:lnT>
+                    <a:lnB w="6350" cap="flat" cmpd="sng" algn="ctr">
+                      <a:solidFill>
+                        <a:srgbClr val="000000"/>
+                      </a:solidFill>
+                      <a:prstDash val="solid"/>
+                      <a:round/>
+                      <a:headEnd type="none" w="med" len="med"/>
+                      <a:tailEnd type="none" w="med" len="med"/>
+                    </a:lnB>
+                  </a:tcPr>
+                </a:tc>
+                <a:tc>
+                  <a:txBody>
+                    <a:bodyPr/>
+                    <a:lstStyle/>
+                    <a:p>
+                      <a:pPr algn="ctr" fontAlgn="ctr"/>
+                      <a:r>
+                        <a:rPr lang="en-US" sz="1100" b="0" i="0" u="none" strike="noStrike">
+                          <a:solidFill>
+                            <a:srgbClr val="000000"/>
+                          </a:solidFill>
+                          <a:effectLst/>
+                          <a:latin typeface="Calibri" panose="020F0502020204030204" pitchFamily="34" charset="0"/>
+                        </a:rPr>
+                        <a:t>3.968456321</a:t>
+                      </a:r>
+                    </a:p>
+                  </a:txBody>
+                  <a:tcPr marL="6350" marR="6350" marT="6350" marB="0" anchor="ctr">
+                    <a:lnL w="6350" cap="flat" cmpd="sng" algn="ctr">
+                      <a:solidFill>
+                        <a:srgbClr val="000000"/>
+                      </a:solidFill>
+                      <a:prstDash val="solid"/>
+                      <a:round/>
+                      <a:headEnd type="none" w="med" len="med"/>
+                      <a:tailEnd type="none" w="med" len="med"/>
+                    </a:lnL>
+                    <a:lnR w="6350" cap="flat" cmpd="sng" algn="ctr">
+                      <a:solidFill>
+                        <a:srgbClr val="000000"/>
+                      </a:solidFill>
+                      <a:prstDash val="solid"/>
+                      <a:round/>
+                      <a:headEnd type="none" w="med" len="med"/>
+                      <a:tailEnd type="none" w="med" len="med"/>
+                    </a:lnR>
+                    <a:lnT w="6350" cap="flat" cmpd="sng" algn="ctr">
+                      <a:solidFill>
+                        <a:srgbClr val="000000"/>
+                      </a:solidFill>
+                      <a:prstDash val="solid"/>
+                      <a:round/>
+                      <a:headEnd type="none" w="med" len="med"/>
+                      <a:tailEnd type="none" w="med" len="med"/>
+                    </a:lnT>
+                    <a:lnB w="6350" cap="flat" cmpd="sng" algn="ctr">
+                      <a:solidFill>
+                        <a:srgbClr val="000000"/>
+                      </a:solidFill>
+                      <a:prstDash val="solid"/>
+                      <a:round/>
+                      <a:headEnd type="none" w="med" len="med"/>
+                      <a:tailEnd type="none" w="med" len="med"/>
+                    </a:lnB>
+                  </a:tcPr>
+                </a:tc>
+                <a:tc>
+                  <a:txBody>
+                    <a:bodyPr/>
+                    <a:lstStyle/>
+                    <a:p>
+                      <a:pPr algn="ctr" fontAlgn="ctr"/>
+                      <a:r>
+                        <a:rPr lang="en-US" sz="1100" b="0" i="0" u="none" strike="noStrike">
+                          <a:solidFill>
+                            <a:srgbClr val="000000"/>
+                          </a:solidFill>
+                          <a:effectLst/>
+                          <a:latin typeface="Calibri" panose="020F0502020204030204" pitchFamily="34" charset="0"/>
+                        </a:rPr>
+                        <a:t>0.119861529</a:t>
+                      </a:r>
+                    </a:p>
+                  </a:txBody>
+                  <a:tcPr marL="6350" marR="6350" marT="6350" marB="0" anchor="ctr">
+                    <a:lnL w="6350" cap="flat" cmpd="sng" algn="ctr">
+                      <a:solidFill>
+                        <a:srgbClr val="000000"/>
+                      </a:solidFill>
+                      <a:prstDash val="solid"/>
+                      <a:round/>
+                      <a:headEnd type="none" w="med" len="med"/>
+                      <a:tailEnd type="none" w="med" len="med"/>
+                    </a:lnL>
+                    <a:lnR w="6350" cap="flat" cmpd="sng" algn="ctr">
+                      <a:solidFill>
+                        <a:srgbClr val="000000"/>
+                      </a:solidFill>
+                      <a:prstDash val="solid"/>
+                      <a:round/>
+                      <a:headEnd type="none" w="med" len="med"/>
+                      <a:tailEnd type="none" w="med" len="med"/>
+                    </a:lnR>
+                    <a:lnT w="6350" cap="flat" cmpd="sng" algn="ctr">
+                      <a:solidFill>
+                        <a:srgbClr val="000000"/>
+                      </a:solidFill>
+                      <a:prstDash val="solid"/>
+                      <a:round/>
+                      <a:headEnd type="none" w="med" len="med"/>
+                      <a:tailEnd type="none" w="med" len="med"/>
+                    </a:lnT>
+                    <a:lnB w="6350" cap="flat" cmpd="sng" algn="ctr">
+                      <a:solidFill>
+                        <a:srgbClr val="000000"/>
+                      </a:solidFill>
+                      <a:prstDash val="solid"/>
+                      <a:round/>
+                      <a:headEnd type="none" w="med" len="med"/>
+                      <a:tailEnd type="none" w="med" len="med"/>
+                    </a:lnB>
+                  </a:tcPr>
+                </a:tc>
+                <a:tc>
+                  <a:txBody>
+                    <a:bodyPr/>
+                    <a:lstStyle/>
+                    <a:p>
+                      <a:pPr algn="ctr" fontAlgn="ctr"/>
+                      <a:r>
+                        <a:rPr lang="en-US" sz="1100" b="0" i="0" u="none" strike="noStrike">
+                          <a:solidFill>
+                            <a:srgbClr val="000000"/>
+                          </a:solidFill>
+                          <a:effectLst/>
+                          <a:latin typeface="Calibri" panose="020F0502020204030204" pitchFamily="34" charset="0"/>
+                        </a:rPr>
+                        <a:t>95.83</a:t>
+                      </a:r>
+                    </a:p>
+                  </a:txBody>
+                  <a:tcPr marL="6350" marR="6350" marT="6350" marB="0" anchor="ctr">
+                    <a:lnL w="6350" cap="flat" cmpd="sng" algn="ctr">
+                      <a:solidFill>
+                        <a:srgbClr val="000000"/>
+                      </a:solidFill>
+                      <a:prstDash val="solid"/>
+                      <a:round/>
+                      <a:headEnd type="none" w="med" len="med"/>
+                      <a:tailEnd type="none" w="med" len="med"/>
+                    </a:lnL>
+                    <a:lnR w="6350" cap="flat" cmpd="sng" algn="ctr">
+                      <a:solidFill>
+                        <a:srgbClr val="000000"/>
+                      </a:solidFill>
+                      <a:prstDash val="solid"/>
+                      <a:round/>
+                      <a:headEnd type="none" w="med" len="med"/>
+                      <a:tailEnd type="none" w="med" len="med"/>
+                    </a:lnR>
+                    <a:lnT w="6350" cap="flat" cmpd="sng" algn="ctr">
+                      <a:solidFill>
+                        <a:srgbClr val="000000"/>
+                      </a:solidFill>
+                      <a:prstDash val="solid"/>
+                      <a:round/>
+                      <a:headEnd type="none" w="med" len="med"/>
+                      <a:tailEnd type="none" w="med" len="med"/>
+                    </a:lnT>
+                    <a:lnB w="6350" cap="flat" cmpd="sng" algn="ctr">
+                      <a:solidFill>
+                        <a:srgbClr val="000000"/>
+                      </a:solidFill>
+                      <a:prstDash val="solid"/>
+                      <a:round/>
+                      <a:headEnd type="none" w="med" len="med"/>
+                      <a:tailEnd type="none" w="med" len="med"/>
+                    </a:lnB>
+                  </a:tcPr>
+                </a:tc>
+                <a:tc>
+                  <a:txBody>
+                    <a:bodyPr/>
+                    <a:lstStyle/>
+                    <a:p>
+                      <a:pPr algn="ctr" fontAlgn="ctr"/>
+                      <a:r>
+                        <a:rPr lang="en-US" sz="1100" b="0" i="0" u="none" strike="noStrike">
+                          <a:solidFill>
+                            <a:srgbClr val="000000"/>
+                          </a:solidFill>
+                          <a:effectLst/>
+                          <a:latin typeface="Calibri" panose="020F0502020204030204" pitchFamily="34" charset="0"/>
+                        </a:rPr>
+                        <a:t>0.4285611</a:t>
+                      </a:r>
+                    </a:p>
+                  </a:txBody>
+                  <a:tcPr marL="6350" marR="6350" marT="6350" marB="0" anchor="ctr">
+                    <a:lnL w="6350" cap="flat" cmpd="sng" algn="ctr">
+                      <a:solidFill>
+                        <a:srgbClr val="000000"/>
+                      </a:solidFill>
+                      <a:prstDash val="solid"/>
+                      <a:round/>
+                      <a:headEnd type="none" w="med" len="med"/>
+                      <a:tailEnd type="none" w="med" len="med"/>
+                    </a:lnL>
+                    <a:lnR w="6350" cap="flat" cmpd="sng" algn="ctr">
+                      <a:solidFill>
+                        <a:srgbClr val="000000"/>
+                      </a:solidFill>
+                      <a:prstDash val="solid"/>
+                      <a:round/>
+                      <a:headEnd type="none" w="med" len="med"/>
+                      <a:tailEnd type="none" w="med" len="med"/>
+                    </a:lnR>
+                    <a:lnT w="6350" cap="flat" cmpd="sng" algn="ctr">
+                      <a:solidFill>
+                        <a:srgbClr val="000000"/>
+                      </a:solidFill>
+                      <a:prstDash val="solid"/>
+                      <a:round/>
+                      <a:headEnd type="none" w="med" len="med"/>
+                      <a:tailEnd type="none" w="med" len="med"/>
+                    </a:lnT>
+                    <a:lnB w="6350" cap="flat" cmpd="sng" algn="ctr">
+                      <a:solidFill>
+                        <a:srgbClr val="000000"/>
+                      </a:solidFill>
+                      <a:prstDash val="solid"/>
+                      <a:round/>
+                      <a:headEnd type="none" w="med" len="med"/>
+                      <a:tailEnd type="none" w="med" len="med"/>
+                    </a:lnB>
+                  </a:tcPr>
+                </a:tc>
+                <a:tc>
+                  <a:txBody>
+                    <a:bodyPr/>
+                    <a:lstStyle/>
+                    <a:p>
+                      <a:pPr algn="ctr" fontAlgn="ctr"/>
+                      <a:r>
+                        <a:rPr lang="en-US" sz="1100" b="0" i="0" u="none" strike="noStrike" dirty="0">
+                          <a:solidFill>
+                            <a:srgbClr val="000000"/>
+                          </a:solidFill>
+                          <a:effectLst/>
+                          <a:latin typeface="Calibri" panose="020F0502020204030204" pitchFamily="34" charset="0"/>
+                        </a:rPr>
+                        <a:t>88.1</a:t>
+                      </a:r>
+                    </a:p>
+                  </a:txBody>
+                  <a:tcPr marL="6350" marR="6350" marT="6350" marB="0" anchor="ctr">
+                    <a:lnL w="6350" cap="flat" cmpd="sng" algn="ctr">
+                      <a:solidFill>
+                        <a:srgbClr val="000000"/>
+                      </a:solidFill>
+                      <a:prstDash val="solid"/>
+                      <a:round/>
+                      <a:headEnd type="none" w="med" len="med"/>
+                      <a:tailEnd type="none" w="med" len="med"/>
+                    </a:lnL>
+                    <a:lnR w="6350" cap="flat" cmpd="sng" algn="ctr">
+                      <a:solidFill>
+                        <a:srgbClr val="000000"/>
+                      </a:solidFill>
+                      <a:prstDash val="solid"/>
+                      <a:round/>
+                      <a:headEnd type="none" w="med" len="med"/>
+                      <a:tailEnd type="none" w="med" len="med"/>
+                    </a:lnR>
+                    <a:lnT w="6350" cap="flat" cmpd="sng" algn="ctr">
+                      <a:solidFill>
+                        <a:srgbClr val="000000"/>
+                      </a:solidFill>
+                      <a:prstDash val="solid"/>
+                      <a:round/>
+                      <a:headEnd type="none" w="med" len="med"/>
+                      <a:tailEnd type="none" w="med" len="med"/>
+                    </a:lnT>
+                    <a:lnB w="6350" cap="flat" cmpd="sng" algn="ctr">
+                      <a:solidFill>
+                        <a:srgbClr val="000000"/>
+                      </a:solidFill>
+                      <a:prstDash val="solid"/>
+                      <a:round/>
+                      <a:headEnd type="none" w="med" len="med"/>
+                      <a:tailEnd type="none" w="med" len="med"/>
+                    </a:lnB>
+                  </a:tcPr>
+                </a:tc>
+                <a:extLst>
+                  <a:ext uri="{0D108BD9-81ED-4DB2-BD59-A6C34878D82A}">
+                    <a16:rowId xmlns:a16="http://schemas.microsoft.com/office/drawing/2014/main" val="1142535920"/>
+                  </a:ext>
+                </a:extLst>
+              </a:tr>
+            </a:tbl>
+          </a:graphicData>
+        </a:graphic>
+      </p:graphicFrame>
+      <p:graphicFrame>
+        <p:nvGraphicFramePr>
+          <p:cNvPr id="8" name="Table 7">
+            <a:extLst>
+              <a:ext uri="{FF2B5EF4-FFF2-40B4-BE49-F238E27FC236}">
+                <a16:creationId xmlns:a16="http://schemas.microsoft.com/office/drawing/2014/main" id="{33789A68-2B7A-BBC7-C3EF-0D52517380C2}"/>
+              </a:ext>
+            </a:extLst>
+          </p:cNvPr>
+          <p:cNvGraphicFramePr>
+            <a:graphicFrameLocks noGrp="1"/>
+          </p:cNvGraphicFramePr>
+          <p:nvPr>
+            <p:extLst>
+              <p:ext uri="{D42A27DB-BD31-4B8C-83A1-F6EECF244321}">
+                <p14:modId xmlns:p14="http://schemas.microsoft.com/office/powerpoint/2010/main" val="2961136850"/>
+              </p:ext>
+            </p:extLst>
+          </p:nvPr>
+        </p:nvGraphicFramePr>
+        <p:xfrm>
+          <a:off x="1145005" y="4715952"/>
+          <a:ext cx="9659353" cy="481690"/>
+        </p:xfrm>
+        <a:graphic>
+          <a:graphicData uri="http://schemas.openxmlformats.org/drawingml/2006/table">
+            <a:tbl>
+              <a:tblPr/>
+              <a:tblGrid>
+                <a:gridCol w="1921484">
+                  <a:extLst>
+                    <a:ext uri="{9D8B030D-6E8A-4147-A177-3AD203B41FA5}">
+                      <a16:colId xmlns:a16="http://schemas.microsoft.com/office/drawing/2014/main" val="2566735606"/>
+                    </a:ext>
+                  </a:extLst>
+                </a:gridCol>
+                <a:gridCol w="2198455">
+                  <a:extLst>
+                    <a:ext uri="{9D8B030D-6E8A-4147-A177-3AD203B41FA5}">
+                      <a16:colId xmlns:a16="http://schemas.microsoft.com/office/drawing/2014/main" val="80956412"/>
+                    </a:ext>
+                  </a:extLst>
+                </a:gridCol>
+                <a:gridCol w="1748378">
+                  <a:extLst>
+                    <a:ext uri="{9D8B030D-6E8A-4147-A177-3AD203B41FA5}">
+                      <a16:colId xmlns:a16="http://schemas.microsoft.com/office/drawing/2014/main" val="1619201816"/>
+                    </a:ext>
+                  </a:extLst>
+                </a:gridCol>
+                <a:gridCol w="2492736">
+                  <a:extLst>
+                    <a:ext uri="{9D8B030D-6E8A-4147-A177-3AD203B41FA5}">
+                      <a16:colId xmlns:a16="http://schemas.microsoft.com/office/drawing/2014/main" val="447066311"/>
+                    </a:ext>
+                  </a:extLst>
+                </a:gridCol>
+                <a:gridCol w="1298300">
+                  <a:extLst>
+                    <a:ext uri="{9D8B030D-6E8A-4147-A177-3AD203B41FA5}">
+                      <a16:colId xmlns:a16="http://schemas.microsoft.com/office/drawing/2014/main" val="2720417780"/>
+                    </a:ext>
+                  </a:extLst>
+                </a:gridCol>
+              </a:tblGrid>
+              <a:tr h="240845">
+                <a:tc>
+                  <a:txBody>
+                    <a:bodyPr/>
+                    <a:lstStyle/>
+                    <a:p>
+                      <a:pPr algn="ctr" fontAlgn="ctr"/>
+                      <a:r>
+                        <a:rPr lang="en-US" sz="1100" b="1" i="0" u="none" strike="noStrike">
+                          <a:solidFill>
+                            <a:srgbClr val="000000"/>
+                          </a:solidFill>
+                          <a:effectLst/>
+                          <a:latin typeface="Calibri" panose="020F0502020204030204" pitchFamily="34" charset="0"/>
+                        </a:rPr>
+                        <a:t>Hyper Parameters</a:t>
+                      </a:r>
+                    </a:p>
+                  </a:txBody>
+                  <a:tcPr marL="6350" marR="6350" marT="6350" marB="0" anchor="ctr">
+                    <a:lnL w="6350" cap="flat" cmpd="sng" algn="ctr">
+                      <a:solidFill>
+                        <a:srgbClr val="000000"/>
+                      </a:solidFill>
+                      <a:prstDash val="solid"/>
+                      <a:round/>
+                      <a:headEnd type="none" w="med" len="med"/>
+                      <a:tailEnd type="none" w="med" len="med"/>
+                    </a:lnL>
+                    <a:lnR w="6350" cap="flat" cmpd="sng" algn="ctr">
+                      <a:solidFill>
+                        <a:srgbClr val="000000"/>
+                      </a:solidFill>
+                      <a:prstDash val="solid"/>
+                      <a:round/>
+                      <a:headEnd type="none" w="med" len="med"/>
+                      <a:tailEnd type="none" w="med" len="med"/>
+                    </a:lnR>
+                    <a:lnT w="6350" cap="flat" cmpd="sng" algn="ctr">
+                      <a:solidFill>
+                        <a:srgbClr val="000000"/>
+                      </a:solidFill>
+                      <a:prstDash val="solid"/>
+                      <a:round/>
+                      <a:headEnd type="none" w="med" len="med"/>
+                      <a:tailEnd type="none" w="med" len="med"/>
+                    </a:lnT>
+                    <a:lnB w="6350" cap="flat" cmpd="sng" algn="ctr">
+                      <a:solidFill>
+                        <a:srgbClr val="000000"/>
+                      </a:solidFill>
+                      <a:prstDash val="solid"/>
+                      <a:round/>
+                      <a:headEnd type="none" w="med" len="med"/>
+                      <a:tailEnd type="none" w="med" len="med"/>
+                    </a:lnB>
+                  </a:tcPr>
+                </a:tc>
+                <a:tc>
+                  <a:txBody>
+                    <a:bodyPr/>
+                    <a:lstStyle/>
+                    <a:p>
+                      <a:pPr algn="ctr" fontAlgn="ctr"/>
+                      <a:r>
+                        <a:rPr lang="en-US" sz="1100" b="1" i="0" u="none" strike="noStrike">
+                          <a:solidFill>
+                            <a:srgbClr val="000000"/>
+                          </a:solidFill>
+                          <a:effectLst/>
+                          <a:latin typeface="Calibri" panose="020F0502020204030204" pitchFamily="34" charset="0"/>
+                        </a:rPr>
+                        <a:t># Epochs</a:t>
+                      </a:r>
+                    </a:p>
+                  </a:txBody>
+                  <a:tcPr marL="6350" marR="6350" marT="6350" marB="0" anchor="ctr">
+                    <a:lnL w="6350" cap="flat" cmpd="sng" algn="ctr">
+                      <a:solidFill>
+                        <a:srgbClr val="000000"/>
+                      </a:solidFill>
+                      <a:prstDash val="solid"/>
+                      <a:round/>
+                      <a:headEnd type="none" w="med" len="med"/>
+                      <a:tailEnd type="none" w="med" len="med"/>
+                    </a:lnL>
+                    <a:lnR w="6350" cap="flat" cmpd="sng" algn="ctr">
+                      <a:solidFill>
+                        <a:srgbClr val="000000"/>
+                      </a:solidFill>
+                      <a:prstDash val="solid"/>
+                      <a:round/>
+                      <a:headEnd type="none" w="med" len="med"/>
+                      <a:tailEnd type="none" w="med" len="med"/>
+                    </a:lnR>
+                    <a:lnT w="6350" cap="flat" cmpd="sng" algn="ctr">
+                      <a:solidFill>
+                        <a:srgbClr val="000000"/>
+                      </a:solidFill>
+                      <a:prstDash val="solid"/>
+                      <a:round/>
+                      <a:headEnd type="none" w="med" len="med"/>
+                      <a:tailEnd type="none" w="med" len="med"/>
+                    </a:lnT>
+                    <a:lnB w="6350" cap="flat" cmpd="sng" algn="ctr">
+                      <a:solidFill>
+                        <a:srgbClr val="000000"/>
+                      </a:solidFill>
+                      <a:prstDash val="solid"/>
+                      <a:round/>
+                      <a:headEnd type="none" w="med" len="med"/>
+                      <a:tailEnd type="none" w="med" len="med"/>
+                    </a:lnB>
+                  </a:tcPr>
+                </a:tc>
+                <a:tc>
+                  <a:txBody>
+                    <a:bodyPr/>
+                    <a:lstStyle/>
+                    <a:p>
+                      <a:pPr algn="ctr" fontAlgn="ctr"/>
+                      <a:r>
+                        <a:rPr lang="en-US" sz="1100" b="1" i="0" u="none" strike="noStrike">
+                          <a:solidFill>
+                            <a:srgbClr val="000000"/>
+                          </a:solidFill>
+                          <a:effectLst/>
+                          <a:latin typeface="Calibri" panose="020F0502020204030204" pitchFamily="34" charset="0"/>
+                        </a:rPr>
+                        <a:t>Learning Rate</a:t>
+                      </a:r>
+                    </a:p>
+                  </a:txBody>
+                  <a:tcPr marL="6350" marR="6350" marT="6350" marB="0" anchor="ctr">
+                    <a:lnL w="6350" cap="flat" cmpd="sng" algn="ctr">
+                      <a:solidFill>
+                        <a:srgbClr val="000000"/>
+                      </a:solidFill>
+                      <a:prstDash val="solid"/>
+                      <a:round/>
+                      <a:headEnd type="none" w="med" len="med"/>
+                      <a:tailEnd type="none" w="med" len="med"/>
+                    </a:lnL>
+                    <a:lnR w="6350" cap="flat" cmpd="sng" algn="ctr">
+                      <a:solidFill>
+                        <a:srgbClr val="000000"/>
+                      </a:solidFill>
+                      <a:prstDash val="solid"/>
+                      <a:round/>
+                      <a:headEnd type="none" w="med" len="med"/>
+                      <a:tailEnd type="none" w="med" len="med"/>
+                    </a:lnR>
+                    <a:lnT w="6350" cap="flat" cmpd="sng" algn="ctr">
+                      <a:solidFill>
+                        <a:srgbClr val="000000"/>
+                      </a:solidFill>
+                      <a:prstDash val="solid"/>
+                      <a:round/>
+                      <a:headEnd type="none" w="med" len="med"/>
+                      <a:tailEnd type="none" w="med" len="med"/>
+                    </a:lnT>
+                    <a:lnB w="6350" cap="flat" cmpd="sng" algn="ctr">
+                      <a:solidFill>
+                        <a:srgbClr val="000000"/>
+                      </a:solidFill>
+                      <a:prstDash val="solid"/>
+                      <a:round/>
+                      <a:headEnd type="none" w="med" len="med"/>
+                      <a:tailEnd type="none" w="med" len="med"/>
+                    </a:lnB>
+                  </a:tcPr>
+                </a:tc>
+                <a:tc>
+                  <a:txBody>
+                    <a:bodyPr/>
+                    <a:lstStyle/>
+                    <a:p>
+                      <a:pPr algn="ctr" fontAlgn="ctr"/>
+                      <a:r>
+                        <a:rPr lang="en-US" sz="1100" b="1" i="0" u="none" strike="noStrike">
+                          <a:solidFill>
+                            <a:srgbClr val="000000"/>
+                          </a:solidFill>
+                          <a:effectLst/>
+                          <a:latin typeface="Calibri" panose="020F0502020204030204" pitchFamily="34" charset="0"/>
+                        </a:rPr>
+                        <a:t>Momentum</a:t>
+                      </a:r>
+                    </a:p>
+                  </a:txBody>
+                  <a:tcPr marL="6350" marR="6350" marT="6350" marB="0" anchor="ctr">
+                    <a:lnL w="6350" cap="flat" cmpd="sng" algn="ctr">
+                      <a:solidFill>
+                        <a:srgbClr val="000000"/>
+                      </a:solidFill>
+                      <a:prstDash val="solid"/>
+                      <a:round/>
+                      <a:headEnd type="none" w="med" len="med"/>
+                      <a:tailEnd type="none" w="med" len="med"/>
+                    </a:lnL>
+                    <a:lnR w="6350" cap="flat" cmpd="sng" algn="ctr">
+                      <a:solidFill>
+                        <a:srgbClr val="000000"/>
+                      </a:solidFill>
+                      <a:prstDash val="solid"/>
+                      <a:round/>
+                      <a:headEnd type="none" w="med" len="med"/>
+                      <a:tailEnd type="none" w="med" len="med"/>
+                    </a:lnR>
+                    <a:lnT w="6350" cap="flat" cmpd="sng" algn="ctr">
+                      <a:solidFill>
+                        <a:srgbClr val="000000"/>
+                      </a:solidFill>
+                      <a:prstDash val="solid"/>
+                      <a:round/>
+                      <a:headEnd type="none" w="med" len="med"/>
+                      <a:tailEnd type="none" w="med" len="med"/>
+                    </a:lnT>
+                    <a:lnB w="6350" cap="flat" cmpd="sng" algn="ctr">
+                      <a:solidFill>
+                        <a:srgbClr val="000000"/>
+                      </a:solidFill>
+                      <a:prstDash val="solid"/>
+                      <a:round/>
+                      <a:headEnd type="none" w="med" len="med"/>
+                      <a:tailEnd type="none" w="med" len="med"/>
+                    </a:lnB>
+                  </a:tcPr>
+                </a:tc>
+                <a:tc>
+                  <a:txBody>
+                    <a:bodyPr/>
+                    <a:lstStyle/>
+                    <a:p>
+                      <a:pPr algn="ctr" fontAlgn="ctr"/>
+                      <a:r>
+                        <a:rPr lang="en-US" sz="1100" b="1" i="0" u="none" strike="noStrike">
+                          <a:solidFill>
+                            <a:srgbClr val="000000"/>
+                          </a:solidFill>
+                          <a:effectLst/>
+                          <a:latin typeface="Calibri" panose="020F0502020204030204" pitchFamily="34" charset="0"/>
+                        </a:rPr>
+                        <a:t># Workers</a:t>
+                      </a:r>
+                    </a:p>
+                  </a:txBody>
+                  <a:tcPr marL="6350" marR="6350" marT="6350" marB="0" anchor="ctr">
+                    <a:lnL w="6350" cap="flat" cmpd="sng" algn="ctr">
+                      <a:solidFill>
+                        <a:srgbClr val="000000"/>
+                      </a:solidFill>
+                      <a:prstDash val="solid"/>
+                      <a:round/>
+                      <a:headEnd type="none" w="med" len="med"/>
+                      <a:tailEnd type="none" w="med" len="med"/>
+                    </a:lnL>
+                    <a:lnR w="6350" cap="flat" cmpd="sng" algn="ctr">
+                      <a:solidFill>
+                        <a:srgbClr val="000000"/>
+                      </a:solidFill>
+                      <a:prstDash val="solid"/>
+                      <a:round/>
+                      <a:headEnd type="none" w="med" len="med"/>
+                      <a:tailEnd type="none" w="med" len="med"/>
+                    </a:lnR>
+                    <a:lnT w="6350" cap="flat" cmpd="sng" algn="ctr">
+                      <a:solidFill>
+                        <a:srgbClr val="000000"/>
+                      </a:solidFill>
+                      <a:prstDash val="solid"/>
+                      <a:round/>
+                      <a:headEnd type="none" w="med" len="med"/>
+                      <a:tailEnd type="none" w="med" len="med"/>
+                    </a:lnT>
+                    <a:lnB w="6350" cap="flat" cmpd="sng" algn="ctr">
+                      <a:solidFill>
+                        <a:srgbClr val="000000"/>
+                      </a:solidFill>
+                      <a:prstDash val="solid"/>
+                      <a:round/>
+                      <a:headEnd type="none" w="med" len="med"/>
+                      <a:tailEnd type="none" w="med" len="med"/>
+                    </a:lnB>
+                  </a:tcPr>
+                </a:tc>
+                <a:extLst>
+                  <a:ext uri="{0D108BD9-81ED-4DB2-BD59-A6C34878D82A}">
+                    <a16:rowId xmlns:a16="http://schemas.microsoft.com/office/drawing/2014/main" val="706991841"/>
+                  </a:ext>
+                </a:extLst>
+              </a:tr>
+              <a:tr h="240845">
+                <a:tc>
+                  <a:txBody>
+                    <a:bodyPr/>
+                    <a:lstStyle/>
+                    <a:p>
+                      <a:pPr algn="ctr" fontAlgn="ctr"/>
+                      <a:r>
+                        <a:rPr lang="en-US" sz="1100" b="0" i="0" u="none" strike="noStrike" dirty="0">
+                          <a:solidFill>
+                            <a:srgbClr val="000000"/>
+                          </a:solidFill>
+                          <a:effectLst/>
+                          <a:latin typeface="Calibri" panose="020F0502020204030204" pitchFamily="34" charset="0"/>
+                        </a:rPr>
+                        <a:t> SGD optimizer</a:t>
+                      </a:r>
+                    </a:p>
+                  </a:txBody>
+                  <a:tcPr marL="6350" marR="6350" marT="6350" marB="0" anchor="ctr">
+                    <a:lnL w="6350" cap="flat" cmpd="sng" algn="ctr">
+                      <a:solidFill>
+                        <a:srgbClr val="000000"/>
+                      </a:solidFill>
+                      <a:prstDash val="solid"/>
+                      <a:round/>
+                      <a:headEnd type="none" w="med" len="med"/>
+                      <a:tailEnd type="none" w="med" len="med"/>
+                    </a:lnL>
+                    <a:lnR w="6350" cap="flat" cmpd="sng" algn="ctr">
+                      <a:solidFill>
+                        <a:srgbClr val="000000"/>
+                      </a:solidFill>
+                      <a:prstDash val="solid"/>
+                      <a:round/>
+                      <a:headEnd type="none" w="med" len="med"/>
+                      <a:tailEnd type="none" w="med" len="med"/>
+                    </a:lnR>
+                    <a:lnT w="6350" cap="flat" cmpd="sng" algn="ctr">
+                      <a:solidFill>
+                        <a:srgbClr val="000000"/>
+                      </a:solidFill>
+                      <a:prstDash val="solid"/>
+                      <a:round/>
+                      <a:headEnd type="none" w="med" len="med"/>
+                      <a:tailEnd type="none" w="med" len="med"/>
+                    </a:lnT>
+                    <a:lnB w="6350" cap="flat" cmpd="sng" algn="ctr">
+                      <a:solidFill>
+                        <a:srgbClr val="000000"/>
+                      </a:solidFill>
+                      <a:prstDash val="solid"/>
+                      <a:round/>
+                      <a:headEnd type="none" w="med" len="med"/>
+                      <a:tailEnd type="none" w="med" len="med"/>
+                    </a:lnB>
+                  </a:tcPr>
+                </a:tc>
+                <a:tc>
+                  <a:txBody>
+                    <a:bodyPr/>
+                    <a:lstStyle/>
+                    <a:p>
+                      <a:pPr algn="ctr" fontAlgn="ctr"/>
+                      <a:r>
+                        <a:rPr lang="en-US" sz="1100" b="0" i="0" u="none" strike="noStrike">
+                          <a:solidFill>
+                            <a:srgbClr val="000000"/>
+                          </a:solidFill>
+                          <a:effectLst/>
+                          <a:latin typeface="Calibri" panose="020F0502020204030204" pitchFamily="34" charset="0"/>
+                        </a:rPr>
+                        <a:t>50</a:t>
+                      </a:r>
+                    </a:p>
+                  </a:txBody>
+                  <a:tcPr marL="6350" marR="6350" marT="6350" marB="0" anchor="ctr">
+                    <a:lnL w="6350" cap="flat" cmpd="sng" algn="ctr">
+                      <a:solidFill>
+                        <a:srgbClr val="000000"/>
+                      </a:solidFill>
+                      <a:prstDash val="solid"/>
+                      <a:round/>
+                      <a:headEnd type="none" w="med" len="med"/>
+                      <a:tailEnd type="none" w="med" len="med"/>
+                    </a:lnL>
+                    <a:lnR w="6350" cap="flat" cmpd="sng" algn="ctr">
+                      <a:solidFill>
+                        <a:srgbClr val="000000"/>
+                      </a:solidFill>
+                      <a:prstDash val="solid"/>
+                      <a:round/>
+                      <a:headEnd type="none" w="med" len="med"/>
+                      <a:tailEnd type="none" w="med" len="med"/>
+                    </a:lnR>
+                    <a:lnT w="6350" cap="flat" cmpd="sng" algn="ctr">
+                      <a:solidFill>
+                        <a:srgbClr val="000000"/>
+                      </a:solidFill>
+                      <a:prstDash val="solid"/>
+                      <a:round/>
+                      <a:headEnd type="none" w="med" len="med"/>
+                      <a:tailEnd type="none" w="med" len="med"/>
+                    </a:lnT>
+                    <a:lnB w="6350" cap="flat" cmpd="sng" algn="ctr">
+                      <a:solidFill>
+                        <a:srgbClr val="000000"/>
+                      </a:solidFill>
+                      <a:prstDash val="solid"/>
+                      <a:round/>
+                      <a:headEnd type="none" w="med" len="med"/>
+                      <a:tailEnd type="none" w="med" len="med"/>
+                    </a:lnB>
+                  </a:tcPr>
+                </a:tc>
+                <a:tc>
+                  <a:txBody>
+                    <a:bodyPr/>
+                    <a:lstStyle/>
+                    <a:p>
+                      <a:pPr algn="ctr" fontAlgn="ctr"/>
+                      <a:r>
+                        <a:rPr lang="en-US" sz="1100" b="0" i="0" u="none" strike="noStrike">
+                          <a:solidFill>
+                            <a:srgbClr val="000000"/>
+                          </a:solidFill>
+                          <a:effectLst/>
+                          <a:latin typeface="Calibri" panose="020F0502020204030204" pitchFamily="34" charset="0"/>
+                        </a:rPr>
+                        <a:t>0.1</a:t>
+                      </a:r>
+                    </a:p>
+                  </a:txBody>
+                  <a:tcPr marL="6350" marR="6350" marT="6350" marB="0" anchor="ctr">
+                    <a:lnL w="6350" cap="flat" cmpd="sng" algn="ctr">
+                      <a:solidFill>
+                        <a:srgbClr val="000000"/>
+                      </a:solidFill>
+                      <a:prstDash val="solid"/>
+                      <a:round/>
+                      <a:headEnd type="none" w="med" len="med"/>
+                      <a:tailEnd type="none" w="med" len="med"/>
+                    </a:lnL>
+                    <a:lnR w="6350" cap="flat" cmpd="sng" algn="ctr">
+                      <a:solidFill>
+                        <a:srgbClr val="000000"/>
+                      </a:solidFill>
+                      <a:prstDash val="solid"/>
+                      <a:round/>
+                      <a:headEnd type="none" w="med" len="med"/>
+                      <a:tailEnd type="none" w="med" len="med"/>
+                    </a:lnR>
+                    <a:lnT w="6350" cap="flat" cmpd="sng" algn="ctr">
+                      <a:solidFill>
+                        <a:srgbClr val="000000"/>
+                      </a:solidFill>
+                      <a:prstDash val="solid"/>
+                      <a:round/>
+                      <a:headEnd type="none" w="med" len="med"/>
+                      <a:tailEnd type="none" w="med" len="med"/>
+                    </a:lnT>
+                    <a:lnB w="6350" cap="flat" cmpd="sng" algn="ctr">
+                      <a:solidFill>
+                        <a:srgbClr val="000000"/>
+                      </a:solidFill>
+                      <a:prstDash val="solid"/>
+                      <a:round/>
+                      <a:headEnd type="none" w="med" len="med"/>
+                      <a:tailEnd type="none" w="med" len="med"/>
+                    </a:lnB>
+                  </a:tcPr>
+                </a:tc>
+                <a:tc>
+                  <a:txBody>
+                    <a:bodyPr/>
+                    <a:lstStyle/>
+                    <a:p>
+                      <a:pPr algn="ctr" fontAlgn="ctr"/>
+                      <a:r>
+                        <a:rPr lang="en-US" sz="1100" b="0" i="0" u="none" strike="noStrike">
+                          <a:solidFill>
+                            <a:srgbClr val="000000"/>
+                          </a:solidFill>
+                          <a:effectLst/>
+                          <a:latin typeface="Calibri" panose="020F0502020204030204" pitchFamily="34" charset="0"/>
+                        </a:rPr>
+                        <a:t>0.0001</a:t>
+                      </a:r>
+                    </a:p>
+                  </a:txBody>
+                  <a:tcPr marL="6350" marR="6350" marT="6350" marB="0" anchor="ctr">
+                    <a:lnL w="6350" cap="flat" cmpd="sng" algn="ctr">
+                      <a:solidFill>
+                        <a:srgbClr val="000000"/>
+                      </a:solidFill>
+                      <a:prstDash val="solid"/>
+                      <a:round/>
+                      <a:headEnd type="none" w="med" len="med"/>
+                      <a:tailEnd type="none" w="med" len="med"/>
+                    </a:lnL>
+                    <a:lnR w="6350" cap="flat" cmpd="sng" algn="ctr">
+                      <a:solidFill>
+                        <a:srgbClr val="000000"/>
+                      </a:solidFill>
+                      <a:prstDash val="solid"/>
+                      <a:round/>
+                      <a:headEnd type="none" w="med" len="med"/>
+                      <a:tailEnd type="none" w="med" len="med"/>
+                    </a:lnR>
+                    <a:lnT w="6350" cap="flat" cmpd="sng" algn="ctr">
+                      <a:solidFill>
+                        <a:srgbClr val="000000"/>
+                      </a:solidFill>
+                      <a:prstDash val="solid"/>
+                      <a:round/>
+                      <a:headEnd type="none" w="med" len="med"/>
+                      <a:tailEnd type="none" w="med" len="med"/>
+                    </a:lnT>
+                    <a:lnB w="6350" cap="flat" cmpd="sng" algn="ctr">
+                      <a:solidFill>
+                        <a:srgbClr val="000000"/>
+                      </a:solidFill>
+                      <a:prstDash val="solid"/>
+                      <a:round/>
+                      <a:headEnd type="none" w="med" len="med"/>
+                      <a:tailEnd type="none" w="med" len="med"/>
+                    </a:lnB>
+                  </a:tcPr>
+                </a:tc>
+                <a:tc>
+                  <a:txBody>
+                    <a:bodyPr/>
+                    <a:lstStyle/>
+                    <a:p>
+                      <a:pPr algn="ctr" fontAlgn="ctr"/>
+                      <a:r>
+                        <a:rPr lang="en-US" sz="1100" b="0" i="0" u="none" strike="noStrike" dirty="0">
+                          <a:solidFill>
+                            <a:srgbClr val="000000"/>
+                          </a:solidFill>
+                          <a:effectLst/>
+                          <a:latin typeface="Calibri" panose="020F0502020204030204" pitchFamily="34" charset="0"/>
+                        </a:rPr>
+                        <a:t>4</a:t>
+                      </a:r>
+                    </a:p>
+                  </a:txBody>
+                  <a:tcPr marL="6350" marR="6350" marT="6350" marB="0" anchor="ctr">
+                    <a:lnL w="6350" cap="flat" cmpd="sng" algn="ctr">
+                      <a:solidFill>
+                        <a:srgbClr val="000000"/>
+                      </a:solidFill>
+                      <a:prstDash val="solid"/>
+                      <a:round/>
+                      <a:headEnd type="none" w="med" len="med"/>
+                      <a:tailEnd type="none" w="med" len="med"/>
+                    </a:lnL>
+                    <a:lnR w="6350" cap="flat" cmpd="sng" algn="ctr">
+                      <a:solidFill>
+                        <a:srgbClr val="000000"/>
+                      </a:solidFill>
+                      <a:prstDash val="solid"/>
+                      <a:round/>
+                      <a:headEnd type="none" w="med" len="med"/>
+                      <a:tailEnd type="none" w="med" len="med"/>
+                    </a:lnR>
+                    <a:lnT w="6350" cap="flat" cmpd="sng" algn="ctr">
+                      <a:solidFill>
+                        <a:srgbClr val="000000"/>
+                      </a:solidFill>
+                      <a:prstDash val="solid"/>
+                      <a:round/>
+                      <a:headEnd type="none" w="med" len="med"/>
+                      <a:tailEnd type="none" w="med" len="med"/>
+                    </a:lnT>
+                    <a:lnB w="6350" cap="flat" cmpd="sng" algn="ctr">
+                      <a:solidFill>
+                        <a:srgbClr val="000000"/>
+                      </a:solidFill>
+                      <a:prstDash val="solid"/>
+                      <a:round/>
+                      <a:headEnd type="none" w="med" len="med"/>
+                      <a:tailEnd type="none" w="med" len="med"/>
+                    </a:lnB>
+                  </a:tcPr>
+                </a:tc>
+                <a:extLst>
+                  <a:ext uri="{0D108BD9-81ED-4DB2-BD59-A6C34878D82A}">
+                    <a16:rowId xmlns:a16="http://schemas.microsoft.com/office/drawing/2014/main" val="954521944"/>
+                  </a:ext>
+                </a:extLst>
+              </a:tr>
+            </a:tbl>
+          </a:graphicData>
+        </a:graphic>
+      </p:graphicFrame>
     </p:spTree>
     <p:extLst>
       <p:ext uri="{BB962C8B-B14F-4D97-AF65-F5344CB8AC3E}">
@@ -3841,6 +7677,255 @@
           <p:cNvPr id="2" name="Title 1">
             <a:extLst>
               <a:ext uri="{FF2B5EF4-FFF2-40B4-BE49-F238E27FC236}">
+                <a16:creationId xmlns:a16="http://schemas.microsoft.com/office/drawing/2014/main" id="{CE56A45B-35D1-53E7-FE82-D16B623B939E}"/>
+              </a:ext>
+            </a:extLst>
+          </p:cNvPr>
+          <p:cNvSpPr>
+            <a:spLocks noGrp="1"/>
+          </p:cNvSpPr>
+          <p:nvPr>
+            <p:ph type="title"/>
+          </p:nvPr>
+        </p:nvSpPr>
+        <p:spPr/>
+        <p:txBody>
+          <a:bodyPr>
+            <a:normAutofit/>
+          </a:bodyPr>
+          <a:lstStyle/>
+          <a:p>
+            <a:r>
+              <a:rPr lang="en-US" b="0" i="0" dirty="0">
+                <a:solidFill>
+                  <a:srgbClr val="494C4E"/>
+                </a:solidFill>
+                <a:effectLst/>
+                <a:latin typeface="Lato" panose="020F0502020204030203" pitchFamily="34" charset="0"/>
+              </a:rPr>
+              <a:t>Observations</a:t>
+            </a:r>
+            <a:endParaRPr lang="en-US" dirty="0"/>
+          </a:p>
+        </p:txBody>
+      </p:sp>
+      <p:sp>
+        <p:nvSpPr>
+          <p:cNvPr id="3" name="Content Placeholder 2">
+            <a:extLst>
+              <a:ext uri="{FF2B5EF4-FFF2-40B4-BE49-F238E27FC236}">
+                <a16:creationId xmlns:a16="http://schemas.microsoft.com/office/drawing/2014/main" id="{1244658D-C0E6-AEC7-5D94-D214419FAD26}"/>
+              </a:ext>
+            </a:extLst>
+          </p:cNvPr>
+          <p:cNvSpPr>
+            <a:spLocks noGrp="1"/>
+          </p:cNvSpPr>
+          <p:nvPr>
+            <p:ph idx="1"/>
+          </p:nvPr>
+        </p:nvSpPr>
+        <p:spPr/>
+        <p:txBody>
+          <a:bodyPr>
+            <a:normAutofit fontScale="92500" lnSpcReduction="10000"/>
+          </a:bodyPr>
+          <a:lstStyle/>
+          <a:p>
+            <a:r>
+              <a:rPr lang="en-US" dirty="0"/>
+              <a:t>The </a:t>
+            </a:r>
+            <a:r>
+              <a:rPr lang="en-US" dirty="0" err="1"/>
+              <a:t>LibTorch</a:t>
+            </a:r>
+            <a:r>
+              <a:rPr lang="en-US" dirty="0"/>
+              <a:t> C++ program has more than </a:t>
+            </a:r>
+            <a:r>
+              <a:rPr lang="en-US" b="1" dirty="0"/>
+              <a:t>3-4x speedup in training and test time</a:t>
+            </a:r>
+            <a:r>
+              <a:rPr lang="en-US" dirty="0"/>
+              <a:t> as compared to the Pytorch implementation. This is possibly because it is compiled beforehand as well as there is no Global Interpreter Lock (GIL) in C++. </a:t>
+            </a:r>
+          </a:p>
+          <a:p>
+            <a:r>
+              <a:rPr lang="en-US" dirty="0"/>
+              <a:t>The latency counter intuitively is better with the python code, I am not sure why this is, possibly because latency is measured with a single image, and it only needs 1 thread.</a:t>
+            </a:r>
+          </a:p>
+          <a:p>
+            <a:r>
+              <a:rPr lang="en-US" dirty="0"/>
+              <a:t>The Training accuracy for all the models in very similar at around 96% but the test accuracy for the C++ ones is around 71% as opposed to 88% for the Pytorch version. Not sure why this is going on, possible due to non identical data augmentation even though I checked the code for anything like that and could not find it.   </a:t>
+            </a:r>
+          </a:p>
+        </p:txBody>
+      </p:sp>
+    </p:spTree>
+    <p:extLst>
+      <p:ext uri="{BB962C8B-B14F-4D97-AF65-F5344CB8AC3E}">
+        <p14:creationId xmlns:p14="http://schemas.microsoft.com/office/powerpoint/2010/main" val="3147592132"/>
+      </p:ext>
+    </p:extLst>
+  </p:cSld>
+  <p:clrMapOvr>
+    <a:masterClrMapping/>
+  </p:clrMapOvr>
+</p:sld>
+</file>
+
+<file path=ppt/slides/slide7.xml><?xml version="1.0" encoding="utf-8"?>
+<p:sld xmlns:a="http://schemas.openxmlformats.org/drawingml/2006/main" xmlns:r="http://schemas.openxmlformats.org/officeDocument/2006/relationships" xmlns:p="http://schemas.openxmlformats.org/presentationml/2006/main">
+  <p:cSld>
+    <p:spTree>
+      <p:nvGrpSpPr>
+        <p:cNvPr id="1" name=""/>
+        <p:cNvGrpSpPr/>
+        <p:nvPr/>
+      </p:nvGrpSpPr>
+      <p:grpSpPr>
+        <a:xfrm>
+          <a:off x="0" y="0"/>
+          <a:ext cx="0" cy="0"/>
+          <a:chOff x="0" y="0"/>
+          <a:chExt cx="0" cy="0"/>
+        </a:xfrm>
+      </p:grpSpPr>
+      <p:sp>
+        <p:nvSpPr>
+          <p:cNvPr id="2" name="Title 1">
+            <a:extLst>
+              <a:ext uri="{FF2B5EF4-FFF2-40B4-BE49-F238E27FC236}">
+                <a16:creationId xmlns:a16="http://schemas.microsoft.com/office/drawing/2014/main" id="{3700E3D7-48A5-8537-7992-E27E2E9624AC}"/>
+              </a:ext>
+            </a:extLst>
+          </p:cNvPr>
+          <p:cNvSpPr>
+            <a:spLocks noGrp="1"/>
+          </p:cNvSpPr>
+          <p:nvPr>
+            <p:ph type="title"/>
+          </p:nvPr>
+        </p:nvSpPr>
+        <p:spPr/>
+        <p:txBody>
+          <a:bodyPr/>
+          <a:lstStyle/>
+          <a:p>
+            <a:r>
+              <a:rPr lang="en-US" dirty="0"/>
+              <a:t>Challenges/Conclusion</a:t>
+            </a:r>
+          </a:p>
+        </p:txBody>
+      </p:sp>
+      <p:sp>
+        <p:nvSpPr>
+          <p:cNvPr id="3" name="Content Placeholder 2">
+            <a:extLst>
+              <a:ext uri="{FF2B5EF4-FFF2-40B4-BE49-F238E27FC236}">
+                <a16:creationId xmlns:a16="http://schemas.microsoft.com/office/drawing/2014/main" id="{8B015265-00CF-A052-5F22-982A27E0F35C}"/>
+              </a:ext>
+            </a:extLst>
+          </p:cNvPr>
+          <p:cNvSpPr>
+            <a:spLocks noGrp="1"/>
+          </p:cNvSpPr>
+          <p:nvPr>
+            <p:ph idx="1"/>
+          </p:nvPr>
+        </p:nvSpPr>
+        <p:spPr/>
+        <p:txBody>
+          <a:bodyPr>
+            <a:normAutofit/>
+          </a:bodyPr>
+          <a:lstStyle/>
+          <a:p>
+            <a:r>
+              <a:rPr lang="en-US" dirty="0"/>
+              <a:t>A lot of functionality present in Pytorch such as data augmentations implementations, such as flip, random crop, etc., are missing in the </a:t>
+            </a:r>
+            <a:r>
+              <a:rPr lang="en-US" dirty="0" err="1"/>
+              <a:t>LibTorch</a:t>
+            </a:r>
+            <a:r>
+              <a:rPr lang="en-US" dirty="0"/>
+              <a:t> C++ library. Learning rate scheduler is also not present. </a:t>
+            </a:r>
+          </a:p>
+          <a:p>
+            <a:r>
+              <a:rPr lang="en-US" dirty="0"/>
+              <a:t>Programing using the </a:t>
+            </a:r>
+            <a:r>
+              <a:rPr lang="en-US" dirty="0" err="1"/>
+              <a:t>LibTorch</a:t>
+            </a:r>
+            <a:r>
+              <a:rPr lang="en-US" dirty="0"/>
+              <a:t> API is not straight forward, and the documentation is not as well developed as the Pytorch version. </a:t>
+            </a:r>
+          </a:p>
+          <a:p>
+            <a:r>
+              <a:rPr lang="en-US" dirty="0"/>
+              <a:t>It only makes sense to use </a:t>
+            </a:r>
+            <a:r>
+              <a:rPr lang="en-US" dirty="0" err="1"/>
+              <a:t>LibTorch</a:t>
+            </a:r>
+            <a:r>
+              <a:rPr lang="en-US" dirty="0"/>
+              <a:t> if the compute model being trained is HUGE or GPU budget is very low, this is because the slowness of rapid development and experimentations with C++ as opposed to Pytorch has to be taken into consideration and for ML rapid and flexible experimentation is a key for successful ML projects.   </a:t>
+            </a:r>
+          </a:p>
+        </p:txBody>
+      </p:sp>
+    </p:spTree>
+    <p:extLst>
+      <p:ext uri="{BB962C8B-B14F-4D97-AF65-F5344CB8AC3E}">
+        <p14:creationId xmlns:p14="http://schemas.microsoft.com/office/powerpoint/2010/main" val="3991474450"/>
+      </p:ext>
+    </p:extLst>
+  </p:cSld>
+  <p:clrMapOvr>
+    <a:masterClrMapping/>
+  </p:clrMapOvr>
+</p:sld>
+</file>
+
+<file path=ppt/slides/slide8.xml><?xml version="1.0" encoding="utf-8"?>
+<p:sld xmlns:a="http://schemas.openxmlformats.org/drawingml/2006/main" xmlns:r="http://schemas.openxmlformats.org/officeDocument/2006/relationships" xmlns:p="http://schemas.openxmlformats.org/presentationml/2006/main">
+  <p:cSld>
+    <p:spTree>
+      <p:nvGrpSpPr>
+        <p:cNvPr id="1" name=""/>
+        <p:cNvGrpSpPr/>
+        <p:nvPr/>
+      </p:nvGrpSpPr>
+      <p:grpSpPr>
+        <a:xfrm>
+          <a:off x="0" y="0"/>
+          <a:ext cx="0" cy="0"/>
+          <a:chOff x="0" y="0"/>
+          <a:chExt cx="0" cy="0"/>
+        </a:xfrm>
+      </p:grpSpPr>
+      <p:sp>
+        <p:nvSpPr>
+          <p:cNvPr id="2" name="Title 1">
+            <a:extLst>
+              <a:ext uri="{FF2B5EF4-FFF2-40B4-BE49-F238E27FC236}">
                 <a16:creationId xmlns:a16="http://schemas.microsoft.com/office/drawing/2014/main" id="{E73BAFDA-12FB-98DD-10EB-3718666E87CA}"/>
               </a:ext>
             </a:extLst>
@@ -3884,6 +7969,94 @@
         <p:txBody>
           <a:bodyPr/>
           <a:lstStyle/>
+          <a:p>
+            <a:r>
+              <a:rPr lang="en-US" dirty="0"/>
+              <a:t>My GitHub link with Code, Documentation, Presentation, Results, etc.</a:t>
+            </a:r>
+            <a:br>
+              <a:rPr lang="en-US" dirty="0"/>
+            </a:br>
+            <a:r>
+              <a:rPr lang="en-US" dirty="0">
+                <a:hlinkClick r:id="rId2"/>
+              </a:rPr>
+              <a:t>https://github.com/GM223/pytorch_python_cpp_benchmark_comparison</a:t>
+            </a:r>
+            <a:endParaRPr lang="en-US" dirty="0"/>
+          </a:p>
+          <a:p>
+            <a:r>
+              <a:rPr lang="en-US" dirty="0"/>
+              <a:t>Lei Mao blog and git repository on </a:t>
+            </a:r>
+            <a:r>
+              <a:rPr lang="en-US" dirty="0" err="1"/>
+              <a:t>LibTorch</a:t>
+            </a:r>
+            <a:r>
+              <a:rPr lang="en-US" dirty="0"/>
+              <a:t> </a:t>
+            </a:r>
+            <a:r>
+              <a:rPr lang="en-US" dirty="0" err="1"/>
+              <a:t>resnet</a:t>
+            </a:r>
+            <a:br>
+              <a:rPr lang="en-US" dirty="0"/>
+            </a:br>
+            <a:r>
+              <a:rPr lang="en-US" dirty="0">
+                <a:hlinkClick r:id="rId3"/>
+              </a:rPr>
+              <a:t>https://leimao.github.io/blog/LibTorch-ResNet-CIFAR/</a:t>
+            </a:r>
+            <a:br>
+              <a:rPr lang="en-US" dirty="0"/>
+            </a:br>
+            <a:r>
+              <a:rPr lang="en-US" dirty="0">
+                <a:hlinkClick r:id="rId4"/>
+              </a:rPr>
+              <a:t>https://github.com/leimao/LibTorch-ResNet-CIFAR</a:t>
+            </a:r>
+            <a:endParaRPr lang="en-US" dirty="0"/>
+          </a:p>
+          <a:p>
+            <a:r>
+              <a:rPr lang="en-US" dirty="0"/>
+              <a:t>Pytorch CIFAR10</a:t>
+            </a:r>
+            <a:br>
+              <a:rPr lang="en-US" dirty="0"/>
+            </a:br>
+            <a:r>
+              <a:rPr lang="en-US" dirty="0">
+                <a:hlinkClick r:id="rId5"/>
+              </a:rPr>
+              <a:t>https://github.com/kuangliu/pytorch-cifar</a:t>
+            </a:r>
+            <a:endParaRPr lang="en-US" dirty="0"/>
+          </a:p>
+          <a:p>
+            <a:r>
+              <a:rPr lang="en-US" dirty="0"/>
+              <a:t>Pytorch NN latency </a:t>
+            </a:r>
+            <a:br>
+              <a:rPr lang="en-US" dirty="0"/>
+            </a:br>
+            <a:r>
+              <a:rPr lang="en-US" dirty="0">
+                <a:hlinkClick r:id="rId6"/>
+              </a:rPr>
+              <a:t>https://deci.ai/blog/measure-inference-time-deep-neural-networks/</a:t>
+            </a:r>
+            <a:endParaRPr lang="en-US" dirty="0"/>
+          </a:p>
+          <a:p>
+            <a:endParaRPr lang="en-US" dirty="0"/>
+          </a:p>
           <a:p>
             <a:endParaRPr lang="en-US" dirty="0"/>
           </a:p>
@@ -4195,4 +8368,299 @@
     </a:ext>
   </a:extLst>
 </a:theme>
+</file>
+
+<file path=ppt/theme/theme2.xml><?xml version="1.0" encoding="utf-8"?>
+<a:theme xmlns:a="http://schemas.openxmlformats.org/drawingml/2006/main" name="Office Theme">
+  <a:themeElements>
+    <a:clrScheme name="Office">
+      <a:dk1>
+        <a:sysClr val="windowText" lastClr="000000"/>
+      </a:dk1>
+      <a:lt1>
+        <a:sysClr val="window" lastClr="FFFFFF"/>
+      </a:lt1>
+      <a:dk2>
+        <a:srgbClr val="44546A"/>
+      </a:dk2>
+      <a:lt2>
+        <a:srgbClr val="E7E6E6"/>
+      </a:lt2>
+      <a:accent1>
+        <a:srgbClr val="4472C4"/>
+      </a:accent1>
+      <a:accent2>
+        <a:srgbClr val="ED7D31"/>
+      </a:accent2>
+      <a:accent3>
+        <a:srgbClr val="A5A5A5"/>
+      </a:accent3>
+      <a:accent4>
+        <a:srgbClr val="FFC000"/>
+      </a:accent4>
+      <a:accent5>
+        <a:srgbClr val="5B9BD5"/>
+      </a:accent5>
+      <a:accent6>
+        <a:srgbClr val="70AD47"/>
+      </a:accent6>
+      <a:hlink>
+        <a:srgbClr val="0563C1"/>
+      </a:hlink>
+      <a:folHlink>
+        <a:srgbClr val="954F72"/>
+      </a:folHlink>
+    </a:clrScheme>
+    <a:fontScheme name="Office">
+      <a:majorFont>
+        <a:latin typeface="Calibri Light" panose="020F0302020204030204"/>
+        <a:ea typeface=""/>
+        <a:cs typeface=""/>
+        <a:font script="Jpan" typeface="游ゴシック Light"/>
+        <a:font script="Hang" typeface="맑은 고딕"/>
+        <a:font script="Hans" typeface="等线 Light"/>
+        <a:font script="Hant" typeface="新細明體"/>
+        <a:font script="Arab" typeface="Times New Roman"/>
+        <a:font script="Hebr" typeface="Times New Roman"/>
+        <a:font script="Thai" typeface="Angsana New"/>
+        <a:font script="Ethi" typeface="Nyala"/>
+        <a:font script="Beng" typeface="Vrinda"/>
+        <a:font script="Gujr" typeface="Shruti"/>
+        <a:font script="Khmr" typeface="MoolBoran"/>
+        <a:font script="Knda" typeface="Tunga"/>
+        <a:font script="Guru" typeface="Raavi"/>
+        <a:font script="Cans" typeface="Euphemia"/>
+        <a:font script="Cher" typeface="Plantagenet Cherokee"/>
+        <a:font script="Yiii" typeface="Microsoft Yi Baiti"/>
+        <a:font script="Tibt" typeface="Microsoft Himalaya"/>
+        <a:font script="Thaa" typeface="MV Boli"/>
+        <a:font script="Deva" typeface="Mangal"/>
+        <a:font script="Telu" typeface="Gautami"/>
+        <a:font script="Taml" typeface="Latha"/>
+        <a:font script="Syrc" typeface="Estrangelo Edessa"/>
+        <a:font script="Orya" typeface="Kalinga"/>
+        <a:font script="Mlym" typeface="Kartika"/>
+        <a:font script="Laoo" typeface="DokChampa"/>
+        <a:font script="Sinh" typeface="Iskoola Pota"/>
+        <a:font script="Mong" typeface="Mongolian Baiti"/>
+        <a:font script="Viet" typeface="Times New Roman"/>
+        <a:font script="Uigh" typeface="Microsoft Uighur"/>
+        <a:font script="Geor" typeface="Sylfaen"/>
+        <a:font script="Armn" typeface="Arial"/>
+        <a:font script="Bugi" typeface="Leelawadee UI"/>
+        <a:font script="Bopo" typeface="Microsoft JhengHei"/>
+        <a:font script="Java" typeface="Javanese Text"/>
+        <a:font script="Lisu" typeface="Segoe UI"/>
+        <a:font script="Mymr" typeface="Myanmar Text"/>
+        <a:font script="Nkoo" typeface="Ebrima"/>
+        <a:font script="Olck" typeface="Nirmala UI"/>
+        <a:font script="Osma" typeface="Ebrima"/>
+        <a:font script="Phag" typeface="Phagspa"/>
+        <a:font script="Syrn" typeface="Estrangelo Edessa"/>
+        <a:font script="Syrj" typeface="Estrangelo Edessa"/>
+        <a:font script="Syre" typeface="Estrangelo Edessa"/>
+        <a:font script="Sora" typeface="Nirmala UI"/>
+        <a:font script="Tale" typeface="Microsoft Tai Le"/>
+        <a:font script="Talu" typeface="Microsoft New Tai Lue"/>
+        <a:font script="Tfng" typeface="Ebrima"/>
+      </a:majorFont>
+      <a:minorFont>
+        <a:latin typeface="Calibri" panose="020F0502020204030204"/>
+        <a:ea typeface=""/>
+        <a:cs typeface=""/>
+        <a:font script="Jpan" typeface="游ゴシック"/>
+        <a:font script="Hang" typeface="맑은 고딕"/>
+        <a:font script="Hans" typeface="等线"/>
+        <a:font script="Hant" typeface="新細明體"/>
+        <a:font script="Arab" typeface="Arial"/>
+        <a:font script="Hebr" typeface="Arial"/>
+        <a:font script="Thai" typeface="Cordia New"/>
+        <a:font script="Ethi" typeface="Nyala"/>
+        <a:font script="Beng" typeface="Vrinda"/>
+        <a:font script="Gujr" typeface="Shruti"/>
+        <a:font script="Khmr" typeface="DaunPenh"/>
+        <a:font script="Knda" typeface="Tunga"/>
+        <a:font script="Guru" typeface="Raavi"/>
+        <a:font script="Cans" typeface="Euphemia"/>
+        <a:font script="Cher" typeface="Plantagenet Cherokee"/>
+        <a:font script="Yiii" typeface="Microsoft Yi Baiti"/>
+        <a:font script="Tibt" typeface="Microsoft Himalaya"/>
+        <a:font script="Thaa" typeface="MV Boli"/>
+        <a:font script="Deva" typeface="Mangal"/>
+        <a:font script="Telu" typeface="Gautami"/>
+        <a:font script="Taml" typeface="Latha"/>
+        <a:font script="Syrc" typeface="Estrangelo Edessa"/>
+        <a:font script="Orya" typeface="Kalinga"/>
+        <a:font script="Mlym" typeface="Kartika"/>
+        <a:font script="Laoo" typeface="DokChampa"/>
+        <a:font script="Sinh" typeface="Iskoola Pota"/>
+        <a:font script="Mong" typeface="Mongolian Baiti"/>
+        <a:font script="Viet" typeface="Arial"/>
+        <a:font script="Uigh" typeface="Microsoft Uighur"/>
+        <a:font script="Geor" typeface="Sylfaen"/>
+        <a:font script="Armn" typeface="Arial"/>
+        <a:font script="Bugi" typeface="Leelawadee UI"/>
+        <a:font script="Bopo" typeface="Microsoft JhengHei"/>
+        <a:font script="Java" typeface="Javanese Text"/>
+        <a:font script="Lisu" typeface="Segoe UI"/>
+        <a:font script="Mymr" typeface="Myanmar Text"/>
+        <a:font script="Nkoo" typeface="Ebrima"/>
+        <a:font script="Olck" typeface="Nirmala UI"/>
+        <a:font script="Osma" typeface="Ebrima"/>
+        <a:font script="Phag" typeface="Phagspa"/>
+        <a:font script="Syrn" typeface="Estrangelo Edessa"/>
+        <a:font script="Syrj" typeface="Estrangelo Edessa"/>
+        <a:font script="Syre" typeface="Estrangelo Edessa"/>
+        <a:font script="Sora" typeface="Nirmala UI"/>
+        <a:font script="Tale" typeface="Microsoft Tai Le"/>
+        <a:font script="Talu" typeface="Microsoft New Tai Lue"/>
+        <a:font script="Tfng" typeface="Ebrima"/>
+      </a:minorFont>
+    </a:fontScheme>
+    <a:fmtScheme name="Office">
+      <a:fillStyleLst>
+        <a:solidFill>
+          <a:schemeClr val="phClr"/>
+        </a:solidFill>
+        <a:gradFill rotWithShape="1">
+          <a:gsLst>
+            <a:gs pos="0">
+              <a:schemeClr val="phClr">
+                <a:lumMod val="110000"/>
+                <a:satMod val="105000"/>
+                <a:tint val="67000"/>
+              </a:schemeClr>
+            </a:gs>
+            <a:gs pos="50000">
+              <a:schemeClr val="phClr">
+                <a:lumMod val="105000"/>
+                <a:satMod val="103000"/>
+                <a:tint val="73000"/>
+              </a:schemeClr>
+            </a:gs>
+            <a:gs pos="100000">
+              <a:schemeClr val="phClr">
+                <a:lumMod val="105000"/>
+                <a:satMod val="109000"/>
+                <a:tint val="81000"/>
+              </a:schemeClr>
+            </a:gs>
+          </a:gsLst>
+          <a:lin ang="5400000" scaled="0"/>
+        </a:gradFill>
+        <a:gradFill rotWithShape="1">
+          <a:gsLst>
+            <a:gs pos="0">
+              <a:schemeClr val="phClr">
+                <a:satMod val="103000"/>
+                <a:lumMod val="102000"/>
+                <a:tint val="94000"/>
+              </a:schemeClr>
+            </a:gs>
+            <a:gs pos="50000">
+              <a:schemeClr val="phClr">
+                <a:satMod val="110000"/>
+                <a:lumMod val="100000"/>
+                <a:shade val="100000"/>
+              </a:schemeClr>
+            </a:gs>
+            <a:gs pos="100000">
+              <a:schemeClr val="phClr">
+                <a:lumMod val="99000"/>
+                <a:satMod val="120000"/>
+                <a:shade val="78000"/>
+              </a:schemeClr>
+            </a:gs>
+          </a:gsLst>
+          <a:lin ang="5400000" scaled="0"/>
+        </a:gradFill>
+      </a:fillStyleLst>
+      <a:lnStyleLst>
+        <a:ln w="6350" cap="flat" cmpd="sng" algn="ctr">
+          <a:solidFill>
+            <a:schemeClr val="phClr"/>
+          </a:solidFill>
+          <a:prstDash val="solid"/>
+          <a:miter lim="800000"/>
+        </a:ln>
+        <a:ln w="12700" cap="flat" cmpd="sng" algn="ctr">
+          <a:solidFill>
+            <a:schemeClr val="phClr"/>
+          </a:solidFill>
+          <a:prstDash val="solid"/>
+          <a:miter lim="800000"/>
+        </a:ln>
+        <a:ln w="19050" cap="flat" cmpd="sng" algn="ctr">
+          <a:solidFill>
+            <a:schemeClr val="phClr"/>
+          </a:solidFill>
+          <a:prstDash val="solid"/>
+          <a:miter lim="800000"/>
+        </a:ln>
+      </a:lnStyleLst>
+      <a:effectStyleLst>
+        <a:effectStyle>
+          <a:effectLst/>
+        </a:effectStyle>
+        <a:effectStyle>
+          <a:effectLst/>
+        </a:effectStyle>
+        <a:effectStyle>
+          <a:effectLst>
+            <a:outerShdw blurRad="57150" dist="19050" dir="5400000" algn="ctr" rotWithShape="0">
+              <a:srgbClr val="000000">
+                <a:alpha val="63000"/>
+              </a:srgbClr>
+            </a:outerShdw>
+          </a:effectLst>
+        </a:effectStyle>
+      </a:effectStyleLst>
+      <a:bgFillStyleLst>
+        <a:solidFill>
+          <a:schemeClr val="phClr"/>
+        </a:solidFill>
+        <a:solidFill>
+          <a:schemeClr val="phClr">
+            <a:tint val="95000"/>
+            <a:satMod val="170000"/>
+          </a:schemeClr>
+        </a:solidFill>
+        <a:gradFill rotWithShape="1">
+          <a:gsLst>
+            <a:gs pos="0">
+              <a:schemeClr val="phClr">
+                <a:tint val="93000"/>
+                <a:satMod val="150000"/>
+                <a:shade val="98000"/>
+                <a:lumMod val="102000"/>
+              </a:schemeClr>
+            </a:gs>
+            <a:gs pos="50000">
+              <a:schemeClr val="phClr">
+                <a:tint val="98000"/>
+                <a:satMod val="130000"/>
+                <a:shade val="90000"/>
+                <a:lumMod val="103000"/>
+              </a:schemeClr>
+            </a:gs>
+            <a:gs pos="100000">
+              <a:schemeClr val="phClr">
+                <a:shade val="63000"/>
+                <a:satMod val="120000"/>
+              </a:schemeClr>
+            </a:gs>
+          </a:gsLst>
+          <a:lin ang="5400000" scaled="0"/>
+        </a:gradFill>
+      </a:bgFillStyleLst>
+    </a:fmtScheme>
+  </a:themeElements>
+  <a:objectDefaults/>
+  <a:extraClrSchemeLst/>
+  <a:extLst>
+    <a:ext uri="{05A4C25C-085E-4340-85A3-A5531E510DB2}">
+      <thm15:themeFamily xmlns:thm15="http://schemas.microsoft.com/office/thememl/2012/main" name="Office Theme" id="{62F939B6-93AF-4DB8-9C6B-D6C7DFDC589F}" vid="{4A3C46E8-61CC-4603-A589-7422A47A8E4A}"/>
+    </a:ext>
+  </a:extLst>
+</a:theme>
 </file>
</xml_diff>